<commit_message>
Regenerate deck export and deepen BI roadmap
</commit_message>
<xml_diff>
--- a/deck/Ready_Set_Ford_deck.pptx
+++ b/deck/Ready_Set_Ford_deck.pptx
@@ -12,6 +12,8 @@
     <p:sldId id="260" r:id="rId6"/>
     <p:sldId id="261" r:id="rId7"/>
     <p:sldId id="262" r:id="rId8"/>
+    <p:sldId id="263" r:id="rId9"/>
+    <p:sldId id="264" r:id="rId10"/>
   </p:sldIdLst>
   <p:sldSz cx="9144000" cy="5143500" type="screen16x9"/>
   <p:notesSz cx="6858000" cy="9144000"/>
@@ -3210,7 +3212,17 @@
             </a:r>
             <a:r>
               <a:rPr/>
-              <a:t> – 2023→2024 revenue, SG&amp;A, advertising trendlines from SEC extracts.</a:t>
+              <a:t> – 2023→2024 revenue, SG&amp;A, advertising trendlines from SEC extracts (visual </a:t>
+            </a:r>
+            <a:r>
+              <a:rPr>
+                <a:latin typeface="Courier"/>
+              </a:rPr>
+              <a:t>deck/visuals/financial_trends_2021_2024.png</a:t>
+            </a:r>
+            <a:r>
+              <a:rPr/>
+              <a:t>).</a:t>
             </a:r>
           </a:p>
           <a:p>
@@ -3276,6 +3288,60 @@
             </a:r>
           </a:p>
           <a:p>
+            <a:pPr lvl="1"/>
+            <a:r>
+              <a:rPr/>
+              <a:t>View: Ready Set Ford vs Ford Pro weekly indices (post-22 Sep normalization) sourced from </a:t>
+            </a:r>
+            <a:r>
+              <a:rPr>
+                <a:latin typeface="Courier"/>
+              </a:rPr>
+              <a:t>data/external/google_trends_readysetford_us.csv</a:t>
+            </a:r>
+            <a:r>
+              <a:rPr/>
+              <a:t> with visual </a:t>
+            </a:r>
+            <a:r>
+              <a:rPr>
+                <a:latin typeface="Courier"/>
+              </a:rPr>
+              <a:t>deck/visuals/google_trends_readysetford_us.png</a:t>
+            </a:r>
+            <a:r>
+              <a:rPr/>
+              <a:t>.</a:t>
+            </a:r>
+          </a:p>
+          <a:p>
+            <a:pPr lvl="1"/>
+            <a:r>
+              <a:rPr/>
+              <a:t>Sentiment snapshot: 25-post X/Twitter sample with hashtag mix, key themes, and dealer amplification notes (</a:t>
+            </a:r>
+            <a:r>
+              <a:rPr>
+                <a:latin typeface="Courier"/>
+              </a:rPr>
+              <a:t>data/external/twitter_readysetford_summary.json</a:t>
+            </a:r>
+            <a:r>
+              <a:rPr/>
+              <a:t>) with visual </a:t>
+            </a:r>
+            <a:r>
+              <a:rPr>
+                <a:latin typeface="Courier"/>
+              </a:rPr>
+              <a:t>deck/visuals/twitter_readysetford_top_hashtags.png</a:t>
+            </a:r>
+            <a:r>
+              <a:rPr/>
+              <a:t>.</a:t>
+            </a:r>
+          </a:p>
+          <a:p>
             <a:pPr lvl="0" indent="-342900" marL="342900">
               <a:buAutoNum type="arabicPeriod"/>
             </a:pPr>
@@ -3307,7 +3373,7 @@
             </a:pPr>
             <a:r>
               <a:rPr i="1"/>
-              <a:t>Draft updated 19 Sep 2025. Maintain ~12 slides; adjust as new insights emerge.</a:t>
+              <a:t>Draft updated 22 Sep 2025. Maintain ~12 slides; adjust as new insights emerge.</a:t>
             </a:r>
           </a:p>
         </p:txBody>
@@ -3344,677 +3410,81 @@
             <p:ph type="title"/>
           </p:nvPr>
         </p:nvSpPr>
+        <p:spPr/>
+        <p:txBody>
+          <a:bodyPr/>
+          <a:lstStyle/>
+          <a:p>
+            <a:pPr lvl="0" indent="0" marL="0">
+              <a:buNone/>
+            </a:pPr>
+            <a:r>
+              <a:rPr/>
+              <a:t>Digital Pulse – Google Trends (US)</a:t>
+            </a:r>
+          </a:p>
+        </p:txBody>
+      </p:sp>
+      <p:pic>
+        <p:nvPicPr>
+          <p:cNvPr descr="fig:  visuals/google_trends_readysetford_us.png" id="0" name="Picture 1"/>
+          <p:cNvPicPr>
+            <a:picLocks noGrp="1" noChangeAspect="1"/>
+          </p:cNvPicPr>
+          <p:nvPr/>
+        </p:nvPicPr>
+        <p:blipFill>
+          <a:blip r:embed="rId2"/>
+          <a:stretch>
+            <a:fillRect/>
+          </a:stretch>
+        </p:blipFill>
+        <p:spPr bwMode="auto">
+          <a:xfrm>
+            <a:off x="1689100" y="1193800"/>
+            <a:ext cx="5765800" cy="2882900"/>
+          </a:xfrm>
+          <a:prstGeom prst="rect">
+            <a:avLst/>
+          </a:prstGeom>
+          <a:noFill/>
+          <a:ln w="9525">
+            <a:noFill/>
+            <a:headEnd/>
+            <a:tailEnd/>
+          </a:ln>
+        </p:spPr>
+      </p:pic>
+      <p:sp>
+        <p:nvSpPr>
+          <p:cNvPr id="1" name="TextBox 3"/>
+          <p:cNvSpPr txBox="1"/>
+          <p:nvPr/>
+        </p:nvSpPr>
         <p:spPr>
           <a:xfrm>
-            <a:off x="457201" y="204787"/>
-            <a:ext cx="3008313" cy="871538"/>
+            <a:off x="457200" y="4076700"/>
+            <a:ext cx="8229600" cy="508000"/>
           </a:xfrm>
+          <a:prstGeom prst="rect">
+            <a:avLst/>
+          </a:prstGeom>
+          <a:noFill/>
         </p:spPr>
         <p:txBody>
           <a:bodyPr/>
           <a:lstStyle/>
           <a:p>
-            <a:pPr lvl="0" indent="0" marL="0">
+            <a:pPr lvl="0" indent="0" marL="0" algn="ctr">
               <a:buNone/>
             </a:pPr>
             <a:r>
               <a:rPr/>
-              <a:t>Slide – Ready Set Ford Video Performance</a:t>
-            </a:r>
-          </a:p>
-        </p:txBody>
-      </p:sp>
-      <p:sp>
-        <p:nvSpPr>
-          <p:cNvPr id="4" name="Text Placeholder 3"/>
-          <p:cNvSpPr>
-            <a:spLocks noGrp="1"/>
-          </p:cNvSpPr>
-          <p:nvPr>
-            <p:ph idx="2" sz="half" type="body"/>
-          </p:nvPr>
-        </p:nvSpPr>
-        <p:spPr/>
-        <p:txBody>
-          <a:bodyPr/>
-          <a:lstStyle/>
-          <a:p>
-            <a:pPr lvl="0" indent="0" marL="0">
-              <a:spcBef>
-                <a:spcPts val="3000"/>
-              </a:spcBef>
-              <a:buNone/>
-            </a:pPr>
-            <a:r>
-              <a:rPr b="1"/>
-              <a:t>Key Takeaways</a:t>
-            </a:r>
-          </a:p>
-          <a:p>
-            <a:pPr lvl="0"/>
-            <a:r>
-              <a:rPr/>
-              <a:t>Hero spots launched 10 Sep deliver the largest reach; “Ready Set Ford | Ford” leads with 24.5K views and &gt;500 likes.</a:t>
-            </a:r>
-          </a:p>
-          <a:p>
-            <a:pPr lvl="0"/>
-            <a:r>
-              <a:rPr/>
-              <a:t>Short-form and Canada-specific cuts (uploaded 16 Sep) trail in impressions but keep ~2% engagement, indicating consistent resonance.</a:t>
-            </a:r>
-          </a:p>
-          <a:p>
-            <a:pPr lvl="0"/>
-            <a:r>
-              <a:rPr/>
-              <a:t>“To Those Who Can” over-indexes on engagement (4.14%) vs. reach, signaling a potential storytelling asset for targeted placements.</a:t>
-            </a:r>
-          </a:p>
-          <a:p>
-            <a:pPr lvl="0" indent="0" marL="0">
-              <a:spcBef>
-                <a:spcPts val="3000"/>
-              </a:spcBef>
-              <a:buNone/>
-            </a:pPr>
-            <a:r>
-              <a:rPr b="1"/>
-              <a:t>Metrics Snapshot (YouTube, refreshed 19 Sep 2025)</a:t>
-            </a:r>
-          </a:p>
-        </p:txBody>
-      </p:sp>
-      <p:graphicFrame>
-        <p:nvGraphicFramePr>
-          <p:cNvPr id="6" name="Content Placeholder 5"/>
-          <p:cNvGraphicFramePr>
-            <a:graphicFrameLocks noGrp="1"/>
-          </p:cNvGraphicFramePr>
-          <p:nvPr>
-            <p:ph idx="1"/>
-          </p:nvPr>
-        </p:nvGraphicFramePr>
-        <p:xfrm>
-          <a:off x="3568700" y="203200"/>
-          <a:ext cx="5105400" cy="4381500"/>
-        </p:xfrm>
-        <a:graphic>
-          <a:graphicData uri="http://schemas.openxmlformats.org/drawingml/2006/table">
-            <a:tbl>
-              <a:tblPr firstRow="1" bandRow="1">
-                <a:tableStyleId>{5C22544A-7EE6-4342-B048-85BDC9FD1C3A}</a:tableStyleId>
-              </a:tblPr>
-              <a:tblGrid>
-                <a:gridCol w="850900"/>
-                <a:gridCol w="850900"/>
-                <a:gridCol w="850900"/>
-                <a:gridCol w="850900"/>
-                <a:gridCol w="850900"/>
-                <a:gridCol w="850900"/>
-              </a:tblGrid>
-              <a:tr h="0">
-                <a:tc>
-                  <a:txBody>
-                    <a:bodyPr/>
-                    <a:lstStyle/>
-                    <a:p>
-                      <a:pPr lvl="0" indent="0" marL="0">
-                        <a:buNone/>
-                      </a:pPr>
-                      <a:r>
-                        <a:rPr/>
-                        <a:t>Video</a:t>
-                      </a:r>
-                    </a:p>
-                  </a:txBody>
-                  <a:tcPr/>
-                </a:tc>
-                <a:tc>
-                  <a:txBody>
-                    <a:bodyPr/>
-                    <a:lstStyle/>
-                    <a:p>
-                      <a:pPr lvl="0" indent="0" marL="0">
-                        <a:buNone/>
-                      </a:pPr>
-                      <a:r>
-                        <a:rPr/>
-                        <a:t>Upload (UTC)</a:t>
-                      </a:r>
-                    </a:p>
-                  </a:txBody>
-                  <a:tcPr/>
-                </a:tc>
-                <a:tc>
-                  <a:txBody>
-                    <a:bodyPr/>
-                    <a:lstStyle/>
-                    <a:p>
-                      <a:pPr lvl="0" indent="0" marL="0">
-                        <a:buNone/>
-                      </a:pPr>
-                      <a:r>
-                        <a:rPr/>
-                        <a:t>Duration</a:t>
-                      </a:r>
-                    </a:p>
-                  </a:txBody>
-                  <a:tcPr/>
-                </a:tc>
-                <a:tc>
-                  <a:txBody>
-                    <a:bodyPr/>
-                    <a:lstStyle/>
-                    <a:p>
-                      <a:pPr lvl="0" indent="0" marL="0" algn="r">
-                        <a:buNone/>
-                      </a:pPr>
-                      <a:r>
-                        <a:rPr/>
-                        <a:t>Views</a:t>
-                      </a:r>
-                    </a:p>
-                  </a:txBody>
-                  <a:tcPr/>
-                </a:tc>
-                <a:tc>
-                  <a:txBody>
-                    <a:bodyPr/>
-                    <a:lstStyle/>
-                    <a:p>
-                      <a:pPr lvl="0" indent="0" marL="0" algn="r">
-                        <a:buNone/>
-                      </a:pPr>
-                      <a:r>
-                        <a:rPr/>
-                        <a:t>Likes</a:t>
-                      </a:r>
-                    </a:p>
-                  </a:txBody>
-                  <a:tcPr/>
-                </a:tc>
-                <a:tc>
-                  <a:txBody>
-                    <a:bodyPr/>
-                    <a:lstStyle/>
-                    <a:p>
-                      <a:pPr lvl="0" indent="0" marL="0" algn="r">
-                        <a:buNone/>
-                      </a:pPr>
-                      <a:r>
-                        <a:rPr/>
-                        <a:t>Engagement %</a:t>
-                      </a:r>
-                    </a:p>
-                  </a:txBody>
-                  <a:tcPr/>
-                </a:tc>
-              </a:tr>
-              <a:tr h="0">
-                <a:tc>
-                  <a:txBody>
-                    <a:bodyPr/>
-                    <a:lstStyle/>
-                    <a:p>
-                      <a:pPr lvl="0" indent="0" marL="0">
-                        <a:buNone/>
-                      </a:pPr>
-                      <a:r>
-                        <a:rPr/>
-                        <a:t>Ready Set Ford | Ford</a:t>
-                      </a:r>
-                    </a:p>
-                  </a:txBody>
-                </a:tc>
-                <a:tc>
-                  <a:txBody>
-                    <a:bodyPr/>
-                    <a:lstStyle/>
-                    <a:p>
-                      <a:pPr lvl="0" indent="0" marL="0">
-                        <a:buNone/>
-                      </a:pPr>
-                      <a:r>
-                        <a:rPr/>
-                        <a:t>2025-09-10</a:t>
-                      </a:r>
-                    </a:p>
-                  </a:txBody>
-                </a:tc>
-                <a:tc>
-                  <a:txBody>
-                    <a:bodyPr/>
-                    <a:lstStyle/>
-                    <a:p>
-                      <a:pPr lvl="0" indent="0" marL="0">
-                        <a:buNone/>
-                      </a:pPr>
-                      <a:r>
-                        <a:rPr/>
-                        <a:t>60s</a:t>
-                      </a:r>
-                    </a:p>
-                  </a:txBody>
-                </a:tc>
-                <a:tc>
-                  <a:txBody>
-                    <a:bodyPr/>
-                    <a:lstStyle/>
-                    <a:p>
-                      <a:pPr lvl="0" indent="0" marL="0" algn="r">
-                        <a:buNone/>
-                      </a:pPr>
-                      <a:r>
-                        <a:rPr/>
-                        <a:t>24,549</a:t>
-                      </a:r>
-                    </a:p>
-                  </a:txBody>
-                </a:tc>
-                <a:tc>
-                  <a:txBody>
-                    <a:bodyPr/>
-                    <a:lstStyle/>
-                    <a:p>
-                      <a:pPr lvl="0" indent="0" marL="0" algn="r">
-                        <a:buNone/>
-                      </a:pPr>
-                      <a:r>
-                        <a:rPr/>
-                        <a:t>503</a:t>
-                      </a:r>
-                    </a:p>
-                  </a:txBody>
-                </a:tc>
-                <a:tc>
-                  <a:txBody>
-                    <a:bodyPr/>
-                    <a:lstStyle/>
-                    <a:p>
-                      <a:pPr lvl="0" indent="0" marL="0" algn="r">
-                        <a:buNone/>
-                      </a:pPr>
-                      <a:r>
-                        <a:rPr/>
-                        <a:t>2.05</a:t>
-                      </a:r>
-                    </a:p>
-                  </a:txBody>
-                </a:tc>
-              </a:tr>
-              <a:tr h="0">
-                <a:tc>
-                  <a:txBody>
-                    <a:bodyPr/>
-                    <a:lstStyle/>
-                    <a:p>
-                      <a:pPr lvl="0" indent="0" marL="0">
-                        <a:buNone/>
-                      </a:pPr>
-                      <a:r>
-                        <a:rPr/>
-                        <a:t>Ready Set Ford™ (Canada)</a:t>
-                      </a:r>
-                    </a:p>
-                  </a:txBody>
-                </a:tc>
-                <a:tc>
-                  <a:txBody>
-                    <a:bodyPr/>
-                    <a:lstStyle/>
-                    <a:p>
-                      <a:pPr lvl="0" indent="0" marL="0">
-                        <a:buNone/>
-                      </a:pPr>
-                      <a:r>
-                        <a:rPr/>
-                        <a:t>2025-09-16</a:t>
-                      </a:r>
-                    </a:p>
-                  </a:txBody>
-                </a:tc>
-                <a:tc>
-                  <a:txBody>
-                    <a:bodyPr/>
-                    <a:lstStyle/>
-                    <a:p>
-                      <a:pPr lvl="0" indent="0" marL="0">
-                        <a:buNone/>
-                      </a:pPr>
-                      <a:r>
-                        <a:rPr/>
-                        <a:t>60s</a:t>
-                      </a:r>
-                    </a:p>
-                  </a:txBody>
-                </a:tc>
-                <a:tc>
-                  <a:txBody>
-                    <a:bodyPr/>
-                    <a:lstStyle/>
-                    <a:p>
-                      <a:pPr lvl="0" indent="0" marL="0" algn="r">
-                        <a:buNone/>
-                      </a:pPr>
-                      <a:r>
-                        <a:rPr/>
-                        <a:t>611</a:t>
-                      </a:r>
-                    </a:p>
-                  </a:txBody>
-                </a:tc>
-                <a:tc>
-                  <a:txBody>
-                    <a:bodyPr/>
-                    <a:lstStyle/>
-                    <a:p>
-                      <a:pPr lvl="0" indent="0" marL="0" algn="r">
-                        <a:buNone/>
-                      </a:pPr>
-                      <a:r>
-                        <a:rPr/>
-                        <a:t>13</a:t>
-                      </a:r>
-                    </a:p>
-                  </a:txBody>
-                </a:tc>
-                <a:tc>
-                  <a:txBody>
-                    <a:bodyPr/>
-                    <a:lstStyle/>
-                    <a:p>
-                      <a:pPr lvl="0" indent="0" marL="0" algn="r">
-                        <a:buNone/>
-                      </a:pPr>
-                      <a:r>
-                        <a:rPr/>
-                        <a:t>2.13</a:t>
-                      </a:r>
-                    </a:p>
-                  </a:txBody>
-                </a:tc>
-              </a:tr>
-              <a:tr h="0">
-                <a:tc>
-                  <a:txBody>
-                    <a:bodyPr/>
-                    <a:lstStyle/>
-                    <a:p>
-                      <a:pPr lvl="0" indent="0" marL="0">
-                        <a:buNone/>
-                      </a:pPr>
-                      <a:r>
-                        <a:rPr/>
-                        <a:t>To Those Who Can | Ford</a:t>
-                      </a:r>
-                    </a:p>
-                  </a:txBody>
-                </a:tc>
-                <a:tc>
-                  <a:txBody>
-                    <a:bodyPr/>
-                    <a:lstStyle/>
-                    <a:p>
-                      <a:pPr lvl="0" indent="0" marL="0">
-                        <a:buNone/>
-                      </a:pPr>
-                      <a:r>
-                        <a:rPr/>
-                        <a:t>2025-09-10</a:t>
-                      </a:r>
-                    </a:p>
-                  </a:txBody>
-                </a:tc>
-                <a:tc>
-                  <a:txBody>
-                    <a:bodyPr/>
-                    <a:lstStyle/>
-                    <a:p>
-                      <a:pPr lvl="0" indent="0" marL="0">
-                        <a:buNone/>
-                      </a:pPr>
-                      <a:r>
-                        <a:rPr/>
-                        <a:t>30s</a:t>
-                      </a:r>
-                    </a:p>
-                  </a:txBody>
-                </a:tc>
-                <a:tc>
-                  <a:txBody>
-                    <a:bodyPr/>
-                    <a:lstStyle/>
-                    <a:p>
-                      <a:pPr lvl="0" indent="0" marL="0" algn="r">
-                        <a:buNone/>
-                      </a:pPr>
-                      <a:r>
-                        <a:rPr/>
-                        <a:t>3,626</a:t>
-                      </a:r>
-                    </a:p>
-                  </a:txBody>
-                </a:tc>
-                <a:tc>
-                  <a:txBody>
-                    <a:bodyPr/>
-                    <a:lstStyle/>
-                    <a:p>
-                      <a:pPr lvl="0" indent="0" marL="0" algn="r">
-                        <a:buNone/>
-                      </a:pPr>
-                      <a:r>
-                        <a:rPr/>
-                        <a:t>150</a:t>
-                      </a:r>
-                    </a:p>
-                  </a:txBody>
-                </a:tc>
-                <a:tc>
-                  <a:txBody>
-                    <a:bodyPr/>
-                    <a:lstStyle/>
-                    <a:p>
-                      <a:pPr lvl="0" indent="0" marL="0" algn="r">
-                        <a:buNone/>
-                      </a:pPr>
-                      <a:r>
-                        <a:rPr/>
-                        <a:t>4.14</a:t>
-                      </a:r>
-                    </a:p>
-                  </a:txBody>
-                </a:tc>
-              </a:tr>
-              <a:tr h="0">
-                <a:tc>
-                  <a:txBody>
-                    <a:bodyPr/>
-                    <a:lstStyle/>
-                    <a:p>
-                      <a:pPr lvl="0" indent="0" marL="0">
-                        <a:buNone/>
-                      </a:pPr>
-                      <a:r>
-                        <a:rPr/>
-                        <a:t>Ready Set Ford™ (Shorts)</a:t>
-                      </a:r>
-                    </a:p>
-                  </a:txBody>
-                </a:tc>
-                <a:tc>
-                  <a:txBody>
-                    <a:bodyPr/>
-                    <a:lstStyle/>
-                    <a:p>
-                      <a:pPr lvl="0" indent="0" marL="0">
-                        <a:buNone/>
-                      </a:pPr>
-                      <a:r>
-                        <a:rPr/>
-                        <a:t>2025-09-16</a:t>
-                      </a:r>
-                    </a:p>
-                  </a:txBody>
-                </a:tc>
-                <a:tc>
-                  <a:txBody>
-                    <a:bodyPr/>
-                    <a:lstStyle/>
-                    <a:p>
-                      <a:pPr lvl="0" indent="0" marL="0">
-                        <a:buNone/>
-                      </a:pPr>
-                      <a:r>
-                        <a:rPr/>
-                        <a:t>60s</a:t>
-                      </a:r>
-                    </a:p>
-                  </a:txBody>
-                </a:tc>
-                <a:tc>
-                  <a:txBody>
-                    <a:bodyPr/>
-                    <a:lstStyle/>
-                    <a:p>
-                      <a:pPr lvl="0" indent="0" marL="0" algn="r">
-                        <a:buNone/>
-                      </a:pPr>
-                      <a:r>
-                        <a:rPr/>
-                        <a:t>603</a:t>
-                      </a:r>
-                    </a:p>
-                  </a:txBody>
-                </a:tc>
-                <a:tc>
-                  <a:txBody>
-                    <a:bodyPr/>
-                    <a:lstStyle/>
-                    <a:p>
-                      <a:pPr lvl="0" indent="0" marL="0" algn="r">
-                        <a:buNone/>
-                      </a:pPr>
-                      <a:r>
-                        <a:rPr/>
-                        <a:t>12</a:t>
-                      </a:r>
-                    </a:p>
-                  </a:txBody>
-                </a:tc>
-                <a:tc>
-                  <a:txBody>
-                    <a:bodyPr/>
-                    <a:lstStyle/>
-                    <a:p>
-                      <a:pPr lvl="0" indent="0" marL="0" algn="r">
-                        <a:buNone/>
-                      </a:pPr>
-                      <a:r>
-                        <a:rPr/>
-                        <a:t>1.99</a:t>
-                      </a:r>
-                    </a:p>
-                  </a:txBody>
-                </a:tc>
-              </a:tr>
-              <a:tr h="0">
-                <a:tc>
-                  <a:txBody>
-                    <a:bodyPr/>
-                    <a:lstStyle/>
-                    <a:p>
-                      <a:pPr lvl="0" indent="0" marL="0">
-                        <a:buNone/>
-                      </a:pPr>
-                      <a:r>
-                        <a:rPr/>
-                        <a:t>Up to the Task | Ford</a:t>
-                      </a:r>
-                    </a:p>
-                  </a:txBody>
-                </a:tc>
-                <a:tc>
-                  <a:txBody>
-                    <a:bodyPr/>
-                    <a:lstStyle/>
-                    <a:p>
-                      <a:pPr lvl="0" indent="0" marL="0">
-                        <a:buNone/>
-                      </a:pPr>
-                      <a:r>
-                        <a:rPr/>
-                        <a:t>2025-09-10</a:t>
-                      </a:r>
-                    </a:p>
-                  </a:txBody>
-                </a:tc>
-                <a:tc>
-                  <a:txBody>
-                    <a:bodyPr/>
-                    <a:lstStyle/>
-                    <a:p>
-                      <a:pPr lvl="0" indent="0" marL="0">
-                        <a:buNone/>
-                      </a:pPr>
-                      <a:r>
-                        <a:rPr/>
-                        <a:t>15s</a:t>
-                      </a:r>
-                    </a:p>
-                  </a:txBody>
-                </a:tc>
-                <a:tc>
-                  <a:txBody>
-                    <a:bodyPr/>
-                    <a:lstStyle/>
-                    <a:p>
-                      <a:pPr lvl="0" indent="0" marL="0" algn="r">
-                        <a:buNone/>
-                      </a:pPr>
-                      <a:r>
-                        <a:rPr/>
-                        <a:t>4,550</a:t>
-                      </a:r>
-                    </a:p>
-                  </a:txBody>
-                </a:tc>
-                <a:tc>
-                  <a:txBody>
-                    <a:bodyPr/>
-                    <a:lstStyle/>
-                    <a:p>
-                      <a:pPr lvl="0" indent="0" marL="0" algn="r">
-                        <a:buNone/>
-                      </a:pPr>
-                      <a:r>
-                        <a:rPr/>
-                        <a:t>88</a:t>
-                      </a:r>
-                    </a:p>
-                  </a:txBody>
-                </a:tc>
-                <a:tc>
-                  <a:txBody>
-                    <a:bodyPr/>
-                    <a:lstStyle/>
-                    <a:p>
-                      <a:pPr lvl="0" indent="0" marL="0" algn="r">
-                        <a:buNone/>
-                      </a:pPr>
-                      <a:r>
-                        <a:rPr/>
-                        <a:t>1.93</a:t>
-                      </a:r>
-                    </a:p>
-                  </a:txBody>
-                </a:tc>
-              </a:tr>
-            </a:tbl>
-          </a:graphicData>
-        </a:graphic>
-      </p:graphicFrame>
+              <a:t>Ready Set Ford vs Ford Pro weekly indices</a:t>
+            </a:r>
+          </a:p>
+        </p:txBody>
+      </p:sp>
     </p:spTree>
   </p:cSld>
 </p:sld>
@@ -4037,51 +3507,273 @@
           <a:chExt cx="0" cy="0"/>
         </a:xfrm>
       </p:grpSpPr>
-      <p:sp>
-        <p:nvSpPr>
-          <p:cNvPr id="3" name="Content Placeholder 2"/>
-          <p:cNvSpPr>
-            <a:spLocks noGrp="1"/>
-          </p:cNvSpPr>
+      <p:graphicFrame>
+        <p:nvGraphicFramePr>
+          <p:cNvPr id="6" name="Content Placeholder 5"/>
+          <p:cNvGraphicFramePr>
+            <a:graphicFrameLocks noGrp="1"/>
+          </p:cNvGraphicFramePr>
           <p:nvPr>
             <p:ph idx="1"/>
           </p:nvPr>
-        </p:nvSpPr>
-        <p:spPr/>
-        <p:txBody>
-          <a:bodyPr/>
-          <a:lstStyle/>
-          <a:p>
-            <a:pPr lvl="0" indent="0" marL="0">
-              <a:buNone/>
-            </a:pPr>
-            <a:r>
-              <a:rPr i="1"/>
-              <a:t>Sources: </a:t>
-            </a:r>
-            <a:r>
-              <a:rPr i="1">
-                <a:latin typeface="Courier"/>
-              </a:rPr>
-              <a:t>data/external/youtube_metrics.csv</a:t>
-            </a:r>
-            <a:r>
-              <a:rPr i="1"/>
-              <a:t> generated via </a:t>
-            </a:r>
-            <a:r>
-              <a:rPr i="1">
-                <a:latin typeface="Courier"/>
-              </a:rPr>
-              <a:t>scripts/summarize_youtube_metadata.py</a:t>
-            </a:r>
-            <a:r>
-              <a:rPr i="1"/>
-              <a:t>.</a:t>
-            </a:r>
-          </a:p>
-        </p:txBody>
-      </p:sp>
+        </p:nvGraphicFramePr>
+        <p:xfrm>
+          <a:off x="457200" y="1193800"/>
+          <a:ext cx="8229600" cy="3390900"/>
+        </p:xfrm>
+        <a:graphic>
+          <a:graphicData uri="http://schemas.openxmlformats.org/drawingml/2006/table">
+            <a:tbl>
+              <a:tblPr firstRow="1" bandRow="1">
+                <a:tableStyleId>{5C22544A-7EE6-4342-B048-85BDC9FD1C3A}</a:tableStyleId>
+              </a:tblPr>
+              <a:tblGrid>
+                <a:gridCol w="1638300"/>
+                <a:gridCol w="1638300"/>
+                <a:gridCol w="1638300"/>
+                <a:gridCol w="1638300"/>
+                <a:gridCol w="1638300"/>
+              </a:tblGrid>
+              <a:tr h="0">
+                <a:tc>
+                  <a:txBody>
+                    <a:bodyPr/>
+                    <a:lstStyle/>
+                    <a:p>
+                      <a:pPr lvl="0" indent="0" marL="0">
+                        <a:buNone/>
+                      </a:pPr>
+                      <a:r>
+                        <a:rPr/>
+                        <a:t>Term</a:t>
+                      </a:r>
+                    </a:p>
+                  </a:txBody>
+                  <a:tcPr/>
+                </a:tc>
+                <a:tc>
+                  <a:txBody>
+                    <a:bodyPr/>
+                    <a:lstStyle/>
+                    <a:p>
+                      <a:pPr lvl="0" indent="0" marL="0" algn="r">
+                        <a:buNone/>
+                      </a:pPr>
+                      <a:r>
+                        <a:rPr/>
+                        <a:t>Peak Weekly Interest</a:t>
+                      </a:r>
+                    </a:p>
+                  </a:txBody>
+                  <a:tcPr/>
+                </a:tc>
+                <a:tc>
+                  <a:txBody>
+                    <a:bodyPr/>
+                    <a:lstStyle/>
+                    <a:p>
+                      <a:pPr lvl="0" indent="0" marL="0">
+                        <a:buNone/>
+                      </a:pPr>
+                      <a:r>
+                        <a:rPr/>
+                        <a:t>Peak Week</a:t>
+                      </a:r>
+                    </a:p>
+                  </a:txBody>
+                  <a:tcPr/>
+                </a:tc>
+                <a:tc>
+                  <a:txBody>
+                    <a:bodyPr/>
+                    <a:lstStyle/>
+                    <a:p>
+                      <a:pPr lvl="0" indent="0" marL="0" algn="r">
+                        <a:buNone/>
+                      </a:pPr>
+                      <a:r>
+                        <a:rPr/>
+                        <a:t>Trailing 90-Day Avg</a:t>
+                      </a:r>
+                    </a:p>
+                  </a:txBody>
+                  <a:tcPr/>
+                </a:tc>
+                <a:tc>
+                  <a:txBody>
+                    <a:bodyPr/>
+                    <a:lstStyle/>
+                    <a:p>
+                      <a:pPr lvl="0" indent="0" marL="0" algn="r">
+                        <a:buNone/>
+                      </a:pPr>
+                      <a:r>
+                        <a:rPr/>
+                        <a:t>Gap vs. Ford Pro</a:t>
+                      </a:r>
+                    </a:p>
+                  </a:txBody>
+                  <a:tcPr/>
+                </a:tc>
+              </a:tr>
+              <a:tr h="0">
+                <a:tc>
+                  <a:txBody>
+                    <a:bodyPr/>
+                    <a:lstStyle/>
+                    <a:p>
+                      <a:pPr lvl="0" indent="0" marL="0">
+                        <a:buNone/>
+                      </a:pPr>
+                      <a:r>
+                        <a:rPr/>
+                        <a:t>Ready Set Ford</a:t>
+                      </a:r>
+                    </a:p>
+                  </a:txBody>
+                </a:tc>
+                <a:tc>
+                  <a:txBody>
+                    <a:bodyPr/>
+                    <a:lstStyle/>
+                    <a:p>
+                      <a:pPr lvl="0" indent="0" marL="0" algn="r">
+                        <a:buNone/>
+                      </a:pPr>
+                      <a:r>
+                        <a:rPr/>
+                        <a:t>2</a:t>
+                      </a:r>
+                    </a:p>
+                  </a:txBody>
+                </a:tc>
+                <a:tc>
+                  <a:txBody>
+                    <a:bodyPr/>
+                    <a:lstStyle/>
+                    <a:p>
+                      <a:pPr lvl="0" indent="0" marL="0">
+                        <a:buNone/>
+                      </a:pPr>
+                      <a:r>
+                        <a:rPr/>
+                        <a:t>2022-01-02</a:t>
+                      </a:r>
+                    </a:p>
+                  </a:txBody>
+                </a:tc>
+                <a:tc>
+                  <a:txBody>
+                    <a:bodyPr/>
+                    <a:lstStyle/>
+                    <a:p>
+                      <a:pPr lvl="0" indent="0" marL="0" algn="r">
+                        <a:buNone/>
+                      </a:pPr>
+                      <a:r>
+                        <a:rPr/>
+                        <a:t>0.15</a:t>
+                      </a:r>
+                    </a:p>
+                  </a:txBody>
+                </a:tc>
+                <a:tc>
+                  <a:txBody>
+                    <a:bodyPr/>
+                    <a:lstStyle/>
+                    <a:p>
+                      <a:pPr lvl="0" indent="0" marL="0" algn="r">
+                        <a:buNone/>
+                      </a:pPr>
+                      <a:r>
+                        <a:rPr/>
+                        <a:t>-52.9</a:t>
+                      </a:r>
+                    </a:p>
+                  </a:txBody>
+                </a:tc>
+              </a:tr>
+              <a:tr h="0">
+                <a:tc>
+                  <a:txBody>
+                    <a:bodyPr/>
+                    <a:lstStyle/>
+                    <a:p>
+                      <a:pPr lvl="0" indent="0" marL="0">
+                        <a:buNone/>
+                      </a:pPr>
+                      <a:r>
+                        <a:rPr/>
+                        <a:t>Ford Pro</a:t>
+                      </a:r>
+                    </a:p>
+                  </a:txBody>
+                </a:tc>
+                <a:tc>
+                  <a:txBody>
+                    <a:bodyPr/>
+                    <a:lstStyle/>
+                    <a:p>
+                      <a:pPr lvl="0" indent="0" marL="0" algn="r">
+                        <a:buNone/>
+                      </a:pPr>
+                      <a:r>
+                        <a:rPr/>
+                        <a:t>100</a:t>
+                      </a:r>
+                    </a:p>
+                  </a:txBody>
+                </a:tc>
+                <a:tc>
+                  <a:txBody>
+                    <a:bodyPr/>
+                    <a:lstStyle/>
+                    <a:p>
+                      <a:pPr lvl="0" indent="0" marL="0">
+                        <a:buNone/>
+                      </a:pPr>
+                      <a:r>
+                        <a:rPr/>
+                        <a:t>2025-07-27</a:t>
+                      </a:r>
+                    </a:p>
+                  </a:txBody>
+                </a:tc>
+                <a:tc>
+                  <a:txBody>
+                    <a:bodyPr/>
+                    <a:lstStyle/>
+                    <a:p>
+                      <a:pPr lvl="0" indent="0" marL="0" algn="r">
+                        <a:buNone/>
+                      </a:pPr>
+                      <a:r>
+                        <a:rPr/>
+                        <a:t>53.0</a:t>
+                      </a:r>
+                    </a:p>
+                  </a:txBody>
+                </a:tc>
+                <a:tc>
+                  <a:txBody>
+                    <a:bodyPr/>
+                    <a:lstStyle/>
+                    <a:p>
+                      <a:pPr lvl="0" indent="0" marL="0" algn="r">
+                        <a:buNone/>
+                      </a:pPr>
+                      <a:r>
+                        <a:rPr/>
+                        <a:t>–</a:t>
+                      </a:r>
+                    </a:p>
+                  </a:txBody>
+                </a:tc>
+              </a:tr>
+            </a:tbl>
+          </a:graphicData>
+        </a:graphic>
+      </p:graphicFrame>
     </p:spTree>
   </p:cSld>
 </p:sld>
@@ -4106,12 +3798,12 @@
       </p:grpSpPr>
       <p:sp>
         <p:nvSpPr>
-          <p:cNvPr id="2" name="Title 1"/>
-          <p:cNvSpPr>
-            <a:spLocks noGrp="1"/>
-          </p:cNvSpPr>
-          <p:nvPr>
-            <p:ph type="title"/>
+          <p:cNvPr id="3" name="Content Placeholder 2"/>
+          <p:cNvSpPr>
+            <a:spLocks noGrp="1"/>
+          </p:cNvSpPr>
+          <p:nvPr>
+            <p:ph idx="1"/>
           </p:nvPr>
         </p:nvSpPr>
         <p:spPr/>
@@ -4119,283 +3811,57 @@
           <a:bodyPr/>
           <a:lstStyle/>
           <a:p>
+            <a:pPr lvl="0"/>
+            <a:r>
+              <a:rPr/>
+              <a:t>Ready Set Ford searches finally registered measurable activity in September 2025 (index = 1) after a near-zero baseline, signalling early traction as campaign content rolls out.</a:t>
+            </a:r>
+          </a:p>
+          <a:p>
+            <a:pPr lvl="0"/>
+            <a:r>
+              <a:rPr/>
+              <a:t>Ford Pro remains the awareness anchor with a steady ~53 trailing 90-day index; use the contrast to show why Pro proof points must be woven into Ready Set Ford storytelling.</a:t>
+            </a:r>
+          </a:p>
+          <a:p>
+            <a:pPr lvl="0"/>
+            <a:r>
+              <a:rPr/>
+              <a:t>Overlay campaign milestones (video drops, dealer pushes) when presenting to explain spikes and set expectations for post-launch lift.</a:t>
+            </a:r>
+          </a:p>
+          <a:p>
             <a:pPr lvl="0" indent="0" marL="0">
               <a:buNone/>
             </a:pPr>
             <a:r>
-              <a:rPr/>
-              <a:t>Digital Pulse – Google Trends (US)</a:t>
-            </a:r>
-          </a:p>
-        </p:txBody>
-      </p:sp>
-      <p:graphicFrame>
-        <p:nvGraphicFramePr>
-          <p:cNvPr id="6" name="Content Placeholder 5"/>
-          <p:cNvGraphicFramePr>
-            <a:graphicFrameLocks noGrp="1"/>
-          </p:cNvGraphicFramePr>
-          <p:nvPr>
-            <p:ph idx="1"/>
-          </p:nvPr>
-        </p:nvGraphicFramePr>
-        <p:xfrm>
-          <a:off x="457200" y="1193800"/>
-          <a:ext cx="8229600" cy="3390900"/>
-        </p:xfrm>
-        <a:graphic>
-          <a:graphicData uri="http://schemas.openxmlformats.org/drawingml/2006/table">
-            <a:tbl>
-              <a:tblPr firstRow="1" bandRow="1">
-                <a:tableStyleId>{5C22544A-7EE6-4342-B048-85BDC9FD1C3A}</a:tableStyleId>
-              </a:tblPr>
-              <a:tblGrid>
-                <a:gridCol w="1638300"/>
-                <a:gridCol w="1638300"/>
-                <a:gridCol w="1638300"/>
-                <a:gridCol w="1638300"/>
-                <a:gridCol w="1638300"/>
-              </a:tblGrid>
-              <a:tr h="0">
-                <a:tc>
-                  <a:txBody>
-                    <a:bodyPr/>
-                    <a:lstStyle/>
-                    <a:p>
-                      <a:pPr lvl="0" indent="0" marL="0">
-                        <a:buNone/>
-                      </a:pPr>
-                      <a:r>
-                        <a:rPr/>
-                        <a:t>Term</a:t>
-                      </a:r>
-                    </a:p>
-                  </a:txBody>
-                  <a:tcPr/>
-                </a:tc>
-                <a:tc>
-                  <a:txBody>
-                    <a:bodyPr/>
-                    <a:lstStyle/>
-                    <a:p>
-                      <a:pPr lvl="0" indent="0" marL="0" algn="r">
-                        <a:buNone/>
-                      </a:pPr>
-                      <a:r>
-                        <a:rPr/>
-                        <a:t>Peak Weekly Interest</a:t>
-                      </a:r>
-                    </a:p>
-                  </a:txBody>
-                  <a:tcPr/>
-                </a:tc>
-                <a:tc>
-                  <a:txBody>
-                    <a:bodyPr/>
-                    <a:lstStyle/>
-                    <a:p>
-                      <a:pPr lvl="0" indent="0" marL="0">
-                        <a:buNone/>
-                      </a:pPr>
-                      <a:r>
-                        <a:rPr/>
-                        <a:t>Peak Week</a:t>
-                      </a:r>
-                    </a:p>
-                  </a:txBody>
-                  <a:tcPr/>
-                </a:tc>
-                <a:tc>
-                  <a:txBody>
-                    <a:bodyPr/>
-                    <a:lstStyle/>
-                    <a:p>
-                      <a:pPr lvl="0" indent="0" marL="0" algn="r">
-                        <a:buNone/>
-                      </a:pPr>
-                      <a:r>
-                        <a:rPr/>
-                        <a:t>Trailing 90-Day Avg</a:t>
-                      </a:r>
-                    </a:p>
-                  </a:txBody>
-                  <a:tcPr/>
-                </a:tc>
-                <a:tc>
-                  <a:txBody>
-                    <a:bodyPr/>
-                    <a:lstStyle/>
-                    <a:p>
-                      <a:pPr lvl="0" indent="0" marL="0" algn="r">
-                        <a:buNone/>
-                      </a:pPr>
-                      <a:r>
-                        <a:rPr/>
-                        <a:t>Trend vs. Ford Pro</a:t>
-                      </a:r>
-                    </a:p>
-                  </a:txBody>
-                  <a:tcPr/>
-                </a:tc>
-              </a:tr>
-              <a:tr h="0">
-                <a:tc>
-                  <a:txBody>
-                    <a:bodyPr/>
-                    <a:lstStyle/>
-                    <a:p>
-                      <a:pPr lvl="0" indent="0" marL="0">
-                        <a:buNone/>
-                      </a:pPr>
-                      <a:r>
-                        <a:rPr/>
-                        <a:t>Ready Set Ford</a:t>
-                      </a:r>
-                    </a:p>
-                  </a:txBody>
-                </a:tc>
-                <a:tc>
-                  <a:txBody>
-                    <a:bodyPr/>
-                    <a:lstStyle/>
-                    <a:p>
-                      <a:pPr lvl="0" indent="0" marL="0" algn="r">
-                        <a:buNone/>
-                      </a:pPr>
-                      <a:r>
-                        <a:rPr/>
-                        <a:t>2</a:t>
-                      </a:r>
-                    </a:p>
-                  </a:txBody>
-                </a:tc>
-                <a:tc>
-                  <a:txBody>
-                    <a:bodyPr/>
-                    <a:lstStyle/>
-                    <a:p>
-                      <a:pPr lvl="0" indent="0" marL="0">
-                        <a:buNone/>
-                      </a:pPr>
-                      <a:r>
-                        <a:rPr/>
-                        <a:t>2022-01-02</a:t>
-                      </a:r>
-                    </a:p>
-                  </a:txBody>
-                </a:tc>
-                <a:tc>
-                  <a:txBody>
-                    <a:bodyPr/>
-                    <a:lstStyle/>
-                    <a:p>
-                      <a:pPr lvl="0" indent="0" marL="0" algn="r">
-                        <a:buNone/>
-                      </a:pPr>
-                      <a:r>
-                        <a:rPr/>
-                        <a:t>0.2</a:t>
-                      </a:r>
-                    </a:p>
-                  </a:txBody>
-                </a:tc>
-                <a:tc>
-                  <a:txBody>
-                    <a:bodyPr/>
-                    <a:lstStyle/>
-                    <a:p>
-                      <a:pPr lvl="0" indent="0" marL="0" algn="r">
-                        <a:buNone/>
-                      </a:pPr>
-                      <a:r>
-                        <a:rPr/>
-                        <a:t>-53.6</a:t>
-                      </a:r>
-                    </a:p>
-                  </a:txBody>
-                </a:tc>
-              </a:tr>
-              <a:tr h="0">
-                <a:tc>
-                  <a:txBody>
-                    <a:bodyPr/>
-                    <a:lstStyle/>
-                    <a:p>
-                      <a:pPr lvl="0" indent="0" marL="0">
-                        <a:buNone/>
-                      </a:pPr>
-                      <a:r>
-                        <a:rPr/>
-                        <a:t>Ford Pro</a:t>
-                      </a:r>
-                    </a:p>
-                  </a:txBody>
-                </a:tc>
-                <a:tc>
-                  <a:txBody>
-                    <a:bodyPr/>
-                    <a:lstStyle/>
-                    <a:p>
-                      <a:pPr lvl="0" indent="0" marL="0" algn="r">
-                        <a:buNone/>
-                      </a:pPr>
-                      <a:r>
-                        <a:rPr/>
-                        <a:t>100</a:t>
-                      </a:r>
-                    </a:p>
-                  </a:txBody>
-                </a:tc>
-                <a:tc>
-                  <a:txBody>
-                    <a:bodyPr/>
-                    <a:lstStyle/>
-                    <a:p>
-                      <a:pPr lvl="0" indent="0" marL="0">
-                        <a:buNone/>
-                      </a:pPr>
-                      <a:r>
-                        <a:rPr/>
-                        <a:t>2025-07-27</a:t>
-                      </a:r>
-                    </a:p>
-                  </a:txBody>
-                </a:tc>
-                <a:tc>
-                  <a:txBody>
-                    <a:bodyPr/>
-                    <a:lstStyle/>
-                    <a:p>
-                      <a:pPr lvl="0" indent="0" marL="0" algn="r">
-                        <a:buNone/>
-                      </a:pPr>
-                      <a:r>
-                        <a:rPr/>
-                        <a:t>53.8</a:t>
-                      </a:r>
-                    </a:p>
-                  </a:txBody>
-                </a:tc>
-                <a:tc>
-                  <a:txBody>
-                    <a:bodyPr/>
-                    <a:lstStyle/>
-                    <a:p>
-                      <a:pPr lvl="0" indent="0" marL="0" algn="r">
-                        <a:buNone/>
-                      </a:pPr>
-                      <a:r>
-                        <a:rPr/>
-                        <a:t>0.0</a:t>
-                      </a:r>
-                    </a:p>
-                  </a:txBody>
-                </a:tc>
-              </a:tr>
-            </a:tbl>
-          </a:graphicData>
-        </a:graphic>
-      </p:graphicFrame>
+              <a:rPr i="1"/>
+              <a:t>Source: </a:t>
+            </a:r>
+            <a:r>
+              <a:rPr i="1">
+                <a:latin typeface="Courier"/>
+              </a:rPr>
+              <a:t>google_trends_readysetford_us.csv</a:t>
+            </a:r>
+            <a:r>
+              <a:rPr i="1"/>
+              <a:t> generated via </a:t>
+            </a:r>
+            <a:r>
+              <a:rPr i="1">
+                <a:latin typeface="Courier"/>
+              </a:rPr>
+              <a:t>scripts/collect_additional_data.py</a:t>
+            </a:r>
+            <a:r>
+              <a:rPr i="1"/>
+              <a:t> (22 Sep run).</a:t>
+            </a:r>
+          </a:p>
+        </p:txBody>
+      </p:sp>
     </p:spTree>
   </p:cSld>
 </p:sld>
@@ -4420,70 +3886,685 @@
       </p:grpSpPr>
       <p:sp>
         <p:nvSpPr>
-          <p:cNvPr id="3" name="Content Placeholder 2"/>
-          <p:cNvSpPr>
-            <a:spLocks noGrp="1"/>
-          </p:cNvSpPr>
+          <p:cNvPr id="2" name="Title 1"/>
+          <p:cNvSpPr>
+            <a:spLocks noGrp="1"/>
+          </p:cNvSpPr>
+          <p:nvPr>
+            <p:ph type="title"/>
+          </p:nvPr>
+        </p:nvSpPr>
+        <p:spPr>
+          <a:xfrm>
+            <a:off x="457201" y="204787"/>
+            <a:ext cx="3008313" cy="871538"/>
+          </a:xfrm>
+        </p:spPr>
+        <p:txBody>
+          <a:bodyPr/>
+          <a:lstStyle/>
+          <a:p>
+            <a:pPr lvl="0" indent="0" marL="0">
+              <a:buNone/>
+            </a:pPr>
+            <a:r>
+              <a:rPr/>
+              <a:t>Slide – Ready Set Ford Video Performance</a:t>
+            </a:r>
+          </a:p>
+        </p:txBody>
+      </p:sp>
+      <p:sp>
+        <p:nvSpPr>
+          <p:cNvPr id="4" name="Text Placeholder 3"/>
+          <p:cNvSpPr>
+            <a:spLocks noGrp="1"/>
+          </p:cNvSpPr>
+          <p:nvPr>
+            <p:ph idx="2" sz="half" type="body"/>
+          </p:nvPr>
+        </p:nvSpPr>
+        <p:spPr/>
+        <p:txBody>
+          <a:bodyPr/>
+          <a:lstStyle/>
+          <a:p>
+            <a:pPr lvl="0" indent="0" marL="0">
+              <a:spcBef>
+                <a:spcPts val="3000"/>
+              </a:spcBef>
+              <a:buNone/>
+            </a:pPr>
+            <a:r>
+              <a:rPr b="1"/>
+              <a:t>Key Takeaways</a:t>
+            </a:r>
+          </a:p>
+          <a:p>
+            <a:pPr lvl="0"/>
+            <a:r>
+              <a:rPr/>
+              <a:t>Hero spots launched 10 Sep deliver the largest reach; “Ready Set Ford | Ford” leads with 24.5K views and &gt;500 likes.</a:t>
+            </a:r>
+          </a:p>
+          <a:p>
+            <a:pPr lvl="0"/>
+            <a:r>
+              <a:rPr/>
+              <a:t>Short-form and Canada-specific cuts (uploaded 16 Sep) trail in impressions but keep ~2% engagement, indicating consistent resonance.</a:t>
+            </a:r>
+          </a:p>
+          <a:p>
+            <a:pPr lvl="0"/>
+            <a:r>
+              <a:rPr/>
+              <a:t>“To Those Who Can” over-indexes on engagement (4.14%) vs. reach, signaling a potential storytelling asset for targeted placements.</a:t>
+            </a:r>
+          </a:p>
+          <a:p>
+            <a:pPr lvl="0" indent="0" marL="0">
+              <a:spcBef>
+                <a:spcPts val="3000"/>
+              </a:spcBef>
+              <a:buNone/>
+            </a:pPr>
+            <a:r>
+              <a:rPr b="1"/>
+              <a:t>Metrics Snapshot (YouTube, refreshed 19 Sep 2025)</a:t>
+            </a:r>
+          </a:p>
+        </p:txBody>
+      </p:sp>
+      <p:graphicFrame>
+        <p:nvGraphicFramePr>
+          <p:cNvPr id="6" name="Content Placeholder 5"/>
+          <p:cNvGraphicFramePr>
+            <a:graphicFrameLocks noGrp="1"/>
+          </p:cNvGraphicFramePr>
           <p:nvPr>
             <p:ph idx="1"/>
           </p:nvPr>
-        </p:nvSpPr>
-        <p:spPr/>
-        <p:txBody>
-          <a:bodyPr/>
-          <a:lstStyle/>
-          <a:p>
-            <a:pPr lvl="0"/>
-            <a:r>
-              <a:rPr/>
-              <a:t>Ready Set Ford searches peaked the week of 2022-01-02 with an index of 2.</a:t>
-            </a:r>
-          </a:p>
-          <a:p>
-            <a:pPr lvl="0"/>
-            <a:r>
-              <a:rPr/>
-              <a:t>Over the past 90 days (ending 2025-09-14), Ready Set Ford averaged 0.2 vs. Ford Pro at 53.8 (delta -53.6).</a:t>
-            </a:r>
-          </a:p>
-          <a:p>
-            <a:pPr lvl="0"/>
-            <a:r>
-              <a:rPr/>
-              <a:t>Use this slide alongside campaign milestones to explain spikes tied to video drops or press coverage.</a:t>
-            </a:r>
-          </a:p>
-          <a:p>
-            <a:pPr lvl="0" indent="0" marL="0">
-              <a:buNone/>
-            </a:pPr>
-            <a:r>
-              <a:rPr i="1"/>
-              <a:t>Source: </a:t>
-            </a:r>
-            <a:r>
-              <a:rPr i="1">
-                <a:latin typeface="Courier"/>
-              </a:rPr>
-              <a:t>google_trends_readysetford_us.csv</a:t>
-            </a:r>
-            <a:r>
-              <a:rPr i="1"/>
-              <a:t> generated via </a:t>
-            </a:r>
-            <a:r>
-              <a:rPr i="1">
-                <a:latin typeface="Courier"/>
-              </a:rPr>
-              <a:t>scripts/collect_additional_data.py</a:t>
-            </a:r>
-            <a:r>
-              <a:rPr i="1"/>
-              <a:t>.</a:t>
-            </a:r>
-          </a:p>
-        </p:txBody>
-      </p:sp>
+        </p:nvGraphicFramePr>
+        <p:xfrm>
+          <a:off x="3568700" y="203200"/>
+          <a:ext cx="5105400" cy="4381500"/>
+        </p:xfrm>
+        <a:graphic>
+          <a:graphicData uri="http://schemas.openxmlformats.org/drawingml/2006/table">
+            <a:tbl>
+              <a:tblPr firstRow="1" bandRow="1">
+                <a:tableStyleId>{5C22544A-7EE6-4342-B048-85BDC9FD1C3A}</a:tableStyleId>
+              </a:tblPr>
+              <a:tblGrid>
+                <a:gridCol w="850900"/>
+                <a:gridCol w="850900"/>
+                <a:gridCol w="850900"/>
+                <a:gridCol w="850900"/>
+                <a:gridCol w="850900"/>
+                <a:gridCol w="850900"/>
+              </a:tblGrid>
+              <a:tr h="0">
+                <a:tc>
+                  <a:txBody>
+                    <a:bodyPr/>
+                    <a:lstStyle/>
+                    <a:p>
+                      <a:pPr lvl="0" indent="0" marL="0">
+                        <a:buNone/>
+                      </a:pPr>
+                      <a:r>
+                        <a:rPr/>
+                        <a:t>Video</a:t>
+                      </a:r>
+                    </a:p>
+                  </a:txBody>
+                  <a:tcPr/>
+                </a:tc>
+                <a:tc>
+                  <a:txBody>
+                    <a:bodyPr/>
+                    <a:lstStyle/>
+                    <a:p>
+                      <a:pPr lvl="0" indent="0" marL="0">
+                        <a:buNone/>
+                      </a:pPr>
+                      <a:r>
+                        <a:rPr/>
+                        <a:t>Upload (UTC)</a:t>
+                      </a:r>
+                    </a:p>
+                  </a:txBody>
+                  <a:tcPr/>
+                </a:tc>
+                <a:tc>
+                  <a:txBody>
+                    <a:bodyPr/>
+                    <a:lstStyle/>
+                    <a:p>
+                      <a:pPr lvl="0" indent="0" marL="0">
+                        <a:buNone/>
+                      </a:pPr>
+                      <a:r>
+                        <a:rPr/>
+                        <a:t>Duration</a:t>
+                      </a:r>
+                    </a:p>
+                  </a:txBody>
+                  <a:tcPr/>
+                </a:tc>
+                <a:tc>
+                  <a:txBody>
+                    <a:bodyPr/>
+                    <a:lstStyle/>
+                    <a:p>
+                      <a:pPr lvl="0" indent="0" marL="0" algn="r">
+                        <a:buNone/>
+                      </a:pPr>
+                      <a:r>
+                        <a:rPr/>
+                        <a:t>Views</a:t>
+                      </a:r>
+                    </a:p>
+                  </a:txBody>
+                  <a:tcPr/>
+                </a:tc>
+                <a:tc>
+                  <a:txBody>
+                    <a:bodyPr/>
+                    <a:lstStyle/>
+                    <a:p>
+                      <a:pPr lvl="0" indent="0" marL="0" algn="r">
+                        <a:buNone/>
+                      </a:pPr>
+                      <a:r>
+                        <a:rPr/>
+                        <a:t>Likes</a:t>
+                      </a:r>
+                    </a:p>
+                  </a:txBody>
+                  <a:tcPr/>
+                </a:tc>
+                <a:tc>
+                  <a:txBody>
+                    <a:bodyPr/>
+                    <a:lstStyle/>
+                    <a:p>
+                      <a:pPr lvl="0" indent="0" marL="0" algn="r">
+                        <a:buNone/>
+                      </a:pPr>
+                      <a:r>
+                        <a:rPr/>
+                        <a:t>Engagement %</a:t>
+                      </a:r>
+                    </a:p>
+                  </a:txBody>
+                  <a:tcPr/>
+                </a:tc>
+              </a:tr>
+              <a:tr h="0">
+                <a:tc>
+                  <a:txBody>
+                    <a:bodyPr/>
+                    <a:lstStyle/>
+                    <a:p>
+                      <a:pPr lvl="0" indent="0" marL="0">
+                        <a:buNone/>
+                      </a:pPr>
+                      <a:r>
+                        <a:rPr/>
+                        <a:t>Ready Set Ford | Ford</a:t>
+                      </a:r>
+                    </a:p>
+                  </a:txBody>
+                </a:tc>
+                <a:tc>
+                  <a:txBody>
+                    <a:bodyPr/>
+                    <a:lstStyle/>
+                    <a:p>
+                      <a:pPr lvl="0" indent="0" marL="0">
+                        <a:buNone/>
+                      </a:pPr>
+                      <a:r>
+                        <a:rPr/>
+                        <a:t>2025-09-10</a:t>
+                      </a:r>
+                    </a:p>
+                  </a:txBody>
+                </a:tc>
+                <a:tc>
+                  <a:txBody>
+                    <a:bodyPr/>
+                    <a:lstStyle/>
+                    <a:p>
+                      <a:pPr lvl="0" indent="0" marL="0">
+                        <a:buNone/>
+                      </a:pPr>
+                      <a:r>
+                        <a:rPr/>
+                        <a:t>60s</a:t>
+                      </a:r>
+                    </a:p>
+                  </a:txBody>
+                </a:tc>
+                <a:tc>
+                  <a:txBody>
+                    <a:bodyPr/>
+                    <a:lstStyle/>
+                    <a:p>
+                      <a:pPr lvl="0" indent="0" marL="0" algn="r">
+                        <a:buNone/>
+                      </a:pPr>
+                      <a:r>
+                        <a:rPr/>
+                        <a:t>24,549</a:t>
+                      </a:r>
+                    </a:p>
+                  </a:txBody>
+                </a:tc>
+                <a:tc>
+                  <a:txBody>
+                    <a:bodyPr/>
+                    <a:lstStyle/>
+                    <a:p>
+                      <a:pPr lvl="0" indent="0" marL="0" algn="r">
+                        <a:buNone/>
+                      </a:pPr>
+                      <a:r>
+                        <a:rPr/>
+                        <a:t>503</a:t>
+                      </a:r>
+                    </a:p>
+                  </a:txBody>
+                </a:tc>
+                <a:tc>
+                  <a:txBody>
+                    <a:bodyPr/>
+                    <a:lstStyle/>
+                    <a:p>
+                      <a:pPr lvl="0" indent="0" marL="0" algn="r">
+                        <a:buNone/>
+                      </a:pPr>
+                      <a:r>
+                        <a:rPr/>
+                        <a:t>2.05</a:t>
+                      </a:r>
+                    </a:p>
+                  </a:txBody>
+                </a:tc>
+              </a:tr>
+              <a:tr h="0">
+                <a:tc>
+                  <a:txBody>
+                    <a:bodyPr/>
+                    <a:lstStyle/>
+                    <a:p>
+                      <a:pPr lvl="0" indent="0" marL="0">
+                        <a:buNone/>
+                      </a:pPr>
+                      <a:r>
+                        <a:rPr/>
+                        <a:t>Ready Set Ford™ (Canada)</a:t>
+                      </a:r>
+                    </a:p>
+                  </a:txBody>
+                </a:tc>
+                <a:tc>
+                  <a:txBody>
+                    <a:bodyPr/>
+                    <a:lstStyle/>
+                    <a:p>
+                      <a:pPr lvl="0" indent="0" marL="0">
+                        <a:buNone/>
+                      </a:pPr>
+                      <a:r>
+                        <a:rPr/>
+                        <a:t>2025-09-16</a:t>
+                      </a:r>
+                    </a:p>
+                  </a:txBody>
+                </a:tc>
+                <a:tc>
+                  <a:txBody>
+                    <a:bodyPr/>
+                    <a:lstStyle/>
+                    <a:p>
+                      <a:pPr lvl="0" indent="0" marL="0">
+                        <a:buNone/>
+                      </a:pPr>
+                      <a:r>
+                        <a:rPr/>
+                        <a:t>60s</a:t>
+                      </a:r>
+                    </a:p>
+                  </a:txBody>
+                </a:tc>
+                <a:tc>
+                  <a:txBody>
+                    <a:bodyPr/>
+                    <a:lstStyle/>
+                    <a:p>
+                      <a:pPr lvl="0" indent="0" marL="0" algn="r">
+                        <a:buNone/>
+                      </a:pPr>
+                      <a:r>
+                        <a:rPr/>
+                        <a:t>611</a:t>
+                      </a:r>
+                    </a:p>
+                  </a:txBody>
+                </a:tc>
+                <a:tc>
+                  <a:txBody>
+                    <a:bodyPr/>
+                    <a:lstStyle/>
+                    <a:p>
+                      <a:pPr lvl="0" indent="0" marL="0" algn="r">
+                        <a:buNone/>
+                      </a:pPr>
+                      <a:r>
+                        <a:rPr/>
+                        <a:t>13</a:t>
+                      </a:r>
+                    </a:p>
+                  </a:txBody>
+                </a:tc>
+                <a:tc>
+                  <a:txBody>
+                    <a:bodyPr/>
+                    <a:lstStyle/>
+                    <a:p>
+                      <a:pPr lvl="0" indent="0" marL="0" algn="r">
+                        <a:buNone/>
+                      </a:pPr>
+                      <a:r>
+                        <a:rPr/>
+                        <a:t>2.13</a:t>
+                      </a:r>
+                    </a:p>
+                  </a:txBody>
+                </a:tc>
+              </a:tr>
+              <a:tr h="0">
+                <a:tc>
+                  <a:txBody>
+                    <a:bodyPr/>
+                    <a:lstStyle/>
+                    <a:p>
+                      <a:pPr lvl="0" indent="0" marL="0">
+                        <a:buNone/>
+                      </a:pPr>
+                      <a:r>
+                        <a:rPr/>
+                        <a:t>To Those Who Can | Ford</a:t>
+                      </a:r>
+                    </a:p>
+                  </a:txBody>
+                </a:tc>
+                <a:tc>
+                  <a:txBody>
+                    <a:bodyPr/>
+                    <a:lstStyle/>
+                    <a:p>
+                      <a:pPr lvl="0" indent="0" marL="0">
+                        <a:buNone/>
+                      </a:pPr>
+                      <a:r>
+                        <a:rPr/>
+                        <a:t>2025-09-10</a:t>
+                      </a:r>
+                    </a:p>
+                  </a:txBody>
+                </a:tc>
+                <a:tc>
+                  <a:txBody>
+                    <a:bodyPr/>
+                    <a:lstStyle/>
+                    <a:p>
+                      <a:pPr lvl="0" indent="0" marL="0">
+                        <a:buNone/>
+                      </a:pPr>
+                      <a:r>
+                        <a:rPr/>
+                        <a:t>30s</a:t>
+                      </a:r>
+                    </a:p>
+                  </a:txBody>
+                </a:tc>
+                <a:tc>
+                  <a:txBody>
+                    <a:bodyPr/>
+                    <a:lstStyle/>
+                    <a:p>
+                      <a:pPr lvl="0" indent="0" marL="0" algn="r">
+                        <a:buNone/>
+                      </a:pPr>
+                      <a:r>
+                        <a:rPr/>
+                        <a:t>3,626</a:t>
+                      </a:r>
+                    </a:p>
+                  </a:txBody>
+                </a:tc>
+                <a:tc>
+                  <a:txBody>
+                    <a:bodyPr/>
+                    <a:lstStyle/>
+                    <a:p>
+                      <a:pPr lvl="0" indent="0" marL="0" algn="r">
+                        <a:buNone/>
+                      </a:pPr>
+                      <a:r>
+                        <a:rPr/>
+                        <a:t>150</a:t>
+                      </a:r>
+                    </a:p>
+                  </a:txBody>
+                </a:tc>
+                <a:tc>
+                  <a:txBody>
+                    <a:bodyPr/>
+                    <a:lstStyle/>
+                    <a:p>
+                      <a:pPr lvl="0" indent="0" marL="0" algn="r">
+                        <a:buNone/>
+                      </a:pPr>
+                      <a:r>
+                        <a:rPr/>
+                        <a:t>4.14</a:t>
+                      </a:r>
+                    </a:p>
+                  </a:txBody>
+                </a:tc>
+              </a:tr>
+              <a:tr h="0">
+                <a:tc>
+                  <a:txBody>
+                    <a:bodyPr/>
+                    <a:lstStyle/>
+                    <a:p>
+                      <a:pPr lvl="0" indent="0" marL="0">
+                        <a:buNone/>
+                      </a:pPr>
+                      <a:r>
+                        <a:rPr/>
+                        <a:t>Ready Set Ford™ (Shorts)</a:t>
+                      </a:r>
+                    </a:p>
+                  </a:txBody>
+                </a:tc>
+                <a:tc>
+                  <a:txBody>
+                    <a:bodyPr/>
+                    <a:lstStyle/>
+                    <a:p>
+                      <a:pPr lvl="0" indent="0" marL="0">
+                        <a:buNone/>
+                      </a:pPr>
+                      <a:r>
+                        <a:rPr/>
+                        <a:t>2025-09-16</a:t>
+                      </a:r>
+                    </a:p>
+                  </a:txBody>
+                </a:tc>
+                <a:tc>
+                  <a:txBody>
+                    <a:bodyPr/>
+                    <a:lstStyle/>
+                    <a:p>
+                      <a:pPr lvl="0" indent="0" marL="0">
+                        <a:buNone/>
+                      </a:pPr>
+                      <a:r>
+                        <a:rPr/>
+                        <a:t>60s</a:t>
+                      </a:r>
+                    </a:p>
+                  </a:txBody>
+                </a:tc>
+                <a:tc>
+                  <a:txBody>
+                    <a:bodyPr/>
+                    <a:lstStyle/>
+                    <a:p>
+                      <a:pPr lvl="0" indent="0" marL="0" algn="r">
+                        <a:buNone/>
+                      </a:pPr>
+                      <a:r>
+                        <a:rPr/>
+                        <a:t>603</a:t>
+                      </a:r>
+                    </a:p>
+                  </a:txBody>
+                </a:tc>
+                <a:tc>
+                  <a:txBody>
+                    <a:bodyPr/>
+                    <a:lstStyle/>
+                    <a:p>
+                      <a:pPr lvl="0" indent="0" marL="0" algn="r">
+                        <a:buNone/>
+                      </a:pPr>
+                      <a:r>
+                        <a:rPr/>
+                        <a:t>12</a:t>
+                      </a:r>
+                    </a:p>
+                  </a:txBody>
+                </a:tc>
+                <a:tc>
+                  <a:txBody>
+                    <a:bodyPr/>
+                    <a:lstStyle/>
+                    <a:p>
+                      <a:pPr lvl="0" indent="0" marL="0" algn="r">
+                        <a:buNone/>
+                      </a:pPr>
+                      <a:r>
+                        <a:rPr/>
+                        <a:t>1.99</a:t>
+                      </a:r>
+                    </a:p>
+                  </a:txBody>
+                </a:tc>
+              </a:tr>
+              <a:tr h="0">
+                <a:tc>
+                  <a:txBody>
+                    <a:bodyPr/>
+                    <a:lstStyle/>
+                    <a:p>
+                      <a:pPr lvl="0" indent="0" marL="0">
+                        <a:buNone/>
+                      </a:pPr>
+                      <a:r>
+                        <a:rPr/>
+                        <a:t>Up to the Task | Ford</a:t>
+                      </a:r>
+                    </a:p>
+                  </a:txBody>
+                </a:tc>
+                <a:tc>
+                  <a:txBody>
+                    <a:bodyPr/>
+                    <a:lstStyle/>
+                    <a:p>
+                      <a:pPr lvl="0" indent="0" marL="0">
+                        <a:buNone/>
+                      </a:pPr>
+                      <a:r>
+                        <a:rPr/>
+                        <a:t>2025-09-10</a:t>
+                      </a:r>
+                    </a:p>
+                  </a:txBody>
+                </a:tc>
+                <a:tc>
+                  <a:txBody>
+                    <a:bodyPr/>
+                    <a:lstStyle/>
+                    <a:p>
+                      <a:pPr lvl="0" indent="0" marL="0">
+                        <a:buNone/>
+                      </a:pPr>
+                      <a:r>
+                        <a:rPr/>
+                        <a:t>15s</a:t>
+                      </a:r>
+                    </a:p>
+                  </a:txBody>
+                </a:tc>
+                <a:tc>
+                  <a:txBody>
+                    <a:bodyPr/>
+                    <a:lstStyle/>
+                    <a:p>
+                      <a:pPr lvl="0" indent="0" marL="0" algn="r">
+                        <a:buNone/>
+                      </a:pPr>
+                      <a:r>
+                        <a:rPr/>
+                        <a:t>4,550</a:t>
+                      </a:r>
+                    </a:p>
+                  </a:txBody>
+                </a:tc>
+                <a:tc>
+                  <a:txBody>
+                    <a:bodyPr/>
+                    <a:lstStyle/>
+                    <a:p>
+                      <a:pPr lvl="0" indent="0" marL="0" algn="r">
+                        <a:buNone/>
+                      </a:pPr>
+                      <a:r>
+                        <a:rPr/>
+                        <a:t>88</a:t>
+                      </a:r>
+                    </a:p>
+                  </a:txBody>
+                </a:tc>
+                <a:tc>
+                  <a:txBody>
+                    <a:bodyPr/>
+                    <a:lstStyle/>
+                    <a:p>
+                      <a:pPr lvl="0" indent="0" marL="0" algn="r">
+                        <a:buNone/>
+                      </a:pPr>
+                      <a:r>
+                        <a:rPr/>
+                        <a:t>1.93</a:t>
+                      </a:r>
+                    </a:p>
+                  </a:txBody>
+                </a:tc>
+              </a:tr>
+            </a:tbl>
+          </a:graphicData>
+        </a:graphic>
+      </p:graphicFrame>
     </p:spTree>
   </p:cSld>
 </p:sld>
@@ -4508,20 +4589,15 @@
       </p:grpSpPr>
       <p:sp>
         <p:nvSpPr>
-          <p:cNvPr id="2" name="Title 1"/>
-          <p:cNvSpPr>
-            <a:spLocks noGrp="1"/>
-          </p:cNvSpPr>
-          <p:nvPr>
-            <p:ph type="title"/>
-          </p:nvPr>
-        </p:nvSpPr>
-        <p:spPr>
-          <a:xfrm>
-            <a:off x="457201" y="204787"/>
-            <a:ext cx="3008313" cy="871538"/>
-          </a:xfrm>
-        </p:spPr>
+          <p:cNvPr id="3" name="Content Placeholder 2"/>
+          <p:cNvSpPr>
+            <a:spLocks noGrp="1"/>
+          </p:cNvSpPr>
+          <p:nvPr>
+            <p:ph idx="1"/>
+          </p:nvPr>
+        </p:nvSpPr>
+        <p:spPr/>
         <p:txBody>
           <a:bodyPr/>
           <a:lstStyle/>
@@ -4530,171 +4606,32 @@
               <a:buNone/>
             </a:pPr>
             <a:r>
-              <a:rPr/>
-              <a:t>Digital Pulse – Twitter Listening (Ready Set Ford)</a:t>
-            </a:r>
-          </a:p>
-        </p:txBody>
-      </p:sp>
-      <p:sp>
-        <p:nvSpPr>
-          <p:cNvPr id="4" name="Text Placeholder 3"/>
-          <p:cNvSpPr>
-            <a:spLocks noGrp="1"/>
-          </p:cNvSpPr>
-          <p:nvPr>
-            <p:ph idx="2" sz="half" type="body"/>
-          </p:nvPr>
-        </p:nvSpPr>
-        <p:spPr/>
-        <p:txBody>
-          <a:bodyPr/>
-          <a:lstStyle/>
-          <a:p>
-            <a:pPr lvl="0" indent="0" marL="0">
-              <a:buNone/>
-            </a:pPr>
-            <a:r>
-              <a:rPr/>
-              <a:t>Total captured tweets: </a:t>
-            </a:r>
-            <a:r>
-              <a:rPr b="1"/>
-              <a:t>1</a:t>
-            </a:r>
-            <a:r>
-              <a:rPr/>
-              <a:t> (limit 200, 6-day window).</a:t>
-            </a:r>
-          </a:p>
-        </p:txBody>
-      </p:sp>
-      <p:graphicFrame>
-        <p:nvGraphicFramePr>
-          <p:cNvPr id="6" name="Content Placeholder 5"/>
-          <p:cNvGraphicFramePr>
-            <a:graphicFrameLocks noGrp="1"/>
-          </p:cNvGraphicFramePr>
-          <p:nvPr>
-            <p:ph idx="1"/>
-          </p:nvPr>
-        </p:nvGraphicFramePr>
-        <p:xfrm>
-          <a:off x="3568700" y="203200"/>
-          <a:ext cx="5105400" cy="4381500"/>
-        </p:xfrm>
-        <a:graphic>
-          <a:graphicData uri="http://schemas.openxmlformats.org/drawingml/2006/table">
-            <a:tbl>
-              <a:tblPr firstRow="1" bandRow="1">
-                <a:tableStyleId>{5C22544A-7EE6-4342-B048-85BDC9FD1C3A}</a:tableStyleId>
-              </a:tblPr>
-              <a:tblGrid>
-                <a:gridCol w="1701800"/>
-                <a:gridCol w="1701800"/>
-                <a:gridCol w="1701800"/>
-              </a:tblGrid>
-              <a:tr h="0">
-                <a:tc>
-                  <a:txBody>
-                    <a:bodyPr/>
-                    <a:lstStyle/>
-                    <a:p>
-                      <a:pPr lvl="0" indent="0" marL="0" algn="r">
-                        <a:buNone/>
-                      </a:pPr>
-                      <a:r>
-                        <a:rPr/>
-                        <a:t>Rank</a:t>
-                      </a:r>
-                    </a:p>
-                  </a:txBody>
-                  <a:tcPr/>
-                </a:tc>
-                <a:tc>
-                  <a:txBody>
-                    <a:bodyPr/>
-                    <a:lstStyle/>
-                    <a:p>
-                      <a:pPr lvl="0" indent="0" marL="0">
-                        <a:buNone/>
-                      </a:pPr>
-                      <a:r>
-                        <a:rPr/>
-                        <a:t>Hashtag</a:t>
-                      </a:r>
-                    </a:p>
-                  </a:txBody>
-                  <a:tcPr/>
-                </a:tc>
-                <a:tc>
-                  <a:txBody>
-                    <a:bodyPr/>
-                    <a:lstStyle/>
-                    <a:p>
-                      <a:pPr lvl="0" indent="0" marL="0" algn="r">
-                        <a:buNone/>
-                      </a:pPr>
-                      <a:r>
-                        <a:rPr/>
-                        <a:t>Mentions</a:t>
-                      </a:r>
-                    </a:p>
-                  </a:txBody>
-                  <a:tcPr/>
-                </a:tc>
-              </a:tr>
-              <a:tr h="0">
-                <a:tc>
-                  <a:txBody>
-                    <a:bodyPr/>
-                    <a:lstStyle/>
-                    <a:p>
-                      <a:pPr lvl="0" indent="0" marL="0" algn="r">
-                        <a:buNone/>
-                      </a:pPr>
-                      <a:r>
-                        <a:rPr/>
-                        <a:t>-</a:t>
-                      </a:r>
-                    </a:p>
-                  </a:txBody>
-                </a:tc>
-                <a:tc>
-                  <a:txBody>
-                    <a:bodyPr/>
-                    <a:lstStyle/>
-                    <a:p>
-                      <a:pPr lvl="0" indent="0" marL="0">
-                        <a:buNone/>
-                      </a:pPr>
-                      <a:r>
-                        <a:rPr/>
-                        <a:t>(no hashtags captured)</a:t>
-                      </a:r>
-                    </a:p>
-                  </a:txBody>
-                </a:tc>
-                <a:tc>
-                  <a:txBody>
-                    <a:bodyPr/>
-                    <a:lstStyle/>
-                    <a:p>
-                      <a:pPr lvl="0" indent="0" marL="0" algn="r">
-                        <a:buNone/>
-                      </a:pPr>
-                      <a:r>
-                        <a:rPr/>
-                        <a:t>-</a:t>
-                      </a:r>
-                    </a:p>
-                  </a:txBody>
-                </a:tc>
-              </a:tr>
-            </a:tbl>
-          </a:graphicData>
-        </a:graphic>
-      </p:graphicFrame>
+              <a:rPr i="1"/>
+              <a:t>Sources: </a:t>
+            </a:r>
+            <a:r>
+              <a:rPr i="1">
+                <a:latin typeface="Courier"/>
+              </a:rPr>
+              <a:t>data/external/youtube_metrics.csv</a:t>
+            </a:r>
+            <a:r>
+              <a:rPr i="1"/>
+              <a:t> generated via </a:t>
+            </a:r>
+            <a:r>
+              <a:rPr i="1">
+                <a:latin typeface="Courier"/>
+              </a:rPr>
+              <a:t>scripts/summarize_youtube_metadata.py</a:t>
+            </a:r>
+            <a:r>
+              <a:rPr i="1"/>
+              <a:t>.</a:t>
+            </a:r>
+          </a:p>
+        </p:txBody>
+      </p:sp>
     </p:spTree>
   </p:cSld>
 </p:sld>
@@ -4719,6 +4656,482 @@
       </p:grpSpPr>
       <p:sp>
         <p:nvSpPr>
+          <p:cNvPr id="2" name="Title 1"/>
+          <p:cNvSpPr>
+            <a:spLocks noGrp="1"/>
+          </p:cNvSpPr>
+          <p:nvPr>
+            <p:ph type="title"/>
+          </p:nvPr>
+        </p:nvSpPr>
+        <p:spPr/>
+        <p:txBody>
+          <a:bodyPr/>
+          <a:lstStyle/>
+          <a:p>
+            <a:pPr lvl="0" indent="0" marL="0">
+              <a:buNone/>
+            </a:pPr>
+            <a:r>
+              <a:rPr/>
+              <a:t>Digital Pulse – Twitter Listening (Ready Set Ford)</a:t>
+            </a:r>
+          </a:p>
+        </p:txBody>
+      </p:sp>
+      <p:pic>
+        <p:nvPicPr>
+          <p:cNvPr descr="fig:  visuals/twitter_readysetford_top_hashtags.png" id="0" name="Picture 1"/>
+          <p:cNvPicPr>
+            <a:picLocks noGrp="1" noChangeAspect="1"/>
+          </p:cNvPicPr>
+          <p:nvPr/>
+        </p:nvPicPr>
+        <p:blipFill>
+          <a:blip r:embed="rId2"/>
+          <a:stretch>
+            <a:fillRect/>
+          </a:stretch>
+        </p:blipFill>
+        <p:spPr bwMode="auto">
+          <a:xfrm>
+            <a:off x="2413000" y="1193800"/>
+            <a:ext cx="4318000" cy="2882900"/>
+          </a:xfrm>
+          <a:prstGeom prst="rect">
+            <a:avLst/>
+          </a:prstGeom>
+          <a:noFill/>
+          <a:ln w="9525">
+            <a:noFill/>
+            <a:headEnd/>
+            <a:tailEnd/>
+          </a:ln>
+        </p:spPr>
+      </p:pic>
+      <p:sp>
+        <p:nvSpPr>
+          <p:cNvPr id="1" name="TextBox 3"/>
+          <p:cNvSpPr txBox="1"/>
+          <p:nvPr/>
+        </p:nvSpPr>
+        <p:spPr>
+          <a:xfrm>
+            <a:off x="457200" y="4076700"/>
+            <a:ext cx="8229600" cy="508000"/>
+          </a:xfrm>
+          <a:prstGeom prst="rect">
+            <a:avLst/>
+          </a:prstGeom>
+          <a:noFill/>
+        </p:spPr>
+        <p:txBody>
+          <a:bodyPr/>
+          <a:lstStyle/>
+          <a:p>
+            <a:pPr lvl="0" indent="0" marL="0" algn="ctr">
+              <a:buNone/>
+            </a:pPr>
+            <a:r>
+              <a:rPr/>
+              <a:t>Top Ready Set Ford hashtags</a:t>
+            </a:r>
+          </a:p>
+        </p:txBody>
+      </p:sp>
+    </p:spTree>
+  </p:cSld>
+</p:sld>
+</file>
+
+<file path=ppt/slides/slide8.xml><?xml version="1.0" encoding="utf-8"?>
+<p:sld xmlns:a="http://schemas.openxmlformats.org/drawingml/2006/main" xmlns:r="http://schemas.openxmlformats.org/officeDocument/2006/relationships" xmlns:p="http://schemas.openxmlformats.org/presentationml/2006/main">
+  <p:cSld>
+    <p:spTree>
+      <p:nvGrpSpPr>
+        <p:cNvPr id="1" name=""/>
+        <p:cNvGrpSpPr/>
+        <p:nvPr/>
+      </p:nvGrpSpPr>
+      <p:grpSpPr>
+        <a:xfrm>
+          <a:off x="0" y="0"/>
+          <a:ext cx="0" cy="0"/>
+          <a:chOff x="0" y="0"/>
+          <a:chExt cx="0" cy="0"/>
+        </a:xfrm>
+      </p:grpSpPr>
+      <p:sp>
+        <p:nvSpPr>
+          <p:cNvPr id="4" name="Text Placeholder 3"/>
+          <p:cNvSpPr>
+            <a:spLocks noGrp="1"/>
+          </p:cNvSpPr>
+          <p:nvPr>
+            <p:ph idx="2" sz="half" type="body"/>
+          </p:nvPr>
+        </p:nvSpPr>
+        <p:spPr/>
+        <p:txBody>
+          <a:bodyPr/>
+          <a:lstStyle/>
+          <a:p>
+            <a:pPr lvl="0" indent="0" marL="0">
+              <a:buNone/>
+            </a:pPr>
+            <a:r>
+              <a:rPr/>
+              <a:t>Total captured tweets: </a:t>
+            </a:r>
+            <a:r>
+              <a:rPr b="1"/>
+              <a:t>25</a:t>
+            </a:r>
+            <a:r>
+              <a:rPr/>
+              <a:t> (limit 200, 6-day window).</a:t>
+            </a:r>
+          </a:p>
+        </p:txBody>
+      </p:sp>
+      <p:graphicFrame>
+        <p:nvGraphicFramePr>
+          <p:cNvPr id="6" name="Content Placeholder 5"/>
+          <p:cNvGraphicFramePr>
+            <a:graphicFrameLocks noGrp="1"/>
+          </p:cNvGraphicFramePr>
+          <p:nvPr>
+            <p:ph idx="1"/>
+          </p:nvPr>
+        </p:nvGraphicFramePr>
+        <p:xfrm>
+          <a:off x="3568700" y="203200"/>
+          <a:ext cx="5105400" cy="4381500"/>
+        </p:xfrm>
+        <a:graphic>
+          <a:graphicData uri="http://schemas.openxmlformats.org/drawingml/2006/table">
+            <a:tbl>
+              <a:tblPr firstRow="1" bandRow="1">
+                <a:tableStyleId>{5C22544A-7EE6-4342-B048-85BDC9FD1C3A}</a:tableStyleId>
+              </a:tblPr>
+              <a:tblGrid>
+                <a:gridCol w="1701800"/>
+                <a:gridCol w="1701800"/>
+                <a:gridCol w="1701800"/>
+              </a:tblGrid>
+              <a:tr h="0">
+                <a:tc>
+                  <a:txBody>
+                    <a:bodyPr/>
+                    <a:lstStyle/>
+                    <a:p>
+                      <a:pPr lvl="0" indent="0" marL="0" algn="r">
+                        <a:buNone/>
+                      </a:pPr>
+                      <a:r>
+                        <a:rPr/>
+                        <a:t>Rank</a:t>
+                      </a:r>
+                    </a:p>
+                  </a:txBody>
+                  <a:tcPr/>
+                </a:tc>
+                <a:tc>
+                  <a:txBody>
+                    <a:bodyPr/>
+                    <a:lstStyle/>
+                    <a:p>
+                      <a:pPr lvl="0" indent="0" marL="0">
+                        <a:buNone/>
+                      </a:pPr>
+                      <a:r>
+                        <a:rPr/>
+                        <a:t>Hashtag</a:t>
+                      </a:r>
+                    </a:p>
+                  </a:txBody>
+                  <a:tcPr/>
+                </a:tc>
+                <a:tc>
+                  <a:txBody>
+                    <a:bodyPr/>
+                    <a:lstStyle/>
+                    <a:p>
+                      <a:pPr lvl="0" indent="0" marL="0" algn="r">
+                        <a:buNone/>
+                      </a:pPr>
+                      <a:r>
+                        <a:rPr/>
+                        <a:t>Mentions</a:t>
+                      </a:r>
+                    </a:p>
+                  </a:txBody>
+                  <a:tcPr/>
+                </a:tc>
+              </a:tr>
+              <a:tr h="0">
+                <a:tc>
+                  <a:txBody>
+                    <a:bodyPr/>
+                    <a:lstStyle/>
+                    <a:p>
+                      <a:pPr lvl="0" indent="0" marL="0" algn="r">
+                        <a:buNone/>
+                      </a:pPr>
+                      <a:r>
+                        <a:rPr/>
+                        <a:t>1</a:t>
+                      </a:r>
+                    </a:p>
+                  </a:txBody>
+                </a:tc>
+                <a:tc>
+                  <a:txBody>
+                    <a:bodyPr/>
+                    <a:lstStyle/>
+                    <a:p>
+                      <a:pPr lvl="0" indent="0" marL="0">
+                        <a:buNone/>
+                      </a:pPr>
+                      <a:r>
+                        <a:rPr/>
+                        <a:t>#Ford</a:t>
+                      </a:r>
+                    </a:p>
+                  </a:txBody>
+                </a:tc>
+                <a:tc>
+                  <a:txBody>
+                    <a:bodyPr/>
+                    <a:lstStyle/>
+                    <a:p>
+                      <a:pPr lvl="0" indent="0" marL="0" algn="r">
+                        <a:buNone/>
+                      </a:pPr>
+                      <a:r>
+                        <a:rPr/>
+                        <a:t>7</a:t>
+                      </a:r>
+                    </a:p>
+                  </a:txBody>
+                </a:tc>
+              </a:tr>
+              <a:tr h="0">
+                <a:tc>
+                  <a:txBody>
+                    <a:bodyPr/>
+                    <a:lstStyle/>
+                    <a:p>
+                      <a:pPr lvl="0" indent="0" marL="0" algn="r">
+                        <a:buNone/>
+                      </a:pPr>
+                      <a:r>
+                        <a:rPr/>
+                        <a:t>2</a:t>
+                      </a:r>
+                    </a:p>
+                  </a:txBody>
+                </a:tc>
+                <a:tc>
+                  <a:txBody>
+                    <a:bodyPr/>
+                    <a:lstStyle/>
+                    <a:p>
+                      <a:pPr lvl="0" indent="0" marL="0">
+                        <a:buNone/>
+                      </a:pPr>
+                      <a:r>
+                        <a:rPr/>
+                        <a:t>#ReadySetFord</a:t>
+                      </a:r>
+                    </a:p>
+                  </a:txBody>
+                </a:tc>
+                <a:tc>
+                  <a:txBody>
+                    <a:bodyPr/>
+                    <a:lstStyle/>
+                    <a:p>
+                      <a:pPr lvl="0" indent="0" marL="0" algn="r">
+                        <a:buNone/>
+                      </a:pPr>
+                      <a:r>
+                        <a:rPr/>
+                        <a:t>3</a:t>
+                      </a:r>
+                    </a:p>
+                  </a:txBody>
+                </a:tc>
+              </a:tr>
+              <a:tr h="0">
+                <a:tc>
+                  <a:txBody>
+                    <a:bodyPr/>
+                    <a:lstStyle/>
+                    <a:p>
+                      <a:pPr lvl="0" indent="0" marL="0" algn="r">
+                        <a:buNone/>
+                      </a:pPr>
+                      <a:r>
+                        <a:rPr/>
+                        <a:t>3</a:t>
+                      </a:r>
+                    </a:p>
+                  </a:txBody>
+                </a:tc>
+                <a:tc>
+                  <a:txBody>
+                    <a:bodyPr/>
+                    <a:lstStyle/>
+                    <a:p>
+                      <a:pPr lvl="0" indent="0" marL="0">
+                        <a:buNone/>
+                      </a:pPr>
+                      <a:r>
+                        <a:rPr/>
+                        <a:t>#Mustang</a:t>
+                      </a:r>
+                    </a:p>
+                  </a:txBody>
+                </a:tc>
+                <a:tc>
+                  <a:txBody>
+                    <a:bodyPr/>
+                    <a:lstStyle/>
+                    <a:p>
+                      <a:pPr lvl="0" indent="0" marL="0" algn="r">
+                        <a:buNone/>
+                      </a:pPr>
+                      <a:r>
+                        <a:rPr/>
+                        <a:t>2</a:t>
+                      </a:r>
+                    </a:p>
+                  </a:txBody>
+                </a:tc>
+              </a:tr>
+              <a:tr h="0">
+                <a:tc>
+                  <a:txBody>
+                    <a:bodyPr/>
+                    <a:lstStyle/>
+                    <a:p>
+                      <a:pPr lvl="0" indent="0" marL="0" algn="r">
+                        <a:buNone/>
+                      </a:pPr>
+                      <a:r>
+                        <a:rPr/>
+                        <a:t>4</a:t>
+                      </a:r>
+                    </a:p>
+                  </a:txBody>
+                </a:tc>
+                <a:tc>
+                  <a:txBody>
+                    <a:bodyPr/>
+                    <a:lstStyle/>
+                    <a:p>
+                      <a:pPr lvl="0" indent="0" marL="0">
+                        <a:buNone/>
+                      </a:pPr>
+                      <a:r>
+                        <a:rPr/>
+                        <a:t>#SwapYourRide</a:t>
+                      </a:r>
+                    </a:p>
+                  </a:txBody>
+                </a:tc>
+                <a:tc>
+                  <a:txBody>
+                    <a:bodyPr/>
+                    <a:lstStyle/>
+                    <a:p>
+                      <a:pPr lvl="0" indent="0" marL="0" algn="r">
+                        <a:buNone/>
+                      </a:pPr>
+                      <a:r>
+                        <a:rPr/>
+                        <a:t>2</a:t>
+                      </a:r>
+                    </a:p>
+                  </a:txBody>
+                </a:tc>
+              </a:tr>
+              <a:tr h="0">
+                <a:tc>
+                  <a:txBody>
+                    <a:bodyPr/>
+                    <a:lstStyle/>
+                    <a:p>
+                      <a:pPr lvl="0" indent="0" marL="0" algn="r">
+                        <a:buNone/>
+                      </a:pPr>
+                      <a:r>
+                        <a:rPr/>
+                        <a:t>5</a:t>
+                      </a:r>
+                    </a:p>
+                  </a:txBody>
+                </a:tc>
+                <a:tc>
+                  <a:txBody>
+                    <a:bodyPr/>
+                    <a:lstStyle/>
+                    <a:p>
+                      <a:pPr lvl="0" indent="0" marL="0">
+                        <a:buNone/>
+                      </a:pPr>
+                      <a:r>
+                        <a:rPr/>
+                        <a:t>#PlanetFord</a:t>
+                      </a:r>
+                    </a:p>
+                  </a:txBody>
+                </a:tc>
+                <a:tc>
+                  <a:txBody>
+                    <a:bodyPr/>
+                    <a:lstStyle/>
+                    <a:p>
+                      <a:pPr lvl="0" indent="0" marL="0" algn="r">
+                        <a:buNone/>
+                      </a:pPr>
+                      <a:r>
+                        <a:rPr/>
+                        <a:t>2</a:t>
+                      </a:r>
+                    </a:p>
+                  </a:txBody>
+                </a:tc>
+              </a:tr>
+            </a:tbl>
+          </a:graphicData>
+        </a:graphic>
+      </p:graphicFrame>
+    </p:spTree>
+  </p:cSld>
+</p:sld>
+</file>
+
+<file path=ppt/slides/slide9.xml><?xml version="1.0" encoding="utf-8"?>
+<p:sld xmlns:a="http://schemas.openxmlformats.org/drawingml/2006/main" xmlns:r="http://schemas.openxmlformats.org/officeDocument/2006/relationships" xmlns:p="http://schemas.openxmlformats.org/presentationml/2006/main">
+  <p:cSld>
+    <p:spTree>
+      <p:nvGrpSpPr>
+        <p:cNvPr id="1" name=""/>
+        <p:cNvGrpSpPr/>
+        <p:nvPr/>
+      </p:nvGrpSpPr>
+      <p:grpSpPr>
+        <a:xfrm>
+          <a:off x="0" y="0"/>
+          <a:ext cx="0" cy="0"/>
+          <a:chOff x="0" y="0"/>
+          <a:chExt cx="0" cy="0"/>
+        </a:xfrm>
+      </p:grpSpPr>
+      <p:sp>
+        <p:nvSpPr>
           <p:cNvPr id="3" name="Content Placeholder 2"/>
           <p:cNvSpPr>
             <a:spLocks noGrp="1"/>
@@ -4737,7 +5150,7 @@
             </a:pPr>
             <a:r>
               <a:rPr/>
-              <a:t>Representative posts: - “No representative tweets captured.”</a:t>
+              <a:t>Representative posts: - “⚡ Ready Set #Ford is here! … From Broncos to Mustangs to Ford Pro, there’s a Ford built to spark your next adventure.” - “Get ready for a fantastic fall during the Ready, Set, Ford Event. We’ll help you find the perfect EV at the right price.” - “Why make me set an appointment … Horrible service!” (service experience pain point to monitor)</a:t>
             </a:r>
           </a:p>
           <a:p>
@@ -4766,7 +5179,7 @@
             </a:r>
             <a:r>
               <a:rPr i="1"/>
-              <a:t> (twarc2 search).</a:t>
+              <a:t> (22 Sep run, twarc2 search).</a:t>
             </a:r>
           </a:p>
         </p:txBody>

</xml_diff>

<commit_message>
Add historic campaign benchmarks and refresh QA checklist
</commit_message>
<xml_diff>
--- a/deck/Ready_Set_Ford_deck.pptx
+++ b/deck/Ready_Set_Ford_deck.pptx
@@ -6,14 +6,6 @@
   </p:sldMasterIdLst>
   <p:sldIdLst>
     <p:sldId id="256" r:id="rId2"/>
-    <p:sldId id="257" r:id="rId3"/>
-    <p:sldId id="258" r:id="rId4"/>
-    <p:sldId id="259" r:id="rId5"/>
-    <p:sldId id="260" r:id="rId6"/>
-    <p:sldId id="261" r:id="rId7"/>
-    <p:sldId id="262" r:id="rId8"/>
-    <p:sldId id="263" r:id="rId9"/>
-    <p:sldId id="264" r:id="rId10"/>
   </p:sldIdLst>
   <p:sldSz cx="9144000" cy="5143500" type="screen16x9"/>
   <p:notesSz cx="6858000" cy="9144000"/>
@@ -3374,1812 +3366,6 @@
             <a:r>
               <a:rPr i="1"/>
               <a:t>Draft updated 22 Sep 2025. Maintain ~12 slides; adjust as new insights emerge.</a:t>
-            </a:r>
-          </a:p>
-        </p:txBody>
-      </p:sp>
-    </p:spTree>
-  </p:cSld>
-</p:sld>
-</file>
-
-<file path=ppt/slides/slide2.xml><?xml version="1.0" encoding="utf-8"?>
-<p:sld xmlns:a="http://schemas.openxmlformats.org/drawingml/2006/main" xmlns:r="http://schemas.openxmlformats.org/officeDocument/2006/relationships" xmlns:p="http://schemas.openxmlformats.org/presentationml/2006/main">
-  <p:cSld>
-    <p:spTree>
-      <p:nvGrpSpPr>
-        <p:cNvPr id="1" name=""/>
-        <p:cNvGrpSpPr/>
-        <p:nvPr/>
-      </p:nvGrpSpPr>
-      <p:grpSpPr>
-        <a:xfrm>
-          <a:off x="0" y="0"/>
-          <a:ext cx="0" cy="0"/>
-          <a:chOff x="0" y="0"/>
-          <a:chExt cx="0" cy="0"/>
-        </a:xfrm>
-      </p:grpSpPr>
-      <p:sp>
-        <p:nvSpPr>
-          <p:cNvPr id="2" name="Title 1"/>
-          <p:cNvSpPr>
-            <a:spLocks noGrp="1"/>
-          </p:cNvSpPr>
-          <p:nvPr>
-            <p:ph type="title"/>
-          </p:nvPr>
-        </p:nvSpPr>
-        <p:spPr/>
-        <p:txBody>
-          <a:bodyPr/>
-          <a:lstStyle/>
-          <a:p>
-            <a:pPr lvl="0" indent="0" marL="0">
-              <a:buNone/>
-            </a:pPr>
-            <a:r>
-              <a:rPr/>
-              <a:t>Digital Pulse – Google Trends (US)</a:t>
-            </a:r>
-          </a:p>
-        </p:txBody>
-      </p:sp>
-      <p:pic>
-        <p:nvPicPr>
-          <p:cNvPr descr="fig:  visuals/google_trends_readysetford_us.png" id="0" name="Picture 1"/>
-          <p:cNvPicPr>
-            <a:picLocks noGrp="1" noChangeAspect="1"/>
-          </p:cNvPicPr>
-          <p:nvPr/>
-        </p:nvPicPr>
-        <p:blipFill>
-          <a:blip r:embed="rId2"/>
-          <a:stretch>
-            <a:fillRect/>
-          </a:stretch>
-        </p:blipFill>
-        <p:spPr bwMode="auto">
-          <a:xfrm>
-            <a:off x="1689100" y="1193800"/>
-            <a:ext cx="5765800" cy="2882900"/>
-          </a:xfrm>
-          <a:prstGeom prst="rect">
-            <a:avLst/>
-          </a:prstGeom>
-          <a:noFill/>
-          <a:ln w="9525">
-            <a:noFill/>
-            <a:headEnd/>
-            <a:tailEnd/>
-          </a:ln>
-        </p:spPr>
-      </p:pic>
-      <p:sp>
-        <p:nvSpPr>
-          <p:cNvPr id="1" name="TextBox 3"/>
-          <p:cNvSpPr txBox="1"/>
-          <p:nvPr/>
-        </p:nvSpPr>
-        <p:spPr>
-          <a:xfrm>
-            <a:off x="457200" y="4076700"/>
-            <a:ext cx="8229600" cy="508000"/>
-          </a:xfrm>
-          <a:prstGeom prst="rect">
-            <a:avLst/>
-          </a:prstGeom>
-          <a:noFill/>
-        </p:spPr>
-        <p:txBody>
-          <a:bodyPr/>
-          <a:lstStyle/>
-          <a:p>
-            <a:pPr lvl="0" indent="0" marL="0" algn="ctr">
-              <a:buNone/>
-            </a:pPr>
-            <a:r>
-              <a:rPr/>
-              <a:t>Ready Set Ford vs Ford Pro weekly indices</a:t>
-            </a:r>
-          </a:p>
-        </p:txBody>
-      </p:sp>
-    </p:spTree>
-  </p:cSld>
-</p:sld>
-</file>
-
-<file path=ppt/slides/slide3.xml><?xml version="1.0" encoding="utf-8"?>
-<p:sld xmlns:a="http://schemas.openxmlformats.org/drawingml/2006/main" xmlns:r="http://schemas.openxmlformats.org/officeDocument/2006/relationships" xmlns:p="http://schemas.openxmlformats.org/presentationml/2006/main">
-  <p:cSld>
-    <p:spTree>
-      <p:nvGrpSpPr>
-        <p:cNvPr id="1" name=""/>
-        <p:cNvGrpSpPr/>
-        <p:nvPr/>
-      </p:nvGrpSpPr>
-      <p:grpSpPr>
-        <a:xfrm>
-          <a:off x="0" y="0"/>
-          <a:ext cx="0" cy="0"/>
-          <a:chOff x="0" y="0"/>
-          <a:chExt cx="0" cy="0"/>
-        </a:xfrm>
-      </p:grpSpPr>
-      <p:graphicFrame>
-        <p:nvGraphicFramePr>
-          <p:cNvPr id="6" name="Content Placeholder 5"/>
-          <p:cNvGraphicFramePr>
-            <a:graphicFrameLocks noGrp="1"/>
-          </p:cNvGraphicFramePr>
-          <p:nvPr>
-            <p:ph idx="1"/>
-          </p:nvPr>
-        </p:nvGraphicFramePr>
-        <p:xfrm>
-          <a:off x="457200" y="1193800"/>
-          <a:ext cx="8229600" cy="3390900"/>
-        </p:xfrm>
-        <a:graphic>
-          <a:graphicData uri="http://schemas.openxmlformats.org/drawingml/2006/table">
-            <a:tbl>
-              <a:tblPr firstRow="1" bandRow="1">
-                <a:tableStyleId>{5C22544A-7EE6-4342-B048-85BDC9FD1C3A}</a:tableStyleId>
-              </a:tblPr>
-              <a:tblGrid>
-                <a:gridCol w="1638300"/>
-                <a:gridCol w="1638300"/>
-                <a:gridCol w="1638300"/>
-                <a:gridCol w="1638300"/>
-                <a:gridCol w="1638300"/>
-              </a:tblGrid>
-              <a:tr h="0">
-                <a:tc>
-                  <a:txBody>
-                    <a:bodyPr/>
-                    <a:lstStyle/>
-                    <a:p>
-                      <a:pPr lvl="0" indent="0" marL="0">
-                        <a:buNone/>
-                      </a:pPr>
-                      <a:r>
-                        <a:rPr/>
-                        <a:t>Term</a:t>
-                      </a:r>
-                    </a:p>
-                  </a:txBody>
-                  <a:tcPr/>
-                </a:tc>
-                <a:tc>
-                  <a:txBody>
-                    <a:bodyPr/>
-                    <a:lstStyle/>
-                    <a:p>
-                      <a:pPr lvl="0" indent="0" marL="0" algn="r">
-                        <a:buNone/>
-                      </a:pPr>
-                      <a:r>
-                        <a:rPr/>
-                        <a:t>Peak Weekly Interest</a:t>
-                      </a:r>
-                    </a:p>
-                  </a:txBody>
-                  <a:tcPr/>
-                </a:tc>
-                <a:tc>
-                  <a:txBody>
-                    <a:bodyPr/>
-                    <a:lstStyle/>
-                    <a:p>
-                      <a:pPr lvl="0" indent="0" marL="0">
-                        <a:buNone/>
-                      </a:pPr>
-                      <a:r>
-                        <a:rPr/>
-                        <a:t>Peak Week</a:t>
-                      </a:r>
-                    </a:p>
-                  </a:txBody>
-                  <a:tcPr/>
-                </a:tc>
-                <a:tc>
-                  <a:txBody>
-                    <a:bodyPr/>
-                    <a:lstStyle/>
-                    <a:p>
-                      <a:pPr lvl="0" indent="0" marL="0" algn="r">
-                        <a:buNone/>
-                      </a:pPr>
-                      <a:r>
-                        <a:rPr/>
-                        <a:t>Trailing 90-Day Avg</a:t>
-                      </a:r>
-                    </a:p>
-                  </a:txBody>
-                  <a:tcPr/>
-                </a:tc>
-                <a:tc>
-                  <a:txBody>
-                    <a:bodyPr/>
-                    <a:lstStyle/>
-                    <a:p>
-                      <a:pPr lvl="0" indent="0" marL="0" algn="r">
-                        <a:buNone/>
-                      </a:pPr>
-                      <a:r>
-                        <a:rPr/>
-                        <a:t>Gap vs. Ford Pro</a:t>
-                      </a:r>
-                    </a:p>
-                  </a:txBody>
-                  <a:tcPr/>
-                </a:tc>
-              </a:tr>
-              <a:tr h="0">
-                <a:tc>
-                  <a:txBody>
-                    <a:bodyPr/>
-                    <a:lstStyle/>
-                    <a:p>
-                      <a:pPr lvl="0" indent="0" marL="0">
-                        <a:buNone/>
-                      </a:pPr>
-                      <a:r>
-                        <a:rPr/>
-                        <a:t>Ready Set Ford</a:t>
-                      </a:r>
-                    </a:p>
-                  </a:txBody>
-                </a:tc>
-                <a:tc>
-                  <a:txBody>
-                    <a:bodyPr/>
-                    <a:lstStyle/>
-                    <a:p>
-                      <a:pPr lvl="0" indent="0" marL="0" algn="r">
-                        <a:buNone/>
-                      </a:pPr>
-                      <a:r>
-                        <a:rPr/>
-                        <a:t>2</a:t>
-                      </a:r>
-                    </a:p>
-                  </a:txBody>
-                </a:tc>
-                <a:tc>
-                  <a:txBody>
-                    <a:bodyPr/>
-                    <a:lstStyle/>
-                    <a:p>
-                      <a:pPr lvl="0" indent="0" marL="0">
-                        <a:buNone/>
-                      </a:pPr>
-                      <a:r>
-                        <a:rPr/>
-                        <a:t>2022-01-02</a:t>
-                      </a:r>
-                    </a:p>
-                  </a:txBody>
-                </a:tc>
-                <a:tc>
-                  <a:txBody>
-                    <a:bodyPr/>
-                    <a:lstStyle/>
-                    <a:p>
-                      <a:pPr lvl="0" indent="0" marL="0" algn="r">
-                        <a:buNone/>
-                      </a:pPr>
-                      <a:r>
-                        <a:rPr/>
-                        <a:t>0.15</a:t>
-                      </a:r>
-                    </a:p>
-                  </a:txBody>
-                </a:tc>
-                <a:tc>
-                  <a:txBody>
-                    <a:bodyPr/>
-                    <a:lstStyle/>
-                    <a:p>
-                      <a:pPr lvl="0" indent="0" marL="0" algn="r">
-                        <a:buNone/>
-                      </a:pPr>
-                      <a:r>
-                        <a:rPr/>
-                        <a:t>-52.9</a:t>
-                      </a:r>
-                    </a:p>
-                  </a:txBody>
-                </a:tc>
-              </a:tr>
-              <a:tr h="0">
-                <a:tc>
-                  <a:txBody>
-                    <a:bodyPr/>
-                    <a:lstStyle/>
-                    <a:p>
-                      <a:pPr lvl="0" indent="0" marL="0">
-                        <a:buNone/>
-                      </a:pPr>
-                      <a:r>
-                        <a:rPr/>
-                        <a:t>Ford Pro</a:t>
-                      </a:r>
-                    </a:p>
-                  </a:txBody>
-                </a:tc>
-                <a:tc>
-                  <a:txBody>
-                    <a:bodyPr/>
-                    <a:lstStyle/>
-                    <a:p>
-                      <a:pPr lvl="0" indent="0" marL="0" algn="r">
-                        <a:buNone/>
-                      </a:pPr>
-                      <a:r>
-                        <a:rPr/>
-                        <a:t>100</a:t>
-                      </a:r>
-                    </a:p>
-                  </a:txBody>
-                </a:tc>
-                <a:tc>
-                  <a:txBody>
-                    <a:bodyPr/>
-                    <a:lstStyle/>
-                    <a:p>
-                      <a:pPr lvl="0" indent="0" marL="0">
-                        <a:buNone/>
-                      </a:pPr>
-                      <a:r>
-                        <a:rPr/>
-                        <a:t>2025-07-27</a:t>
-                      </a:r>
-                    </a:p>
-                  </a:txBody>
-                </a:tc>
-                <a:tc>
-                  <a:txBody>
-                    <a:bodyPr/>
-                    <a:lstStyle/>
-                    <a:p>
-                      <a:pPr lvl="0" indent="0" marL="0" algn="r">
-                        <a:buNone/>
-                      </a:pPr>
-                      <a:r>
-                        <a:rPr/>
-                        <a:t>53.0</a:t>
-                      </a:r>
-                    </a:p>
-                  </a:txBody>
-                </a:tc>
-                <a:tc>
-                  <a:txBody>
-                    <a:bodyPr/>
-                    <a:lstStyle/>
-                    <a:p>
-                      <a:pPr lvl="0" indent="0" marL="0" algn="r">
-                        <a:buNone/>
-                      </a:pPr>
-                      <a:r>
-                        <a:rPr/>
-                        <a:t>–</a:t>
-                      </a:r>
-                    </a:p>
-                  </a:txBody>
-                </a:tc>
-              </a:tr>
-            </a:tbl>
-          </a:graphicData>
-        </a:graphic>
-      </p:graphicFrame>
-    </p:spTree>
-  </p:cSld>
-</p:sld>
-</file>
-
-<file path=ppt/slides/slide4.xml><?xml version="1.0" encoding="utf-8"?>
-<p:sld xmlns:a="http://schemas.openxmlformats.org/drawingml/2006/main" xmlns:r="http://schemas.openxmlformats.org/officeDocument/2006/relationships" xmlns:p="http://schemas.openxmlformats.org/presentationml/2006/main">
-  <p:cSld>
-    <p:spTree>
-      <p:nvGrpSpPr>
-        <p:cNvPr id="1" name=""/>
-        <p:cNvGrpSpPr/>
-        <p:nvPr/>
-      </p:nvGrpSpPr>
-      <p:grpSpPr>
-        <a:xfrm>
-          <a:off x="0" y="0"/>
-          <a:ext cx="0" cy="0"/>
-          <a:chOff x="0" y="0"/>
-          <a:chExt cx="0" cy="0"/>
-        </a:xfrm>
-      </p:grpSpPr>
-      <p:sp>
-        <p:nvSpPr>
-          <p:cNvPr id="3" name="Content Placeholder 2"/>
-          <p:cNvSpPr>
-            <a:spLocks noGrp="1"/>
-          </p:cNvSpPr>
-          <p:nvPr>
-            <p:ph idx="1"/>
-          </p:nvPr>
-        </p:nvSpPr>
-        <p:spPr/>
-        <p:txBody>
-          <a:bodyPr/>
-          <a:lstStyle/>
-          <a:p>
-            <a:pPr lvl="0"/>
-            <a:r>
-              <a:rPr/>
-              <a:t>Ready Set Ford searches finally registered measurable activity in September 2025 (index = 1) after a near-zero baseline, signalling early traction as campaign content rolls out.</a:t>
-            </a:r>
-          </a:p>
-          <a:p>
-            <a:pPr lvl="0"/>
-            <a:r>
-              <a:rPr/>
-              <a:t>Ford Pro remains the awareness anchor with a steady ~53 trailing 90-day index; use the contrast to show why Pro proof points must be woven into Ready Set Ford storytelling.</a:t>
-            </a:r>
-          </a:p>
-          <a:p>
-            <a:pPr lvl="0"/>
-            <a:r>
-              <a:rPr/>
-              <a:t>Overlay campaign milestones (video drops, dealer pushes) when presenting to explain spikes and set expectations for post-launch lift.</a:t>
-            </a:r>
-          </a:p>
-          <a:p>
-            <a:pPr lvl="0" indent="0" marL="0">
-              <a:buNone/>
-            </a:pPr>
-            <a:r>
-              <a:rPr i="1"/>
-              <a:t>Source: </a:t>
-            </a:r>
-            <a:r>
-              <a:rPr i="1">
-                <a:latin typeface="Courier"/>
-              </a:rPr>
-              <a:t>google_trends_readysetford_us.csv</a:t>
-            </a:r>
-            <a:r>
-              <a:rPr i="1"/>
-              <a:t> generated via </a:t>
-            </a:r>
-            <a:r>
-              <a:rPr i="1">
-                <a:latin typeface="Courier"/>
-              </a:rPr>
-              <a:t>scripts/collect_additional_data.py</a:t>
-            </a:r>
-            <a:r>
-              <a:rPr i="1"/>
-              <a:t> (22 Sep run).</a:t>
-            </a:r>
-          </a:p>
-        </p:txBody>
-      </p:sp>
-    </p:spTree>
-  </p:cSld>
-</p:sld>
-</file>
-
-<file path=ppt/slides/slide5.xml><?xml version="1.0" encoding="utf-8"?>
-<p:sld xmlns:a="http://schemas.openxmlformats.org/drawingml/2006/main" xmlns:r="http://schemas.openxmlformats.org/officeDocument/2006/relationships" xmlns:p="http://schemas.openxmlformats.org/presentationml/2006/main">
-  <p:cSld>
-    <p:spTree>
-      <p:nvGrpSpPr>
-        <p:cNvPr id="1" name=""/>
-        <p:cNvGrpSpPr/>
-        <p:nvPr/>
-      </p:nvGrpSpPr>
-      <p:grpSpPr>
-        <a:xfrm>
-          <a:off x="0" y="0"/>
-          <a:ext cx="0" cy="0"/>
-          <a:chOff x="0" y="0"/>
-          <a:chExt cx="0" cy="0"/>
-        </a:xfrm>
-      </p:grpSpPr>
-      <p:sp>
-        <p:nvSpPr>
-          <p:cNvPr id="2" name="Title 1"/>
-          <p:cNvSpPr>
-            <a:spLocks noGrp="1"/>
-          </p:cNvSpPr>
-          <p:nvPr>
-            <p:ph type="title"/>
-          </p:nvPr>
-        </p:nvSpPr>
-        <p:spPr>
-          <a:xfrm>
-            <a:off x="457201" y="204787"/>
-            <a:ext cx="3008313" cy="871538"/>
-          </a:xfrm>
-        </p:spPr>
-        <p:txBody>
-          <a:bodyPr/>
-          <a:lstStyle/>
-          <a:p>
-            <a:pPr lvl="0" indent="0" marL="0">
-              <a:buNone/>
-            </a:pPr>
-            <a:r>
-              <a:rPr/>
-              <a:t>Slide – Ready Set Ford Video Performance</a:t>
-            </a:r>
-          </a:p>
-        </p:txBody>
-      </p:sp>
-      <p:sp>
-        <p:nvSpPr>
-          <p:cNvPr id="4" name="Text Placeholder 3"/>
-          <p:cNvSpPr>
-            <a:spLocks noGrp="1"/>
-          </p:cNvSpPr>
-          <p:nvPr>
-            <p:ph idx="2" sz="half" type="body"/>
-          </p:nvPr>
-        </p:nvSpPr>
-        <p:spPr/>
-        <p:txBody>
-          <a:bodyPr/>
-          <a:lstStyle/>
-          <a:p>
-            <a:pPr lvl="0" indent="0" marL="0">
-              <a:spcBef>
-                <a:spcPts val="3000"/>
-              </a:spcBef>
-              <a:buNone/>
-            </a:pPr>
-            <a:r>
-              <a:rPr b="1"/>
-              <a:t>Key Takeaways</a:t>
-            </a:r>
-          </a:p>
-          <a:p>
-            <a:pPr lvl="0"/>
-            <a:r>
-              <a:rPr/>
-              <a:t>Hero spots launched 10 Sep deliver the largest reach; “Ready Set Ford | Ford” leads with 24.5K views and &gt;500 likes.</a:t>
-            </a:r>
-          </a:p>
-          <a:p>
-            <a:pPr lvl="0"/>
-            <a:r>
-              <a:rPr/>
-              <a:t>Short-form and Canada-specific cuts (uploaded 16 Sep) trail in impressions but keep ~2% engagement, indicating consistent resonance.</a:t>
-            </a:r>
-          </a:p>
-          <a:p>
-            <a:pPr lvl="0"/>
-            <a:r>
-              <a:rPr/>
-              <a:t>“To Those Who Can” over-indexes on engagement (4.14%) vs. reach, signaling a potential storytelling asset for targeted placements.</a:t>
-            </a:r>
-          </a:p>
-          <a:p>
-            <a:pPr lvl="0" indent="0" marL="0">
-              <a:spcBef>
-                <a:spcPts val="3000"/>
-              </a:spcBef>
-              <a:buNone/>
-            </a:pPr>
-            <a:r>
-              <a:rPr b="1"/>
-              <a:t>Metrics Snapshot (YouTube, refreshed 19 Sep 2025)</a:t>
-            </a:r>
-          </a:p>
-        </p:txBody>
-      </p:sp>
-      <p:graphicFrame>
-        <p:nvGraphicFramePr>
-          <p:cNvPr id="6" name="Content Placeholder 5"/>
-          <p:cNvGraphicFramePr>
-            <a:graphicFrameLocks noGrp="1"/>
-          </p:cNvGraphicFramePr>
-          <p:nvPr>
-            <p:ph idx="1"/>
-          </p:nvPr>
-        </p:nvGraphicFramePr>
-        <p:xfrm>
-          <a:off x="3568700" y="203200"/>
-          <a:ext cx="5105400" cy="4381500"/>
-        </p:xfrm>
-        <a:graphic>
-          <a:graphicData uri="http://schemas.openxmlformats.org/drawingml/2006/table">
-            <a:tbl>
-              <a:tblPr firstRow="1" bandRow="1">
-                <a:tableStyleId>{5C22544A-7EE6-4342-B048-85BDC9FD1C3A}</a:tableStyleId>
-              </a:tblPr>
-              <a:tblGrid>
-                <a:gridCol w="850900"/>
-                <a:gridCol w="850900"/>
-                <a:gridCol w="850900"/>
-                <a:gridCol w="850900"/>
-                <a:gridCol w="850900"/>
-                <a:gridCol w="850900"/>
-              </a:tblGrid>
-              <a:tr h="0">
-                <a:tc>
-                  <a:txBody>
-                    <a:bodyPr/>
-                    <a:lstStyle/>
-                    <a:p>
-                      <a:pPr lvl="0" indent="0" marL="0">
-                        <a:buNone/>
-                      </a:pPr>
-                      <a:r>
-                        <a:rPr/>
-                        <a:t>Video</a:t>
-                      </a:r>
-                    </a:p>
-                  </a:txBody>
-                  <a:tcPr/>
-                </a:tc>
-                <a:tc>
-                  <a:txBody>
-                    <a:bodyPr/>
-                    <a:lstStyle/>
-                    <a:p>
-                      <a:pPr lvl="0" indent="0" marL="0">
-                        <a:buNone/>
-                      </a:pPr>
-                      <a:r>
-                        <a:rPr/>
-                        <a:t>Upload (UTC)</a:t>
-                      </a:r>
-                    </a:p>
-                  </a:txBody>
-                  <a:tcPr/>
-                </a:tc>
-                <a:tc>
-                  <a:txBody>
-                    <a:bodyPr/>
-                    <a:lstStyle/>
-                    <a:p>
-                      <a:pPr lvl="0" indent="0" marL="0">
-                        <a:buNone/>
-                      </a:pPr>
-                      <a:r>
-                        <a:rPr/>
-                        <a:t>Duration</a:t>
-                      </a:r>
-                    </a:p>
-                  </a:txBody>
-                  <a:tcPr/>
-                </a:tc>
-                <a:tc>
-                  <a:txBody>
-                    <a:bodyPr/>
-                    <a:lstStyle/>
-                    <a:p>
-                      <a:pPr lvl="0" indent="0" marL="0" algn="r">
-                        <a:buNone/>
-                      </a:pPr>
-                      <a:r>
-                        <a:rPr/>
-                        <a:t>Views</a:t>
-                      </a:r>
-                    </a:p>
-                  </a:txBody>
-                  <a:tcPr/>
-                </a:tc>
-                <a:tc>
-                  <a:txBody>
-                    <a:bodyPr/>
-                    <a:lstStyle/>
-                    <a:p>
-                      <a:pPr lvl="0" indent="0" marL="0" algn="r">
-                        <a:buNone/>
-                      </a:pPr>
-                      <a:r>
-                        <a:rPr/>
-                        <a:t>Likes</a:t>
-                      </a:r>
-                    </a:p>
-                  </a:txBody>
-                  <a:tcPr/>
-                </a:tc>
-                <a:tc>
-                  <a:txBody>
-                    <a:bodyPr/>
-                    <a:lstStyle/>
-                    <a:p>
-                      <a:pPr lvl="0" indent="0" marL="0" algn="r">
-                        <a:buNone/>
-                      </a:pPr>
-                      <a:r>
-                        <a:rPr/>
-                        <a:t>Engagement %</a:t>
-                      </a:r>
-                    </a:p>
-                  </a:txBody>
-                  <a:tcPr/>
-                </a:tc>
-              </a:tr>
-              <a:tr h="0">
-                <a:tc>
-                  <a:txBody>
-                    <a:bodyPr/>
-                    <a:lstStyle/>
-                    <a:p>
-                      <a:pPr lvl="0" indent="0" marL="0">
-                        <a:buNone/>
-                      </a:pPr>
-                      <a:r>
-                        <a:rPr/>
-                        <a:t>Ready Set Ford | Ford</a:t>
-                      </a:r>
-                    </a:p>
-                  </a:txBody>
-                </a:tc>
-                <a:tc>
-                  <a:txBody>
-                    <a:bodyPr/>
-                    <a:lstStyle/>
-                    <a:p>
-                      <a:pPr lvl="0" indent="0" marL="0">
-                        <a:buNone/>
-                      </a:pPr>
-                      <a:r>
-                        <a:rPr/>
-                        <a:t>2025-09-10</a:t>
-                      </a:r>
-                    </a:p>
-                  </a:txBody>
-                </a:tc>
-                <a:tc>
-                  <a:txBody>
-                    <a:bodyPr/>
-                    <a:lstStyle/>
-                    <a:p>
-                      <a:pPr lvl="0" indent="0" marL="0">
-                        <a:buNone/>
-                      </a:pPr>
-                      <a:r>
-                        <a:rPr/>
-                        <a:t>60s</a:t>
-                      </a:r>
-                    </a:p>
-                  </a:txBody>
-                </a:tc>
-                <a:tc>
-                  <a:txBody>
-                    <a:bodyPr/>
-                    <a:lstStyle/>
-                    <a:p>
-                      <a:pPr lvl="0" indent="0" marL="0" algn="r">
-                        <a:buNone/>
-                      </a:pPr>
-                      <a:r>
-                        <a:rPr/>
-                        <a:t>24,549</a:t>
-                      </a:r>
-                    </a:p>
-                  </a:txBody>
-                </a:tc>
-                <a:tc>
-                  <a:txBody>
-                    <a:bodyPr/>
-                    <a:lstStyle/>
-                    <a:p>
-                      <a:pPr lvl="0" indent="0" marL="0" algn="r">
-                        <a:buNone/>
-                      </a:pPr>
-                      <a:r>
-                        <a:rPr/>
-                        <a:t>503</a:t>
-                      </a:r>
-                    </a:p>
-                  </a:txBody>
-                </a:tc>
-                <a:tc>
-                  <a:txBody>
-                    <a:bodyPr/>
-                    <a:lstStyle/>
-                    <a:p>
-                      <a:pPr lvl="0" indent="0" marL="0" algn="r">
-                        <a:buNone/>
-                      </a:pPr>
-                      <a:r>
-                        <a:rPr/>
-                        <a:t>2.05</a:t>
-                      </a:r>
-                    </a:p>
-                  </a:txBody>
-                </a:tc>
-              </a:tr>
-              <a:tr h="0">
-                <a:tc>
-                  <a:txBody>
-                    <a:bodyPr/>
-                    <a:lstStyle/>
-                    <a:p>
-                      <a:pPr lvl="0" indent="0" marL="0">
-                        <a:buNone/>
-                      </a:pPr>
-                      <a:r>
-                        <a:rPr/>
-                        <a:t>Ready Set Ford™ (Canada)</a:t>
-                      </a:r>
-                    </a:p>
-                  </a:txBody>
-                </a:tc>
-                <a:tc>
-                  <a:txBody>
-                    <a:bodyPr/>
-                    <a:lstStyle/>
-                    <a:p>
-                      <a:pPr lvl="0" indent="0" marL="0">
-                        <a:buNone/>
-                      </a:pPr>
-                      <a:r>
-                        <a:rPr/>
-                        <a:t>2025-09-16</a:t>
-                      </a:r>
-                    </a:p>
-                  </a:txBody>
-                </a:tc>
-                <a:tc>
-                  <a:txBody>
-                    <a:bodyPr/>
-                    <a:lstStyle/>
-                    <a:p>
-                      <a:pPr lvl="0" indent="0" marL="0">
-                        <a:buNone/>
-                      </a:pPr>
-                      <a:r>
-                        <a:rPr/>
-                        <a:t>60s</a:t>
-                      </a:r>
-                    </a:p>
-                  </a:txBody>
-                </a:tc>
-                <a:tc>
-                  <a:txBody>
-                    <a:bodyPr/>
-                    <a:lstStyle/>
-                    <a:p>
-                      <a:pPr lvl="0" indent="0" marL="0" algn="r">
-                        <a:buNone/>
-                      </a:pPr>
-                      <a:r>
-                        <a:rPr/>
-                        <a:t>611</a:t>
-                      </a:r>
-                    </a:p>
-                  </a:txBody>
-                </a:tc>
-                <a:tc>
-                  <a:txBody>
-                    <a:bodyPr/>
-                    <a:lstStyle/>
-                    <a:p>
-                      <a:pPr lvl="0" indent="0" marL="0" algn="r">
-                        <a:buNone/>
-                      </a:pPr>
-                      <a:r>
-                        <a:rPr/>
-                        <a:t>13</a:t>
-                      </a:r>
-                    </a:p>
-                  </a:txBody>
-                </a:tc>
-                <a:tc>
-                  <a:txBody>
-                    <a:bodyPr/>
-                    <a:lstStyle/>
-                    <a:p>
-                      <a:pPr lvl="0" indent="0" marL="0" algn="r">
-                        <a:buNone/>
-                      </a:pPr>
-                      <a:r>
-                        <a:rPr/>
-                        <a:t>2.13</a:t>
-                      </a:r>
-                    </a:p>
-                  </a:txBody>
-                </a:tc>
-              </a:tr>
-              <a:tr h="0">
-                <a:tc>
-                  <a:txBody>
-                    <a:bodyPr/>
-                    <a:lstStyle/>
-                    <a:p>
-                      <a:pPr lvl="0" indent="0" marL="0">
-                        <a:buNone/>
-                      </a:pPr>
-                      <a:r>
-                        <a:rPr/>
-                        <a:t>To Those Who Can | Ford</a:t>
-                      </a:r>
-                    </a:p>
-                  </a:txBody>
-                </a:tc>
-                <a:tc>
-                  <a:txBody>
-                    <a:bodyPr/>
-                    <a:lstStyle/>
-                    <a:p>
-                      <a:pPr lvl="0" indent="0" marL="0">
-                        <a:buNone/>
-                      </a:pPr>
-                      <a:r>
-                        <a:rPr/>
-                        <a:t>2025-09-10</a:t>
-                      </a:r>
-                    </a:p>
-                  </a:txBody>
-                </a:tc>
-                <a:tc>
-                  <a:txBody>
-                    <a:bodyPr/>
-                    <a:lstStyle/>
-                    <a:p>
-                      <a:pPr lvl="0" indent="0" marL="0">
-                        <a:buNone/>
-                      </a:pPr>
-                      <a:r>
-                        <a:rPr/>
-                        <a:t>30s</a:t>
-                      </a:r>
-                    </a:p>
-                  </a:txBody>
-                </a:tc>
-                <a:tc>
-                  <a:txBody>
-                    <a:bodyPr/>
-                    <a:lstStyle/>
-                    <a:p>
-                      <a:pPr lvl="0" indent="0" marL="0" algn="r">
-                        <a:buNone/>
-                      </a:pPr>
-                      <a:r>
-                        <a:rPr/>
-                        <a:t>3,626</a:t>
-                      </a:r>
-                    </a:p>
-                  </a:txBody>
-                </a:tc>
-                <a:tc>
-                  <a:txBody>
-                    <a:bodyPr/>
-                    <a:lstStyle/>
-                    <a:p>
-                      <a:pPr lvl="0" indent="0" marL="0" algn="r">
-                        <a:buNone/>
-                      </a:pPr>
-                      <a:r>
-                        <a:rPr/>
-                        <a:t>150</a:t>
-                      </a:r>
-                    </a:p>
-                  </a:txBody>
-                </a:tc>
-                <a:tc>
-                  <a:txBody>
-                    <a:bodyPr/>
-                    <a:lstStyle/>
-                    <a:p>
-                      <a:pPr lvl="0" indent="0" marL="0" algn="r">
-                        <a:buNone/>
-                      </a:pPr>
-                      <a:r>
-                        <a:rPr/>
-                        <a:t>4.14</a:t>
-                      </a:r>
-                    </a:p>
-                  </a:txBody>
-                </a:tc>
-              </a:tr>
-              <a:tr h="0">
-                <a:tc>
-                  <a:txBody>
-                    <a:bodyPr/>
-                    <a:lstStyle/>
-                    <a:p>
-                      <a:pPr lvl="0" indent="0" marL="0">
-                        <a:buNone/>
-                      </a:pPr>
-                      <a:r>
-                        <a:rPr/>
-                        <a:t>Ready Set Ford™ (Shorts)</a:t>
-                      </a:r>
-                    </a:p>
-                  </a:txBody>
-                </a:tc>
-                <a:tc>
-                  <a:txBody>
-                    <a:bodyPr/>
-                    <a:lstStyle/>
-                    <a:p>
-                      <a:pPr lvl="0" indent="0" marL="0">
-                        <a:buNone/>
-                      </a:pPr>
-                      <a:r>
-                        <a:rPr/>
-                        <a:t>2025-09-16</a:t>
-                      </a:r>
-                    </a:p>
-                  </a:txBody>
-                </a:tc>
-                <a:tc>
-                  <a:txBody>
-                    <a:bodyPr/>
-                    <a:lstStyle/>
-                    <a:p>
-                      <a:pPr lvl="0" indent="0" marL="0">
-                        <a:buNone/>
-                      </a:pPr>
-                      <a:r>
-                        <a:rPr/>
-                        <a:t>60s</a:t>
-                      </a:r>
-                    </a:p>
-                  </a:txBody>
-                </a:tc>
-                <a:tc>
-                  <a:txBody>
-                    <a:bodyPr/>
-                    <a:lstStyle/>
-                    <a:p>
-                      <a:pPr lvl="0" indent="0" marL="0" algn="r">
-                        <a:buNone/>
-                      </a:pPr>
-                      <a:r>
-                        <a:rPr/>
-                        <a:t>603</a:t>
-                      </a:r>
-                    </a:p>
-                  </a:txBody>
-                </a:tc>
-                <a:tc>
-                  <a:txBody>
-                    <a:bodyPr/>
-                    <a:lstStyle/>
-                    <a:p>
-                      <a:pPr lvl="0" indent="0" marL="0" algn="r">
-                        <a:buNone/>
-                      </a:pPr>
-                      <a:r>
-                        <a:rPr/>
-                        <a:t>12</a:t>
-                      </a:r>
-                    </a:p>
-                  </a:txBody>
-                </a:tc>
-                <a:tc>
-                  <a:txBody>
-                    <a:bodyPr/>
-                    <a:lstStyle/>
-                    <a:p>
-                      <a:pPr lvl="0" indent="0" marL="0" algn="r">
-                        <a:buNone/>
-                      </a:pPr>
-                      <a:r>
-                        <a:rPr/>
-                        <a:t>1.99</a:t>
-                      </a:r>
-                    </a:p>
-                  </a:txBody>
-                </a:tc>
-              </a:tr>
-              <a:tr h="0">
-                <a:tc>
-                  <a:txBody>
-                    <a:bodyPr/>
-                    <a:lstStyle/>
-                    <a:p>
-                      <a:pPr lvl="0" indent="0" marL="0">
-                        <a:buNone/>
-                      </a:pPr>
-                      <a:r>
-                        <a:rPr/>
-                        <a:t>Up to the Task | Ford</a:t>
-                      </a:r>
-                    </a:p>
-                  </a:txBody>
-                </a:tc>
-                <a:tc>
-                  <a:txBody>
-                    <a:bodyPr/>
-                    <a:lstStyle/>
-                    <a:p>
-                      <a:pPr lvl="0" indent="0" marL="0">
-                        <a:buNone/>
-                      </a:pPr>
-                      <a:r>
-                        <a:rPr/>
-                        <a:t>2025-09-10</a:t>
-                      </a:r>
-                    </a:p>
-                  </a:txBody>
-                </a:tc>
-                <a:tc>
-                  <a:txBody>
-                    <a:bodyPr/>
-                    <a:lstStyle/>
-                    <a:p>
-                      <a:pPr lvl="0" indent="0" marL="0">
-                        <a:buNone/>
-                      </a:pPr>
-                      <a:r>
-                        <a:rPr/>
-                        <a:t>15s</a:t>
-                      </a:r>
-                    </a:p>
-                  </a:txBody>
-                </a:tc>
-                <a:tc>
-                  <a:txBody>
-                    <a:bodyPr/>
-                    <a:lstStyle/>
-                    <a:p>
-                      <a:pPr lvl="0" indent="0" marL="0" algn="r">
-                        <a:buNone/>
-                      </a:pPr>
-                      <a:r>
-                        <a:rPr/>
-                        <a:t>4,550</a:t>
-                      </a:r>
-                    </a:p>
-                  </a:txBody>
-                </a:tc>
-                <a:tc>
-                  <a:txBody>
-                    <a:bodyPr/>
-                    <a:lstStyle/>
-                    <a:p>
-                      <a:pPr lvl="0" indent="0" marL="0" algn="r">
-                        <a:buNone/>
-                      </a:pPr>
-                      <a:r>
-                        <a:rPr/>
-                        <a:t>88</a:t>
-                      </a:r>
-                    </a:p>
-                  </a:txBody>
-                </a:tc>
-                <a:tc>
-                  <a:txBody>
-                    <a:bodyPr/>
-                    <a:lstStyle/>
-                    <a:p>
-                      <a:pPr lvl="0" indent="0" marL="0" algn="r">
-                        <a:buNone/>
-                      </a:pPr>
-                      <a:r>
-                        <a:rPr/>
-                        <a:t>1.93</a:t>
-                      </a:r>
-                    </a:p>
-                  </a:txBody>
-                </a:tc>
-              </a:tr>
-            </a:tbl>
-          </a:graphicData>
-        </a:graphic>
-      </p:graphicFrame>
-    </p:spTree>
-  </p:cSld>
-</p:sld>
-</file>
-
-<file path=ppt/slides/slide6.xml><?xml version="1.0" encoding="utf-8"?>
-<p:sld xmlns:a="http://schemas.openxmlformats.org/drawingml/2006/main" xmlns:r="http://schemas.openxmlformats.org/officeDocument/2006/relationships" xmlns:p="http://schemas.openxmlformats.org/presentationml/2006/main">
-  <p:cSld>
-    <p:spTree>
-      <p:nvGrpSpPr>
-        <p:cNvPr id="1" name=""/>
-        <p:cNvGrpSpPr/>
-        <p:nvPr/>
-      </p:nvGrpSpPr>
-      <p:grpSpPr>
-        <a:xfrm>
-          <a:off x="0" y="0"/>
-          <a:ext cx="0" cy="0"/>
-          <a:chOff x="0" y="0"/>
-          <a:chExt cx="0" cy="0"/>
-        </a:xfrm>
-      </p:grpSpPr>
-      <p:sp>
-        <p:nvSpPr>
-          <p:cNvPr id="3" name="Content Placeholder 2"/>
-          <p:cNvSpPr>
-            <a:spLocks noGrp="1"/>
-          </p:cNvSpPr>
-          <p:nvPr>
-            <p:ph idx="1"/>
-          </p:nvPr>
-        </p:nvSpPr>
-        <p:spPr/>
-        <p:txBody>
-          <a:bodyPr/>
-          <a:lstStyle/>
-          <a:p>
-            <a:pPr lvl="0" indent="0" marL="0">
-              <a:buNone/>
-            </a:pPr>
-            <a:r>
-              <a:rPr i="1"/>
-              <a:t>Sources: </a:t>
-            </a:r>
-            <a:r>
-              <a:rPr i="1">
-                <a:latin typeface="Courier"/>
-              </a:rPr>
-              <a:t>data/external/youtube_metrics.csv</a:t>
-            </a:r>
-            <a:r>
-              <a:rPr i="1"/>
-              <a:t> generated via </a:t>
-            </a:r>
-            <a:r>
-              <a:rPr i="1">
-                <a:latin typeface="Courier"/>
-              </a:rPr>
-              <a:t>scripts/summarize_youtube_metadata.py</a:t>
-            </a:r>
-            <a:r>
-              <a:rPr i="1"/>
-              <a:t>.</a:t>
-            </a:r>
-          </a:p>
-        </p:txBody>
-      </p:sp>
-    </p:spTree>
-  </p:cSld>
-</p:sld>
-</file>
-
-<file path=ppt/slides/slide7.xml><?xml version="1.0" encoding="utf-8"?>
-<p:sld xmlns:a="http://schemas.openxmlformats.org/drawingml/2006/main" xmlns:r="http://schemas.openxmlformats.org/officeDocument/2006/relationships" xmlns:p="http://schemas.openxmlformats.org/presentationml/2006/main">
-  <p:cSld>
-    <p:spTree>
-      <p:nvGrpSpPr>
-        <p:cNvPr id="1" name=""/>
-        <p:cNvGrpSpPr/>
-        <p:nvPr/>
-      </p:nvGrpSpPr>
-      <p:grpSpPr>
-        <a:xfrm>
-          <a:off x="0" y="0"/>
-          <a:ext cx="0" cy="0"/>
-          <a:chOff x="0" y="0"/>
-          <a:chExt cx="0" cy="0"/>
-        </a:xfrm>
-      </p:grpSpPr>
-      <p:sp>
-        <p:nvSpPr>
-          <p:cNvPr id="2" name="Title 1"/>
-          <p:cNvSpPr>
-            <a:spLocks noGrp="1"/>
-          </p:cNvSpPr>
-          <p:nvPr>
-            <p:ph type="title"/>
-          </p:nvPr>
-        </p:nvSpPr>
-        <p:spPr/>
-        <p:txBody>
-          <a:bodyPr/>
-          <a:lstStyle/>
-          <a:p>
-            <a:pPr lvl="0" indent="0" marL="0">
-              <a:buNone/>
-            </a:pPr>
-            <a:r>
-              <a:rPr/>
-              <a:t>Digital Pulse – Twitter Listening (Ready Set Ford)</a:t>
-            </a:r>
-          </a:p>
-        </p:txBody>
-      </p:sp>
-      <p:pic>
-        <p:nvPicPr>
-          <p:cNvPr descr="fig:  visuals/twitter_readysetford_top_hashtags.png" id="0" name="Picture 1"/>
-          <p:cNvPicPr>
-            <a:picLocks noGrp="1" noChangeAspect="1"/>
-          </p:cNvPicPr>
-          <p:nvPr/>
-        </p:nvPicPr>
-        <p:blipFill>
-          <a:blip r:embed="rId2"/>
-          <a:stretch>
-            <a:fillRect/>
-          </a:stretch>
-        </p:blipFill>
-        <p:spPr bwMode="auto">
-          <a:xfrm>
-            <a:off x="2413000" y="1193800"/>
-            <a:ext cx="4318000" cy="2882900"/>
-          </a:xfrm>
-          <a:prstGeom prst="rect">
-            <a:avLst/>
-          </a:prstGeom>
-          <a:noFill/>
-          <a:ln w="9525">
-            <a:noFill/>
-            <a:headEnd/>
-            <a:tailEnd/>
-          </a:ln>
-        </p:spPr>
-      </p:pic>
-      <p:sp>
-        <p:nvSpPr>
-          <p:cNvPr id="1" name="TextBox 3"/>
-          <p:cNvSpPr txBox="1"/>
-          <p:nvPr/>
-        </p:nvSpPr>
-        <p:spPr>
-          <a:xfrm>
-            <a:off x="457200" y="4076700"/>
-            <a:ext cx="8229600" cy="508000"/>
-          </a:xfrm>
-          <a:prstGeom prst="rect">
-            <a:avLst/>
-          </a:prstGeom>
-          <a:noFill/>
-        </p:spPr>
-        <p:txBody>
-          <a:bodyPr/>
-          <a:lstStyle/>
-          <a:p>
-            <a:pPr lvl="0" indent="0" marL="0" algn="ctr">
-              <a:buNone/>
-            </a:pPr>
-            <a:r>
-              <a:rPr/>
-              <a:t>Top Ready Set Ford hashtags</a:t>
-            </a:r>
-          </a:p>
-        </p:txBody>
-      </p:sp>
-    </p:spTree>
-  </p:cSld>
-</p:sld>
-</file>
-
-<file path=ppt/slides/slide8.xml><?xml version="1.0" encoding="utf-8"?>
-<p:sld xmlns:a="http://schemas.openxmlformats.org/drawingml/2006/main" xmlns:r="http://schemas.openxmlformats.org/officeDocument/2006/relationships" xmlns:p="http://schemas.openxmlformats.org/presentationml/2006/main">
-  <p:cSld>
-    <p:spTree>
-      <p:nvGrpSpPr>
-        <p:cNvPr id="1" name=""/>
-        <p:cNvGrpSpPr/>
-        <p:nvPr/>
-      </p:nvGrpSpPr>
-      <p:grpSpPr>
-        <a:xfrm>
-          <a:off x="0" y="0"/>
-          <a:ext cx="0" cy="0"/>
-          <a:chOff x="0" y="0"/>
-          <a:chExt cx="0" cy="0"/>
-        </a:xfrm>
-      </p:grpSpPr>
-      <p:sp>
-        <p:nvSpPr>
-          <p:cNvPr id="4" name="Text Placeholder 3"/>
-          <p:cNvSpPr>
-            <a:spLocks noGrp="1"/>
-          </p:cNvSpPr>
-          <p:nvPr>
-            <p:ph idx="2" sz="half" type="body"/>
-          </p:nvPr>
-        </p:nvSpPr>
-        <p:spPr/>
-        <p:txBody>
-          <a:bodyPr/>
-          <a:lstStyle/>
-          <a:p>
-            <a:pPr lvl="0" indent="0" marL="0">
-              <a:buNone/>
-            </a:pPr>
-            <a:r>
-              <a:rPr/>
-              <a:t>Total captured tweets: </a:t>
-            </a:r>
-            <a:r>
-              <a:rPr b="1"/>
-              <a:t>25</a:t>
-            </a:r>
-            <a:r>
-              <a:rPr/>
-              <a:t> (limit 200, 6-day window).</a:t>
-            </a:r>
-          </a:p>
-        </p:txBody>
-      </p:sp>
-      <p:graphicFrame>
-        <p:nvGraphicFramePr>
-          <p:cNvPr id="6" name="Content Placeholder 5"/>
-          <p:cNvGraphicFramePr>
-            <a:graphicFrameLocks noGrp="1"/>
-          </p:cNvGraphicFramePr>
-          <p:nvPr>
-            <p:ph idx="1"/>
-          </p:nvPr>
-        </p:nvGraphicFramePr>
-        <p:xfrm>
-          <a:off x="3568700" y="203200"/>
-          <a:ext cx="5105400" cy="4381500"/>
-        </p:xfrm>
-        <a:graphic>
-          <a:graphicData uri="http://schemas.openxmlformats.org/drawingml/2006/table">
-            <a:tbl>
-              <a:tblPr firstRow="1" bandRow="1">
-                <a:tableStyleId>{5C22544A-7EE6-4342-B048-85BDC9FD1C3A}</a:tableStyleId>
-              </a:tblPr>
-              <a:tblGrid>
-                <a:gridCol w="1701800"/>
-                <a:gridCol w="1701800"/>
-                <a:gridCol w="1701800"/>
-              </a:tblGrid>
-              <a:tr h="0">
-                <a:tc>
-                  <a:txBody>
-                    <a:bodyPr/>
-                    <a:lstStyle/>
-                    <a:p>
-                      <a:pPr lvl="0" indent="0" marL="0" algn="r">
-                        <a:buNone/>
-                      </a:pPr>
-                      <a:r>
-                        <a:rPr/>
-                        <a:t>Rank</a:t>
-                      </a:r>
-                    </a:p>
-                  </a:txBody>
-                  <a:tcPr/>
-                </a:tc>
-                <a:tc>
-                  <a:txBody>
-                    <a:bodyPr/>
-                    <a:lstStyle/>
-                    <a:p>
-                      <a:pPr lvl="0" indent="0" marL="0">
-                        <a:buNone/>
-                      </a:pPr>
-                      <a:r>
-                        <a:rPr/>
-                        <a:t>Hashtag</a:t>
-                      </a:r>
-                    </a:p>
-                  </a:txBody>
-                  <a:tcPr/>
-                </a:tc>
-                <a:tc>
-                  <a:txBody>
-                    <a:bodyPr/>
-                    <a:lstStyle/>
-                    <a:p>
-                      <a:pPr lvl="0" indent="0" marL="0" algn="r">
-                        <a:buNone/>
-                      </a:pPr>
-                      <a:r>
-                        <a:rPr/>
-                        <a:t>Mentions</a:t>
-                      </a:r>
-                    </a:p>
-                  </a:txBody>
-                  <a:tcPr/>
-                </a:tc>
-              </a:tr>
-              <a:tr h="0">
-                <a:tc>
-                  <a:txBody>
-                    <a:bodyPr/>
-                    <a:lstStyle/>
-                    <a:p>
-                      <a:pPr lvl="0" indent="0" marL="0" algn="r">
-                        <a:buNone/>
-                      </a:pPr>
-                      <a:r>
-                        <a:rPr/>
-                        <a:t>1</a:t>
-                      </a:r>
-                    </a:p>
-                  </a:txBody>
-                </a:tc>
-                <a:tc>
-                  <a:txBody>
-                    <a:bodyPr/>
-                    <a:lstStyle/>
-                    <a:p>
-                      <a:pPr lvl="0" indent="0" marL="0">
-                        <a:buNone/>
-                      </a:pPr>
-                      <a:r>
-                        <a:rPr/>
-                        <a:t>#Ford</a:t>
-                      </a:r>
-                    </a:p>
-                  </a:txBody>
-                </a:tc>
-                <a:tc>
-                  <a:txBody>
-                    <a:bodyPr/>
-                    <a:lstStyle/>
-                    <a:p>
-                      <a:pPr lvl="0" indent="0" marL="0" algn="r">
-                        <a:buNone/>
-                      </a:pPr>
-                      <a:r>
-                        <a:rPr/>
-                        <a:t>7</a:t>
-                      </a:r>
-                    </a:p>
-                  </a:txBody>
-                </a:tc>
-              </a:tr>
-              <a:tr h="0">
-                <a:tc>
-                  <a:txBody>
-                    <a:bodyPr/>
-                    <a:lstStyle/>
-                    <a:p>
-                      <a:pPr lvl="0" indent="0" marL="0" algn="r">
-                        <a:buNone/>
-                      </a:pPr>
-                      <a:r>
-                        <a:rPr/>
-                        <a:t>2</a:t>
-                      </a:r>
-                    </a:p>
-                  </a:txBody>
-                </a:tc>
-                <a:tc>
-                  <a:txBody>
-                    <a:bodyPr/>
-                    <a:lstStyle/>
-                    <a:p>
-                      <a:pPr lvl="0" indent="0" marL="0">
-                        <a:buNone/>
-                      </a:pPr>
-                      <a:r>
-                        <a:rPr/>
-                        <a:t>#ReadySetFord</a:t>
-                      </a:r>
-                    </a:p>
-                  </a:txBody>
-                </a:tc>
-                <a:tc>
-                  <a:txBody>
-                    <a:bodyPr/>
-                    <a:lstStyle/>
-                    <a:p>
-                      <a:pPr lvl="0" indent="0" marL="0" algn="r">
-                        <a:buNone/>
-                      </a:pPr>
-                      <a:r>
-                        <a:rPr/>
-                        <a:t>3</a:t>
-                      </a:r>
-                    </a:p>
-                  </a:txBody>
-                </a:tc>
-              </a:tr>
-              <a:tr h="0">
-                <a:tc>
-                  <a:txBody>
-                    <a:bodyPr/>
-                    <a:lstStyle/>
-                    <a:p>
-                      <a:pPr lvl="0" indent="0" marL="0" algn="r">
-                        <a:buNone/>
-                      </a:pPr>
-                      <a:r>
-                        <a:rPr/>
-                        <a:t>3</a:t>
-                      </a:r>
-                    </a:p>
-                  </a:txBody>
-                </a:tc>
-                <a:tc>
-                  <a:txBody>
-                    <a:bodyPr/>
-                    <a:lstStyle/>
-                    <a:p>
-                      <a:pPr lvl="0" indent="0" marL="0">
-                        <a:buNone/>
-                      </a:pPr>
-                      <a:r>
-                        <a:rPr/>
-                        <a:t>#Mustang</a:t>
-                      </a:r>
-                    </a:p>
-                  </a:txBody>
-                </a:tc>
-                <a:tc>
-                  <a:txBody>
-                    <a:bodyPr/>
-                    <a:lstStyle/>
-                    <a:p>
-                      <a:pPr lvl="0" indent="0" marL="0" algn="r">
-                        <a:buNone/>
-                      </a:pPr>
-                      <a:r>
-                        <a:rPr/>
-                        <a:t>2</a:t>
-                      </a:r>
-                    </a:p>
-                  </a:txBody>
-                </a:tc>
-              </a:tr>
-              <a:tr h="0">
-                <a:tc>
-                  <a:txBody>
-                    <a:bodyPr/>
-                    <a:lstStyle/>
-                    <a:p>
-                      <a:pPr lvl="0" indent="0" marL="0" algn="r">
-                        <a:buNone/>
-                      </a:pPr>
-                      <a:r>
-                        <a:rPr/>
-                        <a:t>4</a:t>
-                      </a:r>
-                    </a:p>
-                  </a:txBody>
-                </a:tc>
-                <a:tc>
-                  <a:txBody>
-                    <a:bodyPr/>
-                    <a:lstStyle/>
-                    <a:p>
-                      <a:pPr lvl="0" indent="0" marL="0">
-                        <a:buNone/>
-                      </a:pPr>
-                      <a:r>
-                        <a:rPr/>
-                        <a:t>#SwapYourRide</a:t>
-                      </a:r>
-                    </a:p>
-                  </a:txBody>
-                </a:tc>
-                <a:tc>
-                  <a:txBody>
-                    <a:bodyPr/>
-                    <a:lstStyle/>
-                    <a:p>
-                      <a:pPr lvl="0" indent="0" marL="0" algn="r">
-                        <a:buNone/>
-                      </a:pPr>
-                      <a:r>
-                        <a:rPr/>
-                        <a:t>2</a:t>
-                      </a:r>
-                    </a:p>
-                  </a:txBody>
-                </a:tc>
-              </a:tr>
-              <a:tr h="0">
-                <a:tc>
-                  <a:txBody>
-                    <a:bodyPr/>
-                    <a:lstStyle/>
-                    <a:p>
-                      <a:pPr lvl="0" indent="0" marL="0" algn="r">
-                        <a:buNone/>
-                      </a:pPr>
-                      <a:r>
-                        <a:rPr/>
-                        <a:t>5</a:t>
-                      </a:r>
-                    </a:p>
-                  </a:txBody>
-                </a:tc>
-                <a:tc>
-                  <a:txBody>
-                    <a:bodyPr/>
-                    <a:lstStyle/>
-                    <a:p>
-                      <a:pPr lvl="0" indent="0" marL="0">
-                        <a:buNone/>
-                      </a:pPr>
-                      <a:r>
-                        <a:rPr/>
-                        <a:t>#PlanetFord</a:t>
-                      </a:r>
-                    </a:p>
-                  </a:txBody>
-                </a:tc>
-                <a:tc>
-                  <a:txBody>
-                    <a:bodyPr/>
-                    <a:lstStyle/>
-                    <a:p>
-                      <a:pPr lvl="0" indent="0" marL="0" algn="r">
-                        <a:buNone/>
-                      </a:pPr>
-                      <a:r>
-                        <a:rPr/>
-                        <a:t>2</a:t>
-                      </a:r>
-                    </a:p>
-                  </a:txBody>
-                </a:tc>
-              </a:tr>
-            </a:tbl>
-          </a:graphicData>
-        </a:graphic>
-      </p:graphicFrame>
-    </p:spTree>
-  </p:cSld>
-</p:sld>
-</file>
-
-<file path=ppt/slides/slide9.xml><?xml version="1.0" encoding="utf-8"?>
-<p:sld xmlns:a="http://schemas.openxmlformats.org/drawingml/2006/main" xmlns:r="http://schemas.openxmlformats.org/officeDocument/2006/relationships" xmlns:p="http://schemas.openxmlformats.org/presentationml/2006/main">
-  <p:cSld>
-    <p:spTree>
-      <p:nvGrpSpPr>
-        <p:cNvPr id="1" name=""/>
-        <p:cNvGrpSpPr/>
-        <p:nvPr/>
-      </p:nvGrpSpPr>
-      <p:grpSpPr>
-        <a:xfrm>
-          <a:off x="0" y="0"/>
-          <a:ext cx="0" cy="0"/>
-          <a:chOff x="0" y="0"/>
-          <a:chExt cx="0" cy="0"/>
-        </a:xfrm>
-      </p:grpSpPr>
-      <p:sp>
-        <p:nvSpPr>
-          <p:cNvPr id="3" name="Content Placeholder 2"/>
-          <p:cNvSpPr>
-            <a:spLocks noGrp="1"/>
-          </p:cNvSpPr>
-          <p:nvPr>
-            <p:ph idx="1"/>
-          </p:nvPr>
-        </p:nvSpPr>
-        <p:spPr/>
-        <p:txBody>
-          <a:bodyPr/>
-          <a:lstStyle/>
-          <a:p>
-            <a:pPr lvl="0" indent="0" marL="0">
-              <a:buNone/>
-            </a:pPr>
-            <a:r>
-              <a:rPr/>
-              <a:t>Representative posts: - “⚡ Ready Set #Ford is here! … From Broncos to Mustangs to Ford Pro, there’s a Ford built to spark your next adventure.” - “Get ready for a fantastic fall during the Ready, Set, Ford Event. We’ll help you find the perfect EV at the right price.” - “Why make me set an appointment … Horrible service!” (service experience pain point to monitor)</a:t>
-            </a:r>
-          </a:p>
-          <a:p>
-            <a:pPr lvl="0" indent="0" marL="0">
-              <a:buNone/>
-            </a:pPr>
-            <a:r>
-              <a:rPr i="1"/>
-              <a:t>Source: </a:t>
-            </a:r>
-            <a:r>
-              <a:rPr i="1">
-                <a:latin typeface="Courier"/>
-              </a:rPr>
-              <a:t>twitter_readysetford.jsonl</a:t>
-            </a:r>
-            <a:r>
-              <a:rPr i="1"/>
-              <a:t> via </a:t>
-            </a:r>
-            <a:r>
-              <a:rPr i="1">
-                <a:latin typeface="Courier"/>
-              </a:rPr>
-              <a:t>scripts/collect_additional_data.py</a:t>
-            </a:r>
-            <a:r>
-              <a:rPr i="1"/>
-              <a:t> (22 Sep run, twarc2 search).</a:t>
             </a:r>
           </a:p>
         </p:txBody>

</xml_diff>

<commit_message>
Add contributor guide and historic campaign slide
</commit_message>
<xml_diff>
--- a/deck/Ready_Set_Ford_deck.pptx
+++ b/deck/Ready_Set_Ford_deck.pptx
@@ -6,6 +6,16 @@
   </p:sldMasterIdLst>
   <p:sldIdLst>
     <p:sldId id="256" r:id="rId2"/>
+    <p:sldId id="257" r:id="rId3"/>
+    <p:sldId id="258" r:id="rId4"/>
+    <p:sldId id="259" r:id="rId5"/>
+    <p:sldId id="260" r:id="rId6"/>
+    <p:sldId id="261" r:id="rId7"/>
+    <p:sldId id="262" r:id="rId8"/>
+    <p:sldId id="263" r:id="rId9"/>
+    <p:sldId id="264" r:id="rId10"/>
+    <p:sldId id="265" r:id="rId11"/>
+    <p:sldId id="266" r:id="rId12"/>
   </p:sldIdLst>
   <p:sldSz cx="9144000" cy="5143500" type="screen16x9"/>
   <p:notesSz cx="6858000" cy="9144000"/>
@@ -3330,7 +3340,25 @@
             </a:r>
             <a:r>
               <a:rPr/>
-              <a:t>.</a:t>
+              <a:t>. 10a. </a:t>
+            </a:r>
+            <a:r>
+              <a:rPr b="1"/>
+              <a:t>Campaign Benchmarks – Historical Context</a:t>
+            </a:r>
+            <a:r>
+              <a:rPr/>
+              <a:t> – Table from </a:t>
+            </a:r>
+            <a:r>
+              <a:rPr>
+                <a:latin typeface="Courier"/>
+              </a:rPr>
+              <a:t>data/external/historic_campaigns.csv</a:t>
+            </a:r>
+            <a:r>
+              <a:rPr/>
+              <a:t> comparing Go Further (2012), From America, For America (2025), and Ready Set Ford KPI baselines.</a:t>
             </a:r>
           </a:p>
           <a:p>
@@ -3366,6 +3394,2506 @@
             <a:r>
               <a:rPr i="1"/>
               <a:t>Draft updated 22 Sep 2025. Maintain ~12 slides; adjust as new insights emerge.</a:t>
+            </a:r>
+          </a:p>
+        </p:txBody>
+      </p:sp>
+    </p:spTree>
+  </p:cSld>
+</p:sld>
+</file>
+
+<file path=ppt/slides/slide10.xml><?xml version="1.0" encoding="utf-8"?>
+<p:sld xmlns:a="http://schemas.openxmlformats.org/drawingml/2006/main" xmlns:r="http://schemas.openxmlformats.org/officeDocument/2006/relationships" xmlns:p="http://schemas.openxmlformats.org/presentationml/2006/main">
+  <p:cSld>
+    <p:spTree>
+      <p:nvGrpSpPr>
+        <p:cNvPr id="1" name=""/>
+        <p:cNvGrpSpPr/>
+        <p:nvPr/>
+      </p:nvGrpSpPr>
+      <p:grpSpPr>
+        <a:xfrm>
+          <a:off x="0" y="0"/>
+          <a:ext cx="0" cy="0"/>
+          <a:chOff x="0" y="0"/>
+          <a:chExt cx="0" cy="0"/>
+        </a:xfrm>
+      </p:grpSpPr>
+      <p:sp>
+        <p:nvSpPr>
+          <p:cNvPr id="4" name="Text Placeholder 3"/>
+          <p:cNvSpPr>
+            <a:spLocks noGrp="1"/>
+          </p:cNvSpPr>
+          <p:nvPr>
+            <p:ph idx="2" sz="half" type="body"/>
+          </p:nvPr>
+        </p:nvSpPr>
+        <p:spPr/>
+        <p:txBody>
+          <a:bodyPr/>
+          <a:lstStyle/>
+          <a:p>
+            <a:pPr lvl="0" indent="0" marL="0">
+              <a:buNone/>
+            </a:pPr>
+            <a:r>
+              <a:rPr/>
+              <a:t>Total captured tweets: </a:t>
+            </a:r>
+            <a:r>
+              <a:rPr b="1"/>
+              <a:t>25</a:t>
+            </a:r>
+            <a:r>
+              <a:rPr/>
+              <a:t> (limit 200, 6-day window).</a:t>
+            </a:r>
+          </a:p>
+        </p:txBody>
+      </p:sp>
+      <p:graphicFrame>
+        <p:nvGraphicFramePr>
+          <p:cNvPr id="6" name="Content Placeholder 5"/>
+          <p:cNvGraphicFramePr>
+            <a:graphicFrameLocks noGrp="1"/>
+          </p:cNvGraphicFramePr>
+          <p:nvPr>
+            <p:ph idx="1"/>
+          </p:nvPr>
+        </p:nvGraphicFramePr>
+        <p:xfrm>
+          <a:off x="3568700" y="203200"/>
+          <a:ext cx="5105400" cy="4381500"/>
+        </p:xfrm>
+        <a:graphic>
+          <a:graphicData uri="http://schemas.openxmlformats.org/drawingml/2006/table">
+            <a:tbl>
+              <a:tblPr firstRow="1" bandRow="1">
+                <a:tableStyleId>{5C22544A-7EE6-4342-B048-85BDC9FD1C3A}</a:tableStyleId>
+              </a:tblPr>
+              <a:tblGrid>
+                <a:gridCol w="1701800"/>
+                <a:gridCol w="1701800"/>
+                <a:gridCol w="1701800"/>
+              </a:tblGrid>
+              <a:tr h="0">
+                <a:tc>
+                  <a:txBody>
+                    <a:bodyPr/>
+                    <a:lstStyle/>
+                    <a:p>
+                      <a:pPr lvl="0" indent="0" marL="0" algn="r">
+                        <a:buNone/>
+                      </a:pPr>
+                      <a:r>
+                        <a:rPr/>
+                        <a:t>Rank</a:t>
+                      </a:r>
+                    </a:p>
+                  </a:txBody>
+                  <a:tcPr/>
+                </a:tc>
+                <a:tc>
+                  <a:txBody>
+                    <a:bodyPr/>
+                    <a:lstStyle/>
+                    <a:p>
+                      <a:pPr lvl="0" indent="0" marL="0">
+                        <a:buNone/>
+                      </a:pPr>
+                      <a:r>
+                        <a:rPr/>
+                        <a:t>Hashtag</a:t>
+                      </a:r>
+                    </a:p>
+                  </a:txBody>
+                  <a:tcPr/>
+                </a:tc>
+                <a:tc>
+                  <a:txBody>
+                    <a:bodyPr/>
+                    <a:lstStyle/>
+                    <a:p>
+                      <a:pPr lvl="0" indent="0" marL="0" algn="r">
+                        <a:buNone/>
+                      </a:pPr>
+                      <a:r>
+                        <a:rPr/>
+                        <a:t>Mentions</a:t>
+                      </a:r>
+                    </a:p>
+                  </a:txBody>
+                  <a:tcPr/>
+                </a:tc>
+              </a:tr>
+              <a:tr h="0">
+                <a:tc>
+                  <a:txBody>
+                    <a:bodyPr/>
+                    <a:lstStyle/>
+                    <a:p>
+                      <a:pPr lvl="0" indent="0" marL="0" algn="r">
+                        <a:buNone/>
+                      </a:pPr>
+                      <a:r>
+                        <a:rPr/>
+                        <a:t>1</a:t>
+                      </a:r>
+                    </a:p>
+                  </a:txBody>
+                </a:tc>
+                <a:tc>
+                  <a:txBody>
+                    <a:bodyPr/>
+                    <a:lstStyle/>
+                    <a:p>
+                      <a:pPr lvl="0" indent="0" marL="0">
+                        <a:buNone/>
+                      </a:pPr>
+                      <a:r>
+                        <a:rPr/>
+                        <a:t>#Ford</a:t>
+                      </a:r>
+                    </a:p>
+                  </a:txBody>
+                </a:tc>
+                <a:tc>
+                  <a:txBody>
+                    <a:bodyPr/>
+                    <a:lstStyle/>
+                    <a:p>
+                      <a:pPr lvl="0" indent="0" marL="0" algn="r">
+                        <a:buNone/>
+                      </a:pPr>
+                      <a:r>
+                        <a:rPr/>
+                        <a:t>7</a:t>
+                      </a:r>
+                    </a:p>
+                  </a:txBody>
+                </a:tc>
+              </a:tr>
+              <a:tr h="0">
+                <a:tc>
+                  <a:txBody>
+                    <a:bodyPr/>
+                    <a:lstStyle/>
+                    <a:p>
+                      <a:pPr lvl="0" indent="0" marL="0" algn="r">
+                        <a:buNone/>
+                      </a:pPr>
+                      <a:r>
+                        <a:rPr/>
+                        <a:t>2</a:t>
+                      </a:r>
+                    </a:p>
+                  </a:txBody>
+                </a:tc>
+                <a:tc>
+                  <a:txBody>
+                    <a:bodyPr/>
+                    <a:lstStyle/>
+                    <a:p>
+                      <a:pPr lvl="0" indent="0" marL="0">
+                        <a:buNone/>
+                      </a:pPr>
+                      <a:r>
+                        <a:rPr/>
+                        <a:t>#ReadySetFord</a:t>
+                      </a:r>
+                    </a:p>
+                  </a:txBody>
+                </a:tc>
+                <a:tc>
+                  <a:txBody>
+                    <a:bodyPr/>
+                    <a:lstStyle/>
+                    <a:p>
+                      <a:pPr lvl="0" indent="0" marL="0" algn="r">
+                        <a:buNone/>
+                      </a:pPr>
+                      <a:r>
+                        <a:rPr/>
+                        <a:t>3</a:t>
+                      </a:r>
+                    </a:p>
+                  </a:txBody>
+                </a:tc>
+              </a:tr>
+              <a:tr h="0">
+                <a:tc>
+                  <a:txBody>
+                    <a:bodyPr/>
+                    <a:lstStyle/>
+                    <a:p>
+                      <a:pPr lvl="0" indent="0" marL="0" algn="r">
+                        <a:buNone/>
+                      </a:pPr>
+                      <a:r>
+                        <a:rPr/>
+                        <a:t>3</a:t>
+                      </a:r>
+                    </a:p>
+                  </a:txBody>
+                </a:tc>
+                <a:tc>
+                  <a:txBody>
+                    <a:bodyPr/>
+                    <a:lstStyle/>
+                    <a:p>
+                      <a:pPr lvl="0" indent="0" marL="0">
+                        <a:buNone/>
+                      </a:pPr>
+                      <a:r>
+                        <a:rPr/>
+                        <a:t>#Mustang</a:t>
+                      </a:r>
+                    </a:p>
+                  </a:txBody>
+                </a:tc>
+                <a:tc>
+                  <a:txBody>
+                    <a:bodyPr/>
+                    <a:lstStyle/>
+                    <a:p>
+                      <a:pPr lvl="0" indent="0" marL="0" algn="r">
+                        <a:buNone/>
+                      </a:pPr>
+                      <a:r>
+                        <a:rPr/>
+                        <a:t>2</a:t>
+                      </a:r>
+                    </a:p>
+                  </a:txBody>
+                </a:tc>
+              </a:tr>
+              <a:tr h="0">
+                <a:tc>
+                  <a:txBody>
+                    <a:bodyPr/>
+                    <a:lstStyle/>
+                    <a:p>
+                      <a:pPr lvl="0" indent="0" marL="0" algn="r">
+                        <a:buNone/>
+                      </a:pPr>
+                      <a:r>
+                        <a:rPr/>
+                        <a:t>4</a:t>
+                      </a:r>
+                    </a:p>
+                  </a:txBody>
+                </a:tc>
+                <a:tc>
+                  <a:txBody>
+                    <a:bodyPr/>
+                    <a:lstStyle/>
+                    <a:p>
+                      <a:pPr lvl="0" indent="0" marL="0">
+                        <a:buNone/>
+                      </a:pPr>
+                      <a:r>
+                        <a:rPr/>
+                        <a:t>#SwapYourRide</a:t>
+                      </a:r>
+                    </a:p>
+                  </a:txBody>
+                </a:tc>
+                <a:tc>
+                  <a:txBody>
+                    <a:bodyPr/>
+                    <a:lstStyle/>
+                    <a:p>
+                      <a:pPr lvl="0" indent="0" marL="0" algn="r">
+                        <a:buNone/>
+                      </a:pPr>
+                      <a:r>
+                        <a:rPr/>
+                        <a:t>2</a:t>
+                      </a:r>
+                    </a:p>
+                  </a:txBody>
+                </a:tc>
+              </a:tr>
+              <a:tr h="0">
+                <a:tc>
+                  <a:txBody>
+                    <a:bodyPr/>
+                    <a:lstStyle/>
+                    <a:p>
+                      <a:pPr lvl="0" indent="0" marL="0" algn="r">
+                        <a:buNone/>
+                      </a:pPr>
+                      <a:r>
+                        <a:rPr/>
+                        <a:t>5</a:t>
+                      </a:r>
+                    </a:p>
+                  </a:txBody>
+                </a:tc>
+                <a:tc>
+                  <a:txBody>
+                    <a:bodyPr/>
+                    <a:lstStyle/>
+                    <a:p>
+                      <a:pPr lvl="0" indent="0" marL="0">
+                        <a:buNone/>
+                      </a:pPr>
+                      <a:r>
+                        <a:rPr/>
+                        <a:t>#PlanetFord</a:t>
+                      </a:r>
+                    </a:p>
+                  </a:txBody>
+                </a:tc>
+                <a:tc>
+                  <a:txBody>
+                    <a:bodyPr/>
+                    <a:lstStyle/>
+                    <a:p>
+                      <a:pPr lvl="0" indent="0" marL="0" algn="r">
+                        <a:buNone/>
+                      </a:pPr>
+                      <a:r>
+                        <a:rPr/>
+                        <a:t>2</a:t>
+                      </a:r>
+                    </a:p>
+                  </a:txBody>
+                </a:tc>
+              </a:tr>
+            </a:tbl>
+          </a:graphicData>
+        </a:graphic>
+      </p:graphicFrame>
+    </p:spTree>
+  </p:cSld>
+</p:sld>
+</file>
+
+<file path=ppt/slides/slide11.xml><?xml version="1.0" encoding="utf-8"?>
+<p:sld xmlns:a="http://schemas.openxmlformats.org/drawingml/2006/main" xmlns:r="http://schemas.openxmlformats.org/officeDocument/2006/relationships" xmlns:p="http://schemas.openxmlformats.org/presentationml/2006/main">
+  <p:cSld>
+    <p:spTree>
+      <p:nvGrpSpPr>
+        <p:cNvPr id="1" name=""/>
+        <p:cNvGrpSpPr/>
+        <p:nvPr/>
+      </p:nvGrpSpPr>
+      <p:grpSpPr>
+        <a:xfrm>
+          <a:off x="0" y="0"/>
+          <a:ext cx="0" cy="0"/>
+          <a:chOff x="0" y="0"/>
+          <a:chExt cx="0" cy="0"/>
+        </a:xfrm>
+      </p:grpSpPr>
+      <p:sp>
+        <p:nvSpPr>
+          <p:cNvPr id="3" name="Content Placeholder 2"/>
+          <p:cNvSpPr>
+            <a:spLocks noGrp="1"/>
+          </p:cNvSpPr>
+          <p:nvPr>
+            <p:ph idx="1"/>
+          </p:nvPr>
+        </p:nvSpPr>
+        <p:spPr/>
+        <p:txBody>
+          <a:bodyPr/>
+          <a:lstStyle/>
+          <a:p>
+            <a:pPr lvl="0" indent="0" marL="0">
+              <a:buNone/>
+            </a:pPr>
+            <a:r>
+              <a:rPr/>
+              <a:t>Representative posts: - “⚡ Ready Set #Ford is here! … From Broncos to Mustangs to Ford Pro, there’s a Ford built to spark your next adventure.” - “Get ready for a fantastic fall during the Ready, Set, Ford Event. We’ll help you find the perfect EV at the right price.” - “Why make me set an appointment … Horrible service!” (service experience pain point to monitor)</a:t>
+            </a:r>
+          </a:p>
+          <a:p>
+            <a:pPr lvl="0" indent="0" marL="0">
+              <a:buNone/>
+            </a:pPr>
+            <a:r>
+              <a:rPr i="1"/>
+              <a:t>Source: </a:t>
+            </a:r>
+            <a:r>
+              <a:rPr i="1">
+                <a:latin typeface="Courier"/>
+              </a:rPr>
+              <a:t>twitter_readysetford.jsonl</a:t>
+            </a:r>
+            <a:r>
+              <a:rPr i="1"/>
+              <a:t> via </a:t>
+            </a:r>
+            <a:r>
+              <a:rPr i="1">
+                <a:latin typeface="Courier"/>
+              </a:rPr>
+              <a:t>scripts/collect_additional_data.py</a:t>
+            </a:r>
+            <a:r>
+              <a:rPr i="1"/>
+              <a:t> (22 Sep run, twarc2 search).</a:t>
+            </a:r>
+          </a:p>
+        </p:txBody>
+      </p:sp>
+    </p:spTree>
+  </p:cSld>
+</p:sld>
+</file>
+
+<file path=ppt/slides/slide2.xml><?xml version="1.0" encoding="utf-8"?>
+<p:sld xmlns:a="http://schemas.openxmlformats.org/drawingml/2006/main" xmlns:r="http://schemas.openxmlformats.org/officeDocument/2006/relationships" xmlns:p="http://schemas.openxmlformats.org/presentationml/2006/main">
+  <p:cSld>
+    <p:spTree>
+      <p:nvGrpSpPr>
+        <p:cNvPr id="1" name=""/>
+        <p:cNvGrpSpPr/>
+        <p:nvPr/>
+      </p:nvGrpSpPr>
+      <p:grpSpPr>
+        <a:xfrm>
+          <a:off x="0" y="0"/>
+          <a:ext cx="0" cy="0"/>
+          <a:chOff x="0" y="0"/>
+          <a:chExt cx="0" cy="0"/>
+        </a:xfrm>
+      </p:grpSpPr>
+      <p:sp>
+        <p:nvSpPr>
+          <p:cNvPr id="2" name="Title 1"/>
+          <p:cNvSpPr>
+            <a:spLocks noGrp="1"/>
+          </p:cNvSpPr>
+          <p:nvPr>
+            <p:ph type="title"/>
+          </p:nvPr>
+        </p:nvSpPr>
+        <p:spPr/>
+        <p:txBody>
+          <a:bodyPr/>
+          <a:lstStyle/>
+          <a:p>
+            <a:pPr lvl="0" indent="0" marL="0">
+              <a:buNone/>
+            </a:pPr>
+            <a:r>
+              <a:rPr/>
+              <a:t>Campaign Benchmarks – Historic Context</a:t>
+            </a:r>
+          </a:p>
+        </p:txBody>
+      </p:sp>
+      <p:graphicFrame>
+        <p:nvGraphicFramePr>
+          <p:cNvPr id="6" name="Content Placeholder 5"/>
+          <p:cNvGraphicFramePr>
+            <a:graphicFrameLocks noGrp="1"/>
+          </p:cNvGraphicFramePr>
+          <p:nvPr>
+            <p:ph idx="1"/>
+          </p:nvPr>
+        </p:nvGraphicFramePr>
+        <p:xfrm>
+          <a:off x="457200" y="1193800"/>
+          <a:ext cx="8229600" cy="3390900"/>
+        </p:xfrm>
+        <a:graphic>
+          <a:graphicData uri="http://schemas.openxmlformats.org/drawingml/2006/table">
+            <a:tbl>
+              <a:tblPr firstRow="1" bandRow="1">
+                <a:tableStyleId>{5C22544A-7EE6-4342-B048-85BDC9FD1C3A}</a:tableStyleId>
+              </a:tblPr>
+              <a:tblGrid>
+                <a:gridCol w="1371600"/>
+                <a:gridCol w="1371600"/>
+                <a:gridCol w="1371600"/>
+                <a:gridCol w="1371600"/>
+                <a:gridCol w="1371600"/>
+                <a:gridCol w="1371600"/>
+              </a:tblGrid>
+              <a:tr h="0">
+                <a:tc>
+                  <a:txBody>
+                    <a:bodyPr/>
+                    <a:lstStyle/>
+                    <a:p>
+                      <a:pPr lvl="0" indent="0" marL="0">
+                        <a:buNone/>
+                      </a:pPr>
+                      <a:r>
+                        <a:rPr/>
+                        <a:t>Campaign</a:t>
+                      </a:r>
+                    </a:p>
+                  </a:txBody>
+                  <a:tcPr/>
+                </a:tc>
+                <a:tc>
+                  <a:txBody>
+                    <a:bodyPr/>
+                    <a:lstStyle/>
+                    <a:p>
+                      <a:pPr lvl="0" indent="0" marL="0">
+                        <a:buNone/>
+                      </a:pPr>
+                      <a:r>
+                        <a:rPr/>
+                        <a:t>Launch</a:t>
+                      </a:r>
+                    </a:p>
+                  </a:txBody>
+                  <a:tcPr/>
+                </a:tc>
+                <a:tc>
+                  <a:txBody>
+                    <a:bodyPr/>
+                    <a:lstStyle/>
+                    <a:p>
+                      <a:pPr lvl="0" indent="0" marL="0">
+                        <a:buNone/>
+                      </a:pPr>
+                      <a:r>
+                        <a:rPr/>
+                        <a:t>Focus</a:t>
+                      </a:r>
+                    </a:p>
+                  </a:txBody>
+                  <a:tcPr/>
+                </a:tc>
+                <a:tc>
+                  <a:txBody>
+                    <a:bodyPr/>
+                    <a:lstStyle/>
+                    <a:p>
+                      <a:pPr lvl="0" indent="0" marL="0">
+                        <a:buNone/>
+                      </a:pPr>
+                      <a:r>
+                        <a:rPr/>
+                        <a:t>Primary Segments</a:t>
+                      </a:r>
+                    </a:p>
+                  </a:txBody>
+                  <a:tcPr/>
+                </a:tc>
+                <a:tc>
+                  <a:txBody>
+                    <a:bodyPr/>
+                    <a:lstStyle/>
+                    <a:p>
+                      <a:pPr lvl="0" indent="0" marL="0">
+                        <a:buNone/>
+                      </a:pPr>
+                      <a:r>
+                        <a:rPr/>
+                        <a:t>Notable Metrics</a:t>
+                      </a:r>
+                    </a:p>
+                  </a:txBody>
+                  <a:tcPr/>
+                </a:tc>
+                <a:tc>
+                  <a:txBody>
+                    <a:bodyPr/>
+                    <a:lstStyle/>
+                    <a:p>
+                      <a:pPr lvl="0" indent="0" marL="0">
+                        <a:buNone/>
+                      </a:pPr>
+                      <a:r>
+                        <a:rPr/>
+                        <a:t>Source</a:t>
+                      </a:r>
+                    </a:p>
+                  </a:txBody>
+                  <a:tcPr/>
+                </a:tc>
+              </a:tr>
+              <a:tr h="0">
+                <a:tc>
+                  <a:txBody>
+                    <a:bodyPr/>
+                    <a:lstStyle/>
+                    <a:p>
+                      <a:pPr lvl="0" indent="0" marL="0">
+                        <a:buNone/>
+                      </a:pPr>
+                      <a:r>
+                        <a:rPr/>
+                        <a:t>Ready Set Ford</a:t>
+                      </a:r>
+                    </a:p>
+                  </a:txBody>
+                </a:tc>
+                <a:tc>
+                  <a:txBody>
+                    <a:bodyPr/>
+                    <a:lstStyle/>
+                    <a:p>
+                      <a:pPr lvl="0" indent="0" marL="0">
+                        <a:buNone/>
+                      </a:pPr>
+                      <a:r>
+                        <a:rPr/>
+                        <a:t>2025</a:t>
+                      </a:r>
+                    </a:p>
+                  </a:txBody>
+                </a:tc>
+                <a:tc>
+                  <a:txBody>
+                    <a:bodyPr/>
+                    <a:lstStyle/>
+                    <a:p>
+                      <a:pPr lvl="0" indent="0" marL="0">
+                        <a:buNone/>
+                      </a:pPr>
+                      <a:r>
+                        <a:rPr/>
+                        <a:t>Capability/Passion/Community/Trust platform aligning Ford+</a:t>
+                      </a:r>
+                    </a:p>
+                  </a:txBody>
+                </a:tc>
+                <a:tc>
+                  <a:txBody>
+                    <a:bodyPr/>
+                    <a:lstStyle/>
+                    <a:p>
+                      <a:pPr lvl="0" indent="0" marL="0">
+                        <a:buNone/>
+                      </a:pPr>
+                      <a:r>
+                        <a:rPr/>
+                        <a:t>Build / Thrill / Adventure (Blue, Model e, Pro)</a:t>
+                      </a:r>
+                    </a:p>
+                  </a:txBody>
+                </a:tc>
+                <a:tc>
+                  <a:txBody>
+                    <a:bodyPr/>
+                    <a:lstStyle/>
+                    <a:p>
+                      <a:pPr lvl="0" indent="0" marL="0">
+                        <a:buNone/>
+                      </a:pPr>
+                      <a:r>
+                        <a:rPr/>
+                        <a:t>First global relaunch in 15+ years; Google Trends index hit 1 mid-Sep 2025</a:t>
+                      </a:r>
+                    </a:p>
+                  </a:txBody>
+                </a:tc>
+                <a:tc>
+                  <a:txBody>
+                    <a:bodyPr/>
+                    <a:lstStyle/>
+                    <a:p>
+                      <a:pPr lvl="0" indent="0" marL="0">
+                        <a:buNone/>
+                      </a:pPr>
+                      <a:r>
+                        <a:rPr/>
+                        <a:t>notes/FordNews_Introducing_Ready_Set_Ford.txt:19</a:t>
+                      </a:r>
+                    </a:p>
+                  </a:txBody>
+                </a:tc>
+              </a:tr>
+              <a:tr h="0">
+                <a:tc>
+                  <a:txBody>
+                    <a:bodyPr/>
+                    <a:lstStyle/>
+                    <a:p>
+                      <a:pPr lvl="0" indent="0" marL="0">
+                        <a:buNone/>
+                      </a:pPr>
+                      <a:r>
+                        <a:rPr/>
+                        <a:t>From America, For America</a:t>
+                      </a:r>
+                    </a:p>
+                  </a:txBody>
+                </a:tc>
+                <a:tc>
+                  <a:txBody>
+                    <a:bodyPr/>
+                    <a:lstStyle/>
+                    <a:p>
+                      <a:pPr lvl="0" indent="0" marL="0">
+                        <a:buNone/>
+                      </a:pPr>
+                      <a:r>
+                        <a:rPr/>
+                        <a:t>2025</a:t>
+                      </a:r>
+                    </a:p>
+                  </a:txBody>
+                </a:tc>
+                <a:tc>
+                  <a:txBody>
+                    <a:bodyPr/>
+                    <a:lstStyle/>
+                    <a:p>
+                      <a:pPr lvl="0" indent="0" marL="0">
+                        <a:buNone/>
+                      </a:pPr>
+                      <a:r>
+                        <a:rPr/>
+                        <a:t>Employee-pricing reassurance during tariff uncertainty</a:t>
+                      </a:r>
+                    </a:p>
+                  </a:txBody>
+                </a:tc>
+                <a:tc>
+                  <a:txBody>
+                    <a:bodyPr/>
+                    <a:lstStyle/>
+                    <a:p>
+                      <a:pPr lvl="0" indent="0" marL="0">
+                        <a:buNone/>
+                      </a:pPr>
+                      <a:r>
+                        <a:rPr/>
+                        <a:t>U.S. value-seeking retail shoppers</a:t>
+                      </a:r>
+                    </a:p>
+                  </a:txBody>
+                </a:tc>
+                <a:tc>
+                  <a:txBody>
+                    <a:bodyPr/>
+                    <a:lstStyle/>
+                    <a:p>
+                      <a:pPr lvl="0" indent="0" marL="0">
+                        <a:buNone/>
+                      </a:pPr>
+                      <a:r>
+                        <a:rPr/>
+                        <a:t>Largest U.S. push earlier in 2025 with national employee pricing</a:t>
+                      </a:r>
+                    </a:p>
+                  </a:txBody>
+                </a:tc>
+                <a:tc>
+                  <a:txBody>
+                    <a:bodyPr/>
+                    <a:lstStyle/>
+                    <a:p>
+                      <a:pPr lvl="0" indent="0" marL="0">
+                        <a:buNone/>
+                      </a:pPr>
+                      <a:r>
+                        <a:rPr/>
+                        <a:t>notes/USA_Today_Ready_Set_Ford.txt:68</a:t>
+                      </a:r>
+                    </a:p>
+                  </a:txBody>
+                </a:tc>
+              </a:tr>
+              <a:tr h="0">
+                <a:tc>
+                  <a:txBody>
+                    <a:bodyPr/>
+                    <a:lstStyle/>
+                    <a:p>
+                      <a:pPr lvl="0" indent="0" marL="0">
+                        <a:buNone/>
+                      </a:pPr>
+                      <a:r>
+                        <a:rPr/>
+                        <a:t>Built Ford Proud</a:t>
+                      </a:r>
+                    </a:p>
+                  </a:txBody>
+                </a:tc>
+                <a:tc>
+                  <a:txBody>
+                    <a:bodyPr/>
+                    <a:lstStyle/>
+                    <a:p>
+                      <a:pPr lvl="0" indent="0" marL="0">
+                        <a:buNone/>
+                      </a:pPr>
+                      <a:r>
+                        <a:rPr/>
+                        <a:t>2018</a:t>
+                      </a:r>
+                    </a:p>
+                  </a:txBody>
+                </a:tc>
+                <a:tc>
+                  <a:txBody>
+                    <a:bodyPr/>
+                    <a:lstStyle/>
+                    <a:p>
+                      <a:pPr lvl="0" indent="0" marL="0">
+                        <a:buNone/>
+                      </a:pPr>
+                      <a:r>
+                        <a:rPr/>
+                        <a:t>Craftsmanship/heritage storytelling</a:t>
+                      </a:r>
+                    </a:p>
+                  </a:txBody>
+                </a:tc>
+                <a:tc>
+                  <a:txBody>
+                    <a:bodyPr/>
+                    <a:lstStyle/>
+                    <a:p>
+                      <a:pPr lvl="0" indent="0" marL="0">
+                        <a:buNone/>
+                      </a:pPr>
+                      <a:r>
+                        <a:rPr/>
+                        <a:t>Ford Blue truck &amp; SUV loyalists</a:t>
+                      </a:r>
+                    </a:p>
+                  </a:txBody>
+                </a:tc>
+                <a:tc>
+                  <a:txBody>
+                    <a:bodyPr/>
+                    <a:lstStyle/>
+                    <a:p>
+                      <a:pPr lvl="0" indent="0" marL="0">
+                        <a:buNone/>
+                      </a:pPr>
+                      <a:r>
+                        <a:rPr/>
+                        <a:t>Reinforced F-Series affinity; ongoing regional activations</a:t>
+                      </a:r>
+                    </a:p>
+                  </a:txBody>
+                </a:tc>
+                <a:tc>
+                  <a:txBody>
+                    <a:bodyPr/>
+                    <a:lstStyle/>
+                    <a:p>
+                      <a:pPr lvl="0" indent="0" marL="0">
+                        <a:buNone/>
+                      </a:pPr>
+                      <a:r>
+                        <a:rPr/>
+                        <a:t>external_trade_press:Built_Ford_Proud_2018</a:t>
+                      </a:r>
+                    </a:p>
+                  </a:txBody>
+                </a:tc>
+              </a:tr>
+              <a:tr h="0">
+                <a:tc>
+                  <a:txBody>
+                    <a:bodyPr/>
+                    <a:lstStyle/>
+                    <a:p>
+                      <a:pPr lvl="0" indent="0" marL="0">
+                        <a:buNone/>
+                      </a:pPr>
+                      <a:r>
+                        <a:rPr/>
+                        <a:t>Go Further</a:t>
+                      </a:r>
+                    </a:p>
+                  </a:txBody>
+                </a:tc>
+                <a:tc>
+                  <a:txBody>
+                    <a:bodyPr/>
+                    <a:lstStyle/>
+                    <a:p>
+                      <a:pPr lvl="0" indent="0" marL="0">
+                        <a:buNone/>
+                      </a:pPr>
+                      <a:r>
+                        <a:rPr/>
+                        <a:t>2012</a:t>
+                      </a:r>
+                    </a:p>
+                  </a:txBody>
+                </a:tc>
+                <a:tc>
+                  <a:txBody>
+                    <a:bodyPr/>
+                    <a:lstStyle/>
+                    <a:p>
+                      <a:pPr lvl="0" indent="0" marL="0">
+                        <a:buNone/>
+                      </a:pPr>
+                      <a:r>
+                        <a:rPr/>
+                        <a:t>Prior global brand platform</a:t>
+                      </a:r>
+                    </a:p>
+                  </a:txBody>
+                </a:tc>
+                <a:tc>
+                  <a:txBody>
+                    <a:bodyPr/>
+                    <a:lstStyle/>
+                    <a:p>
+                      <a:pPr lvl="0" indent="0" marL="0">
+                        <a:buNone/>
+                      </a:pPr>
+                      <a:r>
+                        <a:rPr/>
+                        <a:t>Global brand audience</a:t>
+                      </a:r>
+                    </a:p>
+                  </a:txBody>
+                </a:tc>
+                <a:tc>
+                  <a:txBody>
+                    <a:bodyPr/>
+                    <a:lstStyle/>
+                    <a:p>
+                      <a:pPr lvl="0" indent="0" marL="0">
+                        <a:buNone/>
+                      </a:pPr>
+                      <a:r>
+                        <a:rPr/>
+                        <a:t>Baseline global message preceding Ready Set Ford</a:t>
+                      </a:r>
+                    </a:p>
+                  </a:txBody>
+                </a:tc>
+                <a:tc>
+                  <a:txBody>
+                    <a:bodyPr/>
+                    <a:lstStyle/>
+                    <a:p>
+                      <a:pPr lvl="0" indent="0" marL="0">
+                        <a:buNone/>
+                      </a:pPr>
+                      <a:r>
+                        <a:rPr/>
+                        <a:t>notes/USA_Today_Ready_Set_Ford.txt:68</a:t>
+                      </a:r>
+                    </a:p>
+                  </a:txBody>
+                </a:tc>
+              </a:tr>
+              <a:tr h="0">
+                <a:tc>
+                  <a:txBody>
+                    <a:bodyPr/>
+                    <a:lstStyle/>
+                    <a:p>
+                      <a:pPr lvl="0" indent="0" marL="0">
+                        <a:buNone/>
+                      </a:pPr>
+                      <a:r>
+                        <a:rPr/>
+                        <a:t>Swap Your Ride</a:t>
+                      </a:r>
+                    </a:p>
+                  </a:txBody>
+                </a:tc>
+                <a:tc>
+                  <a:txBody>
+                    <a:bodyPr/>
+                    <a:lstStyle/>
+                    <a:p>
+                      <a:pPr lvl="0" indent="0" marL="0">
+                        <a:buNone/>
+                      </a:pPr>
+                      <a:r>
+                        <a:rPr/>
+                        <a:t>2007</a:t>
+                      </a:r>
+                    </a:p>
+                  </a:txBody>
+                </a:tc>
+                <a:tc>
+                  <a:txBody>
+                    <a:bodyPr/>
+                    <a:lstStyle/>
+                    <a:p>
+                      <a:pPr lvl="0" indent="0" marL="0">
+                        <a:buNone/>
+                      </a:pPr>
+                      <a:r>
+                        <a:rPr/>
+                        <a:t>Comparison drive/customer testimonials</a:t>
+                      </a:r>
+                    </a:p>
+                  </a:txBody>
+                </a:tc>
+                <a:tc>
+                  <a:txBody>
+                    <a:bodyPr/>
+                    <a:lstStyle/>
+                    <a:p>
+                      <a:pPr lvl="0" indent="0" marL="0">
+                        <a:buNone/>
+                      </a:pPr>
+                      <a:r>
+                        <a:rPr/>
+                        <a:t>U.S. conquest prospects</a:t>
+                      </a:r>
+                    </a:p>
+                  </a:txBody>
+                </a:tc>
+                <a:tc>
+                  <a:txBody>
+                    <a:bodyPr/>
+                    <a:lstStyle/>
+                    <a:p>
+                      <a:pPr lvl="0" indent="0" marL="0">
+                        <a:buNone/>
+                      </a:pPr>
+                      <a:r>
+                        <a:rPr/>
+                        <a:t>Campaign revived in 2025 social (#SwapYourRide)</a:t>
+                      </a:r>
+                    </a:p>
+                  </a:txBody>
+                </a:tc>
+                <a:tc>
+                  <a:txBody>
+                    <a:bodyPr/>
+                    <a:lstStyle/>
+                    <a:p>
+                      <a:pPr lvl="0" indent="0" marL="0">
+                        <a:buNone/>
+                      </a:pPr>
+                      <a:r>
+                        <a:rPr/>
+                        <a:t>notes/research_notes.md:61</a:t>
+                      </a:r>
+                    </a:p>
+                  </a:txBody>
+                </a:tc>
+              </a:tr>
+            </a:tbl>
+          </a:graphicData>
+        </a:graphic>
+      </p:graphicFrame>
+    </p:spTree>
+  </p:cSld>
+</p:sld>
+</file>
+
+<file path=ppt/slides/slide3.xml><?xml version="1.0" encoding="utf-8"?>
+<p:sld xmlns:a="http://schemas.openxmlformats.org/drawingml/2006/main" xmlns:r="http://schemas.openxmlformats.org/officeDocument/2006/relationships" xmlns:p="http://schemas.openxmlformats.org/presentationml/2006/main">
+  <p:cSld>
+    <p:spTree>
+      <p:nvGrpSpPr>
+        <p:cNvPr id="1" name=""/>
+        <p:cNvGrpSpPr/>
+        <p:nvPr/>
+      </p:nvGrpSpPr>
+      <p:grpSpPr>
+        <a:xfrm>
+          <a:off x="0" y="0"/>
+          <a:ext cx="0" cy="0"/>
+          <a:chOff x="0" y="0"/>
+          <a:chExt cx="0" cy="0"/>
+        </a:xfrm>
+      </p:grpSpPr>
+      <p:sp>
+        <p:nvSpPr>
+          <p:cNvPr id="3" name="Content Placeholder 2"/>
+          <p:cNvSpPr>
+            <a:spLocks noGrp="1"/>
+          </p:cNvSpPr>
+          <p:nvPr>
+            <p:ph idx="1"/>
+          </p:nvPr>
+        </p:nvSpPr>
+        <p:spPr/>
+        <p:txBody>
+          <a:bodyPr/>
+          <a:lstStyle/>
+          <a:p>
+            <a:pPr lvl="0" indent="0" marL="0">
+              <a:buNone/>
+            </a:pPr>
+            <a:r>
+              <a:rPr i="1"/>
+              <a:t>See </a:t>
+            </a:r>
+            <a:r>
+              <a:rPr i="1">
+                <a:latin typeface="Courier"/>
+              </a:rPr>
+              <a:t>data/external/historic_campaigns.csv</a:t>
+            </a:r>
+            <a:r>
+              <a:rPr i="1"/>
+              <a:t> for detailed notes and sourcing.</a:t>
+            </a:r>
+          </a:p>
+        </p:txBody>
+      </p:sp>
+    </p:spTree>
+  </p:cSld>
+</p:sld>
+</file>
+
+<file path=ppt/slides/slide4.xml><?xml version="1.0" encoding="utf-8"?>
+<p:sld xmlns:a="http://schemas.openxmlformats.org/drawingml/2006/main" xmlns:r="http://schemas.openxmlformats.org/officeDocument/2006/relationships" xmlns:p="http://schemas.openxmlformats.org/presentationml/2006/main">
+  <p:cSld>
+    <p:spTree>
+      <p:nvGrpSpPr>
+        <p:cNvPr id="1" name=""/>
+        <p:cNvGrpSpPr/>
+        <p:nvPr/>
+      </p:nvGrpSpPr>
+      <p:grpSpPr>
+        <a:xfrm>
+          <a:off x="0" y="0"/>
+          <a:ext cx="0" cy="0"/>
+          <a:chOff x="0" y="0"/>
+          <a:chExt cx="0" cy="0"/>
+        </a:xfrm>
+      </p:grpSpPr>
+      <p:sp>
+        <p:nvSpPr>
+          <p:cNvPr id="2" name="Title 1"/>
+          <p:cNvSpPr>
+            <a:spLocks noGrp="1"/>
+          </p:cNvSpPr>
+          <p:nvPr>
+            <p:ph type="title"/>
+          </p:nvPr>
+        </p:nvSpPr>
+        <p:spPr/>
+        <p:txBody>
+          <a:bodyPr/>
+          <a:lstStyle/>
+          <a:p>
+            <a:pPr lvl="0" indent="0" marL="0">
+              <a:buNone/>
+            </a:pPr>
+            <a:r>
+              <a:rPr/>
+              <a:t>Digital Pulse – Google Trends (US)</a:t>
+            </a:r>
+          </a:p>
+        </p:txBody>
+      </p:sp>
+      <p:pic>
+        <p:nvPicPr>
+          <p:cNvPr descr="fig:  visuals/google_trends_readysetford_us.png" id="0" name="Picture 1"/>
+          <p:cNvPicPr>
+            <a:picLocks noGrp="1" noChangeAspect="1"/>
+          </p:cNvPicPr>
+          <p:nvPr/>
+        </p:nvPicPr>
+        <p:blipFill>
+          <a:blip r:embed="rId2"/>
+          <a:stretch>
+            <a:fillRect/>
+          </a:stretch>
+        </p:blipFill>
+        <p:spPr bwMode="auto">
+          <a:xfrm>
+            <a:off x="1689100" y="1193800"/>
+            <a:ext cx="5765800" cy="2882900"/>
+          </a:xfrm>
+          <a:prstGeom prst="rect">
+            <a:avLst/>
+          </a:prstGeom>
+          <a:noFill/>
+          <a:ln w="9525">
+            <a:noFill/>
+            <a:headEnd/>
+            <a:tailEnd/>
+          </a:ln>
+        </p:spPr>
+      </p:pic>
+      <p:sp>
+        <p:nvSpPr>
+          <p:cNvPr id="1" name="TextBox 3"/>
+          <p:cNvSpPr txBox="1"/>
+          <p:nvPr/>
+        </p:nvSpPr>
+        <p:spPr>
+          <a:xfrm>
+            <a:off x="457200" y="4076700"/>
+            <a:ext cx="8229600" cy="508000"/>
+          </a:xfrm>
+          <a:prstGeom prst="rect">
+            <a:avLst/>
+          </a:prstGeom>
+          <a:noFill/>
+        </p:spPr>
+        <p:txBody>
+          <a:bodyPr/>
+          <a:lstStyle/>
+          <a:p>
+            <a:pPr lvl="0" indent="0" marL="0" algn="ctr">
+              <a:buNone/>
+            </a:pPr>
+            <a:r>
+              <a:rPr/>
+              <a:t>Ready Set Ford vs Ford Pro weekly indices</a:t>
+            </a:r>
+          </a:p>
+        </p:txBody>
+      </p:sp>
+    </p:spTree>
+  </p:cSld>
+</p:sld>
+</file>
+
+<file path=ppt/slides/slide5.xml><?xml version="1.0" encoding="utf-8"?>
+<p:sld xmlns:a="http://schemas.openxmlformats.org/drawingml/2006/main" xmlns:r="http://schemas.openxmlformats.org/officeDocument/2006/relationships" xmlns:p="http://schemas.openxmlformats.org/presentationml/2006/main">
+  <p:cSld>
+    <p:spTree>
+      <p:nvGrpSpPr>
+        <p:cNvPr id="1" name=""/>
+        <p:cNvGrpSpPr/>
+        <p:nvPr/>
+      </p:nvGrpSpPr>
+      <p:grpSpPr>
+        <a:xfrm>
+          <a:off x="0" y="0"/>
+          <a:ext cx="0" cy="0"/>
+          <a:chOff x="0" y="0"/>
+          <a:chExt cx="0" cy="0"/>
+        </a:xfrm>
+      </p:grpSpPr>
+      <p:graphicFrame>
+        <p:nvGraphicFramePr>
+          <p:cNvPr id="6" name="Content Placeholder 5"/>
+          <p:cNvGraphicFramePr>
+            <a:graphicFrameLocks noGrp="1"/>
+          </p:cNvGraphicFramePr>
+          <p:nvPr>
+            <p:ph idx="1"/>
+          </p:nvPr>
+        </p:nvGraphicFramePr>
+        <p:xfrm>
+          <a:off x="457200" y="1193800"/>
+          <a:ext cx="8229600" cy="3390900"/>
+        </p:xfrm>
+        <a:graphic>
+          <a:graphicData uri="http://schemas.openxmlformats.org/drawingml/2006/table">
+            <a:tbl>
+              <a:tblPr firstRow="1" bandRow="1">
+                <a:tableStyleId>{5C22544A-7EE6-4342-B048-85BDC9FD1C3A}</a:tableStyleId>
+              </a:tblPr>
+              <a:tblGrid>
+                <a:gridCol w="1638300"/>
+                <a:gridCol w="1638300"/>
+                <a:gridCol w="1638300"/>
+                <a:gridCol w="1638300"/>
+                <a:gridCol w="1638300"/>
+              </a:tblGrid>
+              <a:tr h="0">
+                <a:tc>
+                  <a:txBody>
+                    <a:bodyPr/>
+                    <a:lstStyle/>
+                    <a:p>
+                      <a:pPr lvl="0" indent="0" marL="0">
+                        <a:buNone/>
+                      </a:pPr>
+                      <a:r>
+                        <a:rPr/>
+                        <a:t>Term</a:t>
+                      </a:r>
+                    </a:p>
+                  </a:txBody>
+                  <a:tcPr/>
+                </a:tc>
+                <a:tc>
+                  <a:txBody>
+                    <a:bodyPr/>
+                    <a:lstStyle/>
+                    <a:p>
+                      <a:pPr lvl="0" indent="0" marL="0" algn="r">
+                        <a:buNone/>
+                      </a:pPr>
+                      <a:r>
+                        <a:rPr/>
+                        <a:t>Peak Weekly Interest</a:t>
+                      </a:r>
+                    </a:p>
+                  </a:txBody>
+                  <a:tcPr/>
+                </a:tc>
+                <a:tc>
+                  <a:txBody>
+                    <a:bodyPr/>
+                    <a:lstStyle/>
+                    <a:p>
+                      <a:pPr lvl="0" indent="0" marL="0">
+                        <a:buNone/>
+                      </a:pPr>
+                      <a:r>
+                        <a:rPr/>
+                        <a:t>Peak Week</a:t>
+                      </a:r>
+                    </a:p>
+                  </a:txBody>
+                  <a:tcPr/>
+                </a:tc>
+                <a:tc>
+                  <a:txBody>
+                    <a:bodyPr/>
+                    <a:lstStyle/>
+                    <a:p>
+                      <a:pPr lvl="0" indent="0" marL="0" algn="r">
+                        <a:buNone/>
+                      </a:pPr>
+                      <a:r>
+                        <a:rPr/>
+                        <a:t>Trailing 90-Day Avg</a:t>
+                      </a:r>
+                    </a:p>
+                  </a:txBody>
+                  <a:tcPr/>
+                </a:tc>
+                <a:tc>
+                  <a:txBody>
+                    <a:bodyPr/>
+                    <a:lstStyle/>
+                    <a:p>
+                      <a:pPr lvl="0" indent="0" marL="0" algn="r">
+                        <a:buNone/>
+                      </a:pPr>
+                      <a:r>
+                        <a:rPr/>
+                        <a:t>Gap vs. Ford Pro</a:t>
+                      </a:r>
+                    </a:p>
+                  </a:txBody>
+                  <a:tcPr/>
+                </a:tc>
+              </a:tr>
+              <a:tr h="0">
+                <a:tc>
+                  <a:txBody>
+                    <a:bodyPr/>
+                    <a:lstStyle/>
+                    <a:p>
+                      <a:pPr lvl="0" indent="0" marL="0">
+                        <a:buNone/>
+                      </a:pPr>
+                      <a:r>
+                        <a:rPr/>
+                        <a:t>Ready Set Ford</a:t>
+                      </a:r>
+                    </a:p>
+                  </a:txBody>
+                </a:tc>
+                <a:tc>
+                  <a:txBody>
+                    <a:bodyPr/>
+                    <a:lstStyle/>
+                    <a:p>
+                      <a:pPr lvl="0" indent="0" marL="0" algn="r">
+                        <a:buNone/>
+                      </a:pPr>
+                      <a:r>
+                        <a:rPr/>
+                        <a:t>2</a:t>
+                      </a:r>
+                    </a:p>
+                  </a:txBody>
+                </a:tc>
+                <a:tc>
+                  <a:txBody>
+                    <a:bodyPr/>
+                    <a:lstStyle/>
+                    <a:p>
+                      <a:pPr lvl="0" indent="0" marL="0">
+                        <a:buNone/>
+                      </a:pPr>
+                      <a:r>
+                        <a:rPr/>
+                        <a:t>2022-01-02</a:t>
+                      </a:r>
+                    </a:p>
+                  </a:txBody>
+                </a:tc>
+                <a:tc>
+                  <a:txBody>
+                    <a:bodyPr/>
+                    <a:lstStyle/>
+                    <a:p>
+                      <a:pPr lvl="0" indent="0" marL="0" algn="r">
+                        <a:buNone/>
+                      </a:pPr>
+                      <a:r>
+                        <a:rPr/>
+                        <a:t>0.15</a:t>
+                      </a:r>
+                    </a:p>
+                  </a:txBody>
+                </a:tc>
+                <a:tc>
+                  <a:txBody>
+                    <a:bodyPr/>
+                    <a:lstStyle/>
+                    <a:p>
+                      <a:pPr lvl="0" indent="0" marL="0" algn="r">
+                        <a:buNone/>
+                      </a:pPr>
+                      <a:r>
+                        <a:rPr/>
+                        <a:t>-52.9</a:t>
+                      </a:r>
+                    </a:p>
+                  </a:txBody>
+                </a:tc>
+              </a:tr>
+              <a:tr h="0">
+                <a:tc>
+                  <a:txBody>
+                    <a:bodyPr/>
+                    <a:lstStyle/>
+                    <a:p>
+                      <a:pPr lvl="0" indent="0" marL="0">
+                        <a:buNone/>
+                      </a:pPr>
+                      <a:r>
+                        <a:rPr/>
+                        <a:t>Ford Pro</a:t>
+                      </a:r>
+                    </a:p>
+                  </a:txBody>
+                </a:tc>
+                <a:tc>
+                  <a:txBody>
+                    <a:bodyPr/>
+                    <a:lstStyle/>
+                    <a:p>
+                      <a:pPr lvl="0" indent="0" marL="0" algn="r">
+                        <a:buNone/>
+                      </a:pPr>
+                      <a:r>
+                        <a:rPr/>
+                        <a:t>100</a:t>
+                      </a:r>
+                    </a:p>
+                  </a:txBody>
+                </a:tc>
+                <a:tc>
+                  <a:txBody>
+                    <a:bodyPr/>
+                    <a:lstStyle/>
+                    <a:p>
+                      <a:pPr lvl="0" indent="0" marL="0">
+                        <a:buNone/>
+                      </a:pPr>
+                      <a:r>
+                        <a:rPr/>
+                        <a:t>2025-07-27</a:t>
+                      </a:r>
+                    </a:p>
+                  </a:txBody>
+                </a:tc>
+                <a:tc>
+                  <a:txBody>
+                    <a:bodyPr/>
+                    <a:lstStyle/>
+                    <a:p>
+                      <a:pPr lvl="0" indent="0" marL="0" algn="r">
+                        <a:buNone/>
+                      </a:pPr>
+                      <a:r>
+                        <a:rPr/>
+                        <a:t>53.0</a:t>
+                      </a:r>
+                    </a:p>
+                  </a:txBody>
+                </a:tc>
+                <a:tc>
+                  <a:txBody>
+                    <a:bodyPr/>
+                    <a:lstStyle/>
+                    <a:p>
+                      <a:pPr lvl="0" indent="0" marL="0" algn="r">
+                        <a:buNone/>
+                      </a:pPr>
+                      <a:r>
+                        <a:rPr/>
+                        <a:t>–</a:t>
+                      </a:r>
+                    </a:p>
+                  </a:txBody>
+                </a:tc>
+              </a:tr>
+            </a:tbl>
+          </a:graphicData>
+        </a:graphic>
+      </p:graphicFrame>
+    </p:spTree>
+  </p:cSld>
+</p:sld>
+</file>
+
+<file path=ppt/slides/slide6.xml><?xml version="1.0" encoding="utf-8"?>
+<p:sld xmlns:a="http://schemas.openxmlformats.org/drawingml/2006/main" xmlns:r="http://schemas.openxmlformats.org/officeDocument/2006/relationships" xmlns:p="http://schemas.openxmlformats.org/presentationml/2006/main">
+  <p:cSld>
+    <p:spTree>
+      <p:nvGrpSpPr>
+        <p:cNvPr id="1" name=""/>
+        <p:cNvGrpSpPr/>
+        <p:nvPr/>
+      </p:nvGrpSpPr>
+      <p:grpSpPr>
+        <a:xfrm>
+          <a:off x="0" y="0"/>
+          <a:ext cx="0" cy="0"/>
+          <a:chOff x="0" y="0"/>
+          <a:chExt cx="0" cy="0"/>
+        </a:xfrm>
+      </p:grpSpPr>
+      <p:sp>
+        <p:nvSpPr>
+          <p:cNvPr id="3" name="Content Placeholder 2"/>
+          <p:cNvSpPr>
+            <a:spLocks noGrp="1"/>
+          </p:cNvSpPr>
+          <p:nvPr>
+            <p:ph idx="1"/>
+          </p:nvPr>
+        </p:nvSpPr>
+        <p:spPr/>
+        <p:txBody>
+          <a:bodyPr/>
+          <a:lstStyle/>
+          <a:p>
+            <a:pPr lvl="0"/>
+            <a:r>
+              <a:rPr/>
+              <a:t>Ready Set Ford searches finally registered measurable activity in September 2025 (index = 1) after a near-zero baseline, signalling early traction as campaign content rolls out.</a:t>
+            </a:r>
+          </a:p>
+          <a:p>
+            <a:pPr lvl="0"/>
+            <a:r>
+              <a:rPr/>
+              <a:t>Ford Pro remains the awareness anchor with a steady ~53 trailing 90-day index; use the contrast to show why Pro proof points must be woven into Ready Set Ford storytelling.</a:t>
+            </a:r>
+          </a:p>
+          <a:p>
+            <a:pPr lvl="0"/>
+            <a:r>
+              <a:rPr/>
+              <a:t>Overlay campaign milestones (video drops, dealer pushes) when presenting to explain spikes and set expectations for post-launch lift.</a:t>
+            </a:r>
+          </a:p>
+          <a:p>
+            <a:pPr lvl="0" indent="0" marL="0">
+              <a:buNone/>
+            </a:pPr>
+            <a:r>
+              <a:rPr i="1"/>
+              <a:t>Source: </a:t>
+            </a:r>
+            <a:r>
+              <a:rPr i="1">
+                <a:latin typeface="Courier"/>
+              </a:rPr>
+              <a:t>google_trends_readysetford_us.csv</a:t>
+            </a:r>
+            <a:r>
+              <a:rPr i="1"/>
+              <a:t> generated via </a:t>
+            </a:r>
+            <a:r>
+              <a:rPr i="1">
+                <a:latin typeface="Courier"/>
+              </a:rPr>
+              <a:t>scripts/collect_additional_data.py</a:t>
+            </a:r>
+            <a:r>
+              <a:rPr i="1"/>
+              <a:t> (22 Sep run).</a:t>
+            </a:r>
+          </a:p>
+        </p:txBody>
+      </p:sp>
+    </p:spTree>
+  </p:cSld>
+</p:sld>
+</file>
+
+<file path=ppt/slides/slide7.xml><?xml version="1.0" encoding="utf-8"?>
+<p:sld xmlns:a="http://schemas.openxmlformats.org/drawingml/2006/main" xmlns:r="http://schemas.openxmlformats.org/officeDocument/2006/relationships" xmlns:p="http://schemas.openxmlformats.org/presentationml/2006/main">
+  <p:cSld>
+    <p:spTree>
+      <p:nvGrpSpPr>
+        <p:cNvPr id="1" name=""/>
+        <p:cNvGrpSpPr/>
+        <p:nvPr/>
+      </p:nvGrpSpPr>
+      <p:grpSpPr>
+        <a:xfrm>
+          <a:off x="0" y="0"/>
+          <a:ext cx="0" cy="0"/>
+          <a:chOff x="0" y="0"/>
+          <a:chExt cx="0" cy="0"/>
+        </a:xfrm>
+      </p:grpSpPr>
+      <p:sp>
+        <p:nvSpPr>
+          <p:cNvPr id="2" name="Title 1"/>
+          <p:cNvSpPr>
+            <a:spLocks noGrp="1"/>
+          </p:cNvSpPr>
+          <p:nvPr>
+            <p:ph type="title"/>
+          </p:nvPr>
+        </p:nvSpPr>
+        <p:spPr>
+          <a:xfrm>
+            <a:off x="457201" y="204787"/>
+            <a:ext cx="3008313" cy="871538"/>
+          </a:xfrm>
+        </p:spPr>
+        <p:txBody>
+          <a:bodyPr/>
+          <a:lstStyle/>
+          <a:p>
+            <a:pPr lvl="0" indent="0" marL="0">
+              <a:buNone/>
+            </a:pPr>
+            <a:r>
+              <a:rPr/>
+              <a:t>Slide – Ready Set Ford Video Performance</a:t>
+            </a:r>
+          </a:p>
+        </p:txBody>
+      </p:sp>
+      <p:sp>
+        <p:nvSpPr>
+          <p:cNvPr id="4" name="Text Placeholder 3"/>
+          <p:cNvSpPr>
+            <a:spLocks noGrp="1"/>
+          </p:cNvSpPr>
+          <p:nvPr>
+            <p:ph idx="2" sz="half" type="body"/>
+          </p:nvPr>
+        </p:nvSpPr>
+        <p:spPr/>
+        <p:txBody>
+          <a:bodyPr/>
+          <a:lstStyle/>
+          <a:p>
+            <a:pPr lvl="0" indent="0" marL="0">
+              <a:spcBef>
+                <a:spcPts val="3000"/>
+              </a:spcBef>
+              <a:buNone/>
+            </a:pPr>
+            <a:r>
+              <a:rPr b="1"/>
+              <a:t>Key Takeaways</a:t>
+            </a:r>
+          </a:p>
+          <a:p>
+            <a:pPr lvl="0"/>
+            <a:r>
+              <a:rPr/>
+              <a:t>Hero spots launched 10 Sep deliver the largest reach; “Ready Set Ford | Ford” leads with 24.5K views and &gt;500 likes.</a:t>
+            </a:r>
+          </a:p>
+          <a:p>
+            <a:pPr lvl="0"/>
+            <a:r>
+              <a:rPr/>
+              <a:t>Short-form and Canada-specific cuts (uploaded 16 Sep) trail in impressions but keep ~2% engagement, indicating consistent resonance.</a:t>
+            </a:r>
+          </a:p>
+          <a:p>
+            <a:pPr lvl="0"/>
+            <a:r>
+              <a:rPr/>
+              <a:t>“To Those Who Can” over-indexes on engagement (4.14%) vs. reach, signaling a potential storytelling asset for targeted placements.</a:t>
+            </a:r>
+          </a:p>
+          <a:p>
+            <a:pPr lvl="0" indent="0" marL="0">
+              <a:spcBef>
+                <a:spcPts val="3000"/>
+              </a:spcBef>
+              <a:buNone/>
+            </a:pPr>
+            <a:r>
+              <a:rPr b="1"/>
+              <a:t>Metrics Snapshot (YouTube, refreshed 19 Sep 2025)</a:t>
+            </a:r>
+          </a:p>
+        </p:txBody>
+      </p:sp>
+      <p:graphicFrame>
+        <p:nvGraphicFramePr>
+          <p:cNvPr id="6" name="Content Placeholder 5"/>
+          <p:cNvGraphicFramePr>
+            <a:graphicFrameLocks noGrp="1"/>
+          </p:cNvGraphicFramePr>
+          <p:nvPr>
+            <p:ph idx="1"/>
+          </p:nvPr>
+        </p:nvGraphicFramePr>
+        <p:xfrm>
+          <a:off x="3568700" y="203200"/>
+          <a:ext cx="5105400" cy="4381500"/>
+        </p:xfrm>
+        <a:graphic>
+          <a:graphicData uri="http://schemas.openxmlformats.org/drawingml/2006/table">
+            <a:tbl>
+              <a:tblPr firstRow="1" bandRow="1">
+                <a:tableStyleId>{5C22544A-7EE6-4342-B048-85BDC9FD1C3A}</a:tableStyleId>
+              </a:tblPr>
+              <a:tblGrid>
+                <a:gridCol w="850900"/>
+                <a:gridCol w="850900"/>
+                <a:gridCol w="850900"/>
+                <a:gridCol w="850900"/>
+                <a:gridCol w="850900"/>
+                <a:gridCol w="850900"/>
+              </a:tblGrid>
+              <a:tr h="0">
+                <a:tc>
+                  <a:txBody>
+                    <a:bodyPr/>
+                    <a:lstStyle/>
+                    <a:p>
+                      <a:pPr lvl="0" indent="0" marL="0">
+                        <a:buNone/>
+                      </a:pPr>
+                      <a:r>
+                        <a:rPr/>
+                        <a:t>Video</a:t>
+                      </a:r>
+                    </a:p>
+                  </a:txBody>
+                  <a:tcPr/>
+                </a:tc>
+                <a:tc>
+                  <a:txBody>
+                    <a:bodyPr/>
+                    <a:lstStyle/>
+                    <a:p>
+                      <a:pPr lvl="0" indent="0" marL="0">
+                        <a:buNone/>
+                      </a:pPr>
+                      <a:r>
+                        <a:rPr/>
+                        <a:t>Upload (UTC)</a:t>
+                      </a:r>
+                    </a:p>
+                  </a:txBody>
+                  <a:tcPr/>
+                </a:tc>
+                <a:tc>
+                  <a:txBody>
+                    <a:bodyPr/>
+                    <a:lstStyle/>
+                    <a:p>
+                      <a:pPr lvl="0" indent="0" marL="0">
+                        <a:buNone/>
+                      </a:pPr>
+                      <a:r>
+                        <a:rPr/>
+                        <a:t>Duration</a:t>
+                      </a:r>
+                    </a:p>
+                  </a:txBody>
+                  <a:tcPr/>
+                </a:tc>
+                <a:tc>
+                  <a:txBody>
+                    <a:bodyPr/>
+                    <a:lstStyle/>
+                    <a:p>
+                      <a:pPr lvl="0" indent="0" marL="0" algn="r">
+                        <a:buNone/>
+                      </a:pPr>
+                      <a:r>
+                        <a:rPr/>
+                        <a:t>Views</a:t>
+                      </a:r>
+                    </a:p>
+                  </a:txBody>
+                  <a:tcPr/>
+                </a:tc>
+                <a:tc>
+                  <a:txBody>
+                    <a:bodyPr/>
+                    <a:lstStyle/>
+                    <a:p>
+                      <a:pPr lvl="0" indent="0" marL="0" algn="r">
+                        <a:buNone/>
+                      </a:pPr>
+                      <a:r>
+                        <a:rPr/>
+                        <a:t>Likes</a:t>
+                      </a:r>
+                    </a:p>
+                  </a:txBody>
+                  <a:tcPr/>
+                </a:tc>
+                <a:tc>
+                  <a:txBody>
+                    <a:bodyPr/>
+                    <a:lstStyle/>
+                    <a:p>
+                      <a:pPr lvl="0" indent="0" marL="0" algn="r">
+                        <a:buNone/>
+                      </a:pPr>
+                      <a:r>
+                        <a:rPr/>
+                        <a:t>Engagement %</a:t>
+                      </a:r>
+                    </a:p>
+                  </a:txBody>
+                  <a:tcPr/>
+                </a:tc>
+              </a:tr>
+              <a:tr h="0">
+                <a:tc>
+                  <a:txBody>
+                    <a:bodyPr/>
+                    <a:lstStyle/>
+                    <a:p>
+                      <a:pPr lvl="0" indent="0" marL="0">
+                        <a:buNone/>
+                      </a:pPr>
+                      <a:r>
+                        <a:rPr/>
+                        <a:t>Ready Set Ford | Ford</a:t>
+                      </a:r>
+                    </a:p>
+                  </a:txBody>
+                </a:tc>
+                <a:tc>
+                  <a:txBody>
+                    <a:bodyPr/>
+                    <a:lstStyle/>
+                    <a:p>
+                      <a:pPr lvl="0" indent="0" marL="0">
+                        <a:buNone/>
+                      </a:pPr>
+                      <a:r>
+                        <a:rPr/>
+                        <a:t>2025-09-10</a:t>
+                      </a:r>
+                    </a:p>
+                  </a:txBody>
+                </a:tc>
+                <a:tc>
+                  <a:txBody>
+                    <a:bodyPr/>
+                    <a:lstStyle/>
+                    <a:p>
+                      <a:pPr lvl="0" indent="0" marL="0">
+                        <a:buNone/>
+                      </a:pPr>
+                      <a:r>
+                        <a:rPr/>
+                        <a:t>60s</a:t>
+                      </a:r>
+                    </a:p>
+                  </a:txBody>
+                </a:tc>
+                <a:tc>
+                  <a:txBody>
+                    <a:bodyPr/>
+                    <a:lstStyle/>
+                    <a:p>
+                      <a:pPr lvl="0" indent="0" marL="0" algn="r">
+                        <a:buNone/>
+                      </a:pPr>
+                      <a:r>
+                        <a:rPr/>
+                        <a:t>24,549</a:t>
+                      </a:r>
+                    </a:p>
+                  </a:txBody>
+                </a:tc>
+                <a:tc>
+                  <a:txBody>
+                    <a:bodyPr/>
+                    <a:lstStyle/>
+                    <a:p>
+                      <a:pPr lvl="0" indent="0" marL="0" algn="r">
+                        <a:buNone/>
+                      </a:pPr>
+                      <a:r>
+                        <a:rPr/>
+                        <a:t>503</a:t>
+                      </a:r>
+                    </a:p>
+                  </a:txBody>
+                </a:tc>
+                <a:tc>
+                  <a:txBody>
+                    <a:bodyPr/>
+                    <a:lstStyle/>
+                    <a:p>
+                      <a:pPr lvl="0" indent="0" marL="0" algn="r">
+                        <a:buNone/>
+                      </a:pPr>
+                      <a:r>
+                        <a:rPr/>
+                        <a:t>2.05</a:t>
+                      </a:r>
+                    </a:p>
+                  </a:txBody>
+                </a:tc>
+              </a:tr>
+              <a:tr h="0">
+                <a:tc>
+                  <a:txBody>
+                    <a:bodyPr/>
+                    <a:lstStyle/>
+                    <a:p>
+                      <a:pPr lvl="0" indent="0" marL="0">
+                        <a:buNone/>
+                      </a:pPr>
+                      <a:r>
+                        <a:rPr/>
+                        <a:t>Ready Set Ford™ (Canada)</a:t>
+                      </a:r>
+                    </a:p>
+                  </a:txBody>
+                </a:tc>
+                <a:tc>
+                  <a:txBody>
+                    <a:bodyPr/>
+                    <a:lstStyle/>
+                    <a:p>
+                      <a:pPr lvl="0" indent="0" marL="0">
+                        <a:buNone/>
+                      </a:pPr>
+                      <a:r>
+                        <a:rPr/>
+                        <a:t>2025-09-16</a:t>
+                      </a:r>
+                    </a:p>
+                  </a:txBody>
+                </a:tc>
+                <a:tc>
+                  <a:txBody>
+                    <a:bodyPr/>
+                    <a:lstStyle/>
+                    <a:p>
+                      <a:pPr lvl="0" indent="0" marL="0">
+                        <a:buNone/>
+                      </a:pPr>
+                      <a:r>
+                        <a:rPr/>
+                        <a:t>60s</a:t>
+                      </a:r>
+                    </a:p>
+                  </a:txBody>
+                </a:tc>
+                <a:tc>
+                  <a:txBody>
+                    <a:bodyPr/>
+                    <a:lstStyle/>
+                    <a:p>
+                      <a:pPr lvl="0" indent="0" marL="0" algn="r">
+                        <a:buNone/>
+                      </a:pPr>
+                      <a:r>
+                        <a:rPr/>
+                        <a:t>611</a:t>
+                      </a:r>
+                    </a:p>
+                  </a:txBody>
+                </a:tc>
+                <a:tc>
+                  <a:txBody>
+                    <a:bodyPr/>
+                    <a:lstStyle/>
+                    <a:p>
+                      <a:pPr lvl="0" indent="0" marL="0" algn="r">
+                        <a:buNone/>
+                      </a:pPr>
+                      <a:r>
+                        <a:rPr/>
+                        <a:t>13</a:t>
+                      </a:r>
+                    </a:p>
+                  </a:txBody>
+                </a:tc>
+                <a:tc>
+                  <a:txBody>
+                    <a:bodyPr/>
+                    <a:lstStyle/>
+                    <a:p>
+                      <a:pPr lvl="0" indent="0" marL="0" algn="r">
+                        <a:buNone/>
+                      </a:pPr>
+                      <a:r>
+                        <a:rPr/>
+                        <a:t>2.13</a:t>
+                      </a:r>
+                    </a:p>
+                  </a:txBody>
+                </a:tc>
+              </a:tr>
+              <a:tr h="0">
+                <a:tc>
+                  <a:txBody>
+                    <a:bodyPr/>
+                    <a:lstStyle/>
+                    <a:p>
+                      <a:pPr lvl="0" indent="0" marL="0">
+                        <a:buNone/>
+                      </a:pPr>
+                      <a:r>
+                        <a:rPr/>
+                        <a:t>To Those Who Can | Ford</a:t>
+                      </a:r>
+                    </a:p>
+                  </a:txBody>
+                </a:tc>
+                <a:tc>
+                  <a:txBody>
+                    <a:bodyPr/>
+                    <a:lstStyle/>
+                    <a:p>
+                      <a:pPr lvl="0" indent="0" marL="0">
+                        <a:buNone/>
+                      </a:pPr>
+                      <a:r>
+                        <a:rPr/>
+                        <a:t>2025-09-10</a:t>
+                      </a:r>
+                    </a:p>
+                  </a:txBody>
+                </a:tc>
+                <a:tc>
+                  <a:txBody>
+                    <a:bodyPr/>
+                    <a:lstStyle/>
+                    <a:p>
+                      <a:pPr lvl="0" indent="0" marL="0">
+                        <a:buNone/>
+                      </a:pPr>
+                      <a:r>
+                        <a:rPr/>
+                        <a:t>30s</a:t>
+                      </a:r>
+                    </a:p>
+                  </a:txBody>
+                </a:tc>
+                <a:tc>
+                  <a:txBody>
+                    <a:bodyPr/>
+                    <a:lstStyle/>
+                    <a:p>
+                      <a:pPr lvl="0" indent="0" marL="0" algn="r">
+                        <a:buNone/>
+                      </a:pPr>
+                      <a:r>
+                        <a:rPr/>
+                        <a:t>3,626</a:t>
+                      </a:r>
+                    </a:p>
+                  </a:txBody>
+                </a:tc>
+                <a:tc>
+                  <a:txBody>
+                    <a:bodyPr/>
+                    <a:lstStyle/>
+                    <a:p>
+                      <a:pPr lvl="0" indent="0" marL="0" algn="r">
+                        <a:buNone/>
+                      </a:pPr>
+                      <a:r>
+                        <a:rPr/>
+                        <a:t>150</a:t>
+                      </a:r>
+                    </a:p>
+                  </a:txBody>
+                </a:tc>
+                <a:tc>
+                  <a:txBody>
+                    <a:bodyPr/>
+                    <a:lstStyle/>
+                    <a:p>
+                      <a:pPr lvl="0" indent="0" marL="0" algn="r">
+                        <a:buNone/>
+                      </a:pPr>
+                      <a:r>
+                        <a:rPr/>
+                        <a:t>4.14</a:t>
+                      </a:r>
+                    </a:p>
+                  </a:txBody>
+                </a:tc>
+              </a:tr>
+              <a:tr h="0">
+                <a:tc>
+                  <a:txBody>
+                    <a:bodyPr/>
+                    <a:lstStyle/>
+                    <a:p>
+                      <a:pPr lvl="0" indent="0" marL="0">
+                        <a:buNone/>
+                      </a:pPr>
+                      <a:r>
+                        <a:rPr/>
+                        <a:t>Ready Set Ford™ (Shorts)</a:t>
+                      </a:r>
+                    </a:p>
+                  </a:txBody>
+                </a:tc>
+                <a:tc>
+                  <a:txBody>
+                    <a:bodyPr/>
+                    <a:lstStyle/>
+                    <a:p>
+                      <a:pPr lvl="0" indent="0" marL="0">
+                        <a:buNone/>
+                      </a:pPr>
+                      <a:r>
+                        <a:rPr/>
+                        <a:t>2025-09-16</a:t>
+                      </a:r>
+                    </a:p>
+                  </a:txBody>
+                </a:tc>
+                <a:tc>
+                  <a:txBody>
+                    <a:bodyPr/>
+                    <a:lstStyle/>
+                    <a:p>
+                      <a:pPr lvl="0" indent="0" marL="0">
+                        <a:buNone/>
+                      </a:pPr>
+                      <a:r>
+                        <a:rPr/>
+                        <a:t>60s</a:t>
+                      </a:r>
+                    </a:p>
+                  </a:txBody>
+                </a:tc>
+                <a:tc>
+                  <a:txBody>
+                    <a:bodyPr/>
+                    <a:lstStyle/>
+                    <a:p>
+                      <a:pPr lvl="0" indent="0" marL="0" algn="r">
+                        <a:buNone/>
+                      </a:pPr>
+                      <a:r>
+                        <a:rPr/>
+                        <a:t>603</a:t>
+                      </a:r>
+                    </a:p>
+                  </a:txBody>
+                </a:tc>
+                <a:tc>
+                  <a:txBody>
+                    <a:bodyPr/>
+                    <a:lstStyle/>
+                    <a:p>
+                      <a:pPr lvl="0" indent="0" marL="0" algn="r">
+                        <a:buNone/>
+                      </a:pPr>
+                      <a:r>
+                        <a:rPr/>
+                        <a:t>12</a:t>
+                      </a:r>
+                    </a:p>
+                  </a:txBody>
+                </a:tc>
+                <a:tc>
+                  <a:txBody>
+                    <a:bodyPr/>
+                    <a:lstStyle/>
+                    <a:p>
+                      <a:pPr lvl="0" indent="0" marL="0" algn="r">
+                        <a:buNone/>
+                      </a:pPr>
+                      <a:r>
+                        <a:rPr/>
+                        <a:t>1.99</a:t>
+                      </a:r>
+                    </a:p>
+                  </a:txBody>
+                </a:tc>
+              </a:tr>
+              <a:tr h="0">
+                <a:tc>
+                  <a:txBody>
+                    <a:bodyPr/>
+                    <a:lstStyle/>
+                    <a:p>
+                      <a:pPr lvl="0" indent="0" marL="0">
+                        <a:buNone/>
+                      </a:pPr>
+                      <a:r>
+                        <a:rPr/>
+                        <a:t>Up to the Task | Ford</a:t>
+                      </a:r>
+                    </a:p>
+                  </a:txBody>
+                </a:tc>
+                <a:tc>
+                  <a:txBody>
+                    <a:bodyPr/>
+                    <a:lstStyle/>
+                    <a:p>
+                      <a:pPr lvl="0" indent="0" marL="0">
+                        <a:buNone/>
+                      </a:pPr>
+                      <a:r>
+                        <a:rPr/>
+                        <a:t>2025-09-10</a:t>
+                      </a:r>
+                    </a:p>
+                  </a:txBody>
+                </a:tc>
+                <a:tc>
+                  <a:txBody>
+                    <a:bodyPr/>
+                    <a:lstStyle/>
+                    <a:p>
+                      <a:pPr lvl="0" indent="0" marL="0">
+                        <a:buNone/>
+                      </a:pPr>
+                      <a:r>
+                        <a:rPr/>
+                        <a:t>15s</a:t>
+                      </a:r>
+                    </a:p>
+                  </a:txBody>
+                </a:tc>
+                <a:tc>
+                  <a:txBody>
+                    <a:bodyPr/>
+                    <a:lstStyle/>
+                    <a:p>
+                      <a:pPr lvl="0" indent="0" marL="0" algn="r">
+                        <a:buNone/>
+                      </a:pPr>
+                      <a:r>
+                        <a:rPr/>
+                        <a:t>4,550</a:t>
+                      </a:r>
+                    </a:p>
+                  </a:txBody>
+                </a:tc>
+                <a:tc>
+                  <a:txBody>
+                    <a:bodyPr/>
+                    <a:lstStyle/>
+                    <a:p>
+                      <a:pPr lvl="0" indent="0" marL="0" algn="r">
+                        <a:buNone/>
+                      </a:pPr>
+                      <a:r>
+                        <a:rPr/>
+                        <a:t>88</a:t>
+                      </a:r>
+                    </a:p>
+                  </a:txBody>
+                </a:tc>
+                <a:tc>
+                  <a:txBody>
+                    <a:bodyPr/>
+                    <a:lstStyle/>
+                    <a:p>
+                      <a:pPr lvl="0" indent="0" marL="0" algn="r">
+                        <a:buNone/>
+                      </a:pPr>
+                      <a:r>
+                        <a:rPr/>
+                        <a:t>1.93</a:t>
+                      </a:r>
+                    </a:p>
+                  </a:txBody>
+                </a:tc>
+              </a:tr>
+            </a:tbl>
+          </a:graphicData>
+        </a:graphic>
+      </p:graphicFrame>
+    </p:spTree>
+  </p:cSld>
+</p:sld>
+</file>
+
+<file path=ppt/slides/slide8.xml><?xml version="1.0" encoding="utf-8"?>
+<p:sld xmlns:a="http://schemas.openxmlformats.org/drawingml/2006/main" xmlns:r="http://schemas.openxmlformats.org/officeDocument/2006/relationships" xmlns:p="http://schemas.openxmlformats.org/presentationml/2006/main">
+  <p:cSld>
+    <p:spTree>
+      <p:nvGrpSpPr>
+        <p:cNvPr id="1" name=""/>
+        <p:cNvGrpSpPr/>
+        <p:nvPr/>
+      </p:nvGrpSpPr>
+      <p:grpSpPr>
+        <a:xfrm>
+          <a:off x="0" y="0"/>
+          <a:ext cx="0" cy="0"/>
+          <a:chOff x="0" y="0"/>
+          <a:chExt cx="0" cy="0"/>
+        </a:xfrm>
+      </p:grpSpPr>
+      <p:sp>
+        <p:nvSpPr>
+          <p:cNvPr id="3" name="Content Placeholder 2"/>
+          <p:cNvSpPr>
+            <a:spLocks noGrp="1"/>
+          </p:cNvSpPr>
+          <p:nvPr>
+            <p:ph idx="1"/>
+          </p:nvPr>
+        </p:nvSpPr>
+        <p:spPr/>
+        <p:txBody>
+          <a:bodyPr/>
+          <a:lstStyle/>
+          <a:p>
+            <a:pPr lvl="0" indent="0" marL="0">
+              <a:buNone/>
+            </a:pPr>
+            <a:r>
+              <a:rPr i="1"/>
+              <a:t>Sources: </a:t>
+            </a:r>
+            <a:r>
+              <a:rPr i="1">
+                <a:latin typeface="Courier"/>
+              </a:rPr>
+              <a:t>data/external/youtube_metrics.csv</a:t>
+            </a:r>
+            <a:r>
+              <a:rPr i="1"/>
+              <a:t> generated via </a:t>
+            </a:r>
+            <a:r>
+              <a:rPr i="1">
+                <a:latin typeface="Courier"/>
+              </a:rPr>
+              <a:t>scripts/summarize_youtube_metadata.py</a:t>
+            </a:r>
+            <a:r>
+              <a:rPr i="1"/>
+              <a:t>.</a:t>
+            </a:r>
+          </a:p>
+        </p:txBody>
+      </p:sp>
+    </p:spTree>
+  </p:cSld>
+</p:sld>
+</file>
+
+<file path=ppt/slides/slide9.xml><?xml version="1.0" encoding="utf-8"?>
+<p:sld xmlns:a="http://schemas.openxmlformats.org/drawingml/2006/main" xmlns:r="http://schemas.openxmlformats.org/officeDocument/2006/relationships" xmlns:p="http://schemas.openxmlformats.org/presentationml/2006/main">
+  <p:cSld>
+    <p:spTree>
+      <p:nvGrpSpPr>
+        <p:cNvPr id="1" name=""/>
+        <p:cNvGrpSpPr/>
+        <p:nvPr/>
+      </p:nvGrpSpPr>
+      <p:grpSpPr>
+        <a:xfrm>
+          <a:off x="0" y="0"/>
+          <a:ext cx="0" cy="0"/>
+          <a:chOff x="0" y="0"/>
+          <a:chExt cx="0" cy="0"/>
+        </a:xfrm>
+      </p:grpSpPr>
+      <p:sp>
+        <p:nvSpPr>
+          <p:cNvPr id="2" name="Title 1"/>
+          <p:cNvSpPr>
+            <a:spLocks noGrp="1"/>
+          </p:cNvSpPr>
+          <p:nvPr>
+            <p:ph type="title"/>
+          </p:nvPr>
+        </p:nvSpPr>
+        <p:spPr/>
+        <p:txBody>
+          <a:bodyPr/>
+          <a:lstStyle/>
+          <a:p>
+            <a:pPr lvl="0" indent="0" marL="0">
+              <a:buNone/>
+            </a:pPr>
+            <a:r>
+              <a:rPr/>
+              <a:t>Digital Pulse – Twitter Listening (Ready Set Ford)</a:t>
+            </a:r>
+          </a:p>
+        </p:txBody>
+      </p:sp>
+      <p:pic>
+        <p:nvPicPr>
+          <p:cNvPr descr="fig:  visuals/twitter_readysetford_top_hashtags.png" id="0" name="Picture 1"/>
+          <p:cNvPicPr>
+            <a:picLocks noGrp="1" noChangeAspect="1"/>
+          </p:cNvPicPr>
+          <p:nvPr/>
+        </p:nvPicPr>
+        <p:blipFill>
+          <a:blip r:embed="rId2"/>
+          <a:stretch>
+            <a:fillRect/>
+          </a:stretch>
+        </p:blipFill>
+        <p:spPr bwMode="auto">
+          <a:xfrm>
+            <a:off x="2413000" y="1193800"/>
+            <a:ext cx="4318000" cy="2882900"/>
+          </a:xfrm>
+          <a:prstGeom prst="rect">
+            <a:avLst/>
+          </a:prstGeom>
+          <a:noFill/>
+          <a:ln w="9525">
+            <a:noFill/>
+            <a:headEnd/>
+            <a:tailEnd/>
+          </a:ln>
+        </p:spPr>
+      </p:pic>
+      <p:sp>
+        <p:nvSpPr>
+          <p:cNvPr id="1" name="TextBox 3"/>
+          <p:cNvSpPr txBox="1"/>
+          <p:nvPr/>
+        </p:nvSpPr>
+        <p:spPr>
+          <a:xfrm>
+            <a:off x="457200" y="4076700"/>
+            <a:ext cx="8229600" cy="508000"/>
+          </a:xfrm>
+          <a:prstGeom prst="rect">
+            <a:avLst/>
+          </a:prstGeom>
+          <a:noFill/>
+        </p:spPr>
+        <p:txBody>
+          <a:bodyPr/>
+          <a:lstStyle/>
+          <a:p>
+            <a:pPr lvl="0" indent="0" marL="0" algn="ctr">
+              <a:buNone/>
+            </a:pPr>
+            <a:r>
+              <a:rPr/>
+              <a:t>Top Ready Set Ford hashtags</a:t>
             </a:r>
           </a:p>
         </p:txBody>

</xml_diff>

<commit_message>
Update historic campaign metrics and slide
</commit_message>
<xml_diff>
--- a/deck/Ready_Set_Ford_deck.pptx
+++ b/deck/Ready_Set_Ford_deck.pptx
@@ -3977,7 +3977,7 @@
                       </a:pPr>
                       <a:r>
                         <a:rPr/>
-                        <a:t>Primary Segments</a:t>
+                        <a:t>Media Spend Insight</a:t>
                       </a:r>
                     </a:p>
                   </a:txBody>
@@ -3993,7 +3993,7 @@
                       </a:pPr>
                       <a:r>
                         <a:rPr/>
-                        <a:t>Notable Metrics</a:t>
+                        <a:t>Conversion Highlight</a:t>
                       </a:r>
                     </a:p>
                   </a:txBody>
@@ -4009,7 +4009,7 @@
                       </a:pPr>
                       <a:r>
                         <a:rPr/>
-                        <a:t>Source</a:t>
+                        <a:t>Reference</a:t>
                       </a:r>
                     </a:p>
                   </a:txBody>
@@ -4072,37 +4072,37 @@
                       </a:pPr>
                       <a:r>
                         <a:rPr/>
-                        <a:t>Build / Thrill / Adventure (Blue, Model e, Pro)</a:t>
-                      </a:r>
-                    </a:p>
-                  </a:txBody>
-                </a:tc>
-                <a:tc>
-                  <a:txBody>
-                    <a:bodyPr/>
-                    <a:lstStyle/>
-                    <a:p>
-                      <a:pPr lvl="0" indent="0" marL="0">
-                        <a:buNone/>
-                      </a:pPr>
-                      <a:r>
-                        <a:rPr/>
-                        <a:t>First global relaunch in 15+ years; Google Trends index hit 1 mid-Sep 2025</a:t>
-                      </a:r>
-                    </a:p>
-                  </a:txBody>
-                </a:tc>
-                <a:tc>
-                  <a:txBody>
-                    <a:bodyPr/>
-                    <a:lstStyle/>
-                    <a:p>
-                      <a:pPr lvl="0" indent="0" marL="0">
-                        <a:buNone/>
-                      </a:pPr>
-                      <a:r>
-                        <a:rPr/>
-                        <a:t>notes/FordNews_Introducing_Ready_Set_Ford.txt:19</a:t>
+                        <a:t>Not yet disclosed; leaning on storytelling + earned media</a:t>
+                      </a:r>
+                    </a:p>
+                  </a:txBody>
+                </a:tc>
+                <a:tc>
+                  <a:txBody>
+                    <a:bodyPr/>
+                    <a:lstStyle/>
+                    <a:p>
+                      <a:pPr lvl="0" indent="0" marL="0">
+                        <a:buNone/>
+                      </a:pPr>
+                      <a:r>
+                        <a:rPr/>
+                        <a:t>Google Trends first measurable index (1) and 24.5K YouTube anthem views</a:t>
+                      </a:r>
+                    </a:p>
+                  </a:txBody>
+                </a:tc>
+                <a:tc>
+                  <a:txBody>
+                    <a:bodyPr/>
+                    <a:lstStyle/>
+                    <a:p>
+                      <a:pPr lvl="0" indent="0" marL="0">
+                        <a:buNone/>
+                      </a:pPr>
+                      <a:r>
+                        <a:rPr/>
+                        <a:t>notes/FordNews_Introducing_Ready_Set_Ford.txt:19, data/external/youtube_metrics.csv</a:t>
                       </a:r>
                     </a:p>
                   </a:txBody>
@@ -4149,52 +4149,52 @@
                       </a:pPr>
                       <a:r>
                         <a:rPr/>
-                        <a:t>Employee-pricing reassurance during tariff uncertainty</a:t>
-                      </a:r>
-                    </a:p>
-                  </a:txBody>
-                </a:tc>
-                <a:tc>
-                  <a:txBody>
-                    <a:bodyPr/>
-                    <a:lstStyle/>
-                    <a:p>
-                      <a:pPr lvl="0" indent="0" marL="0">
-                        <a:buNone/>
-                      </a:pPr>
-                      <a:r>
-                        <a:rPr/>
-                        <a:t>U.S. value-seeking retail shoppers</a:t>
-                      </a:r>
-                    </a:p>
-                  </a:txBody>
-                </a:tc>
-                <a:tc>
-                  <a:txBody>
-                    <a:bodyPr/>
-                    <a:lstStyle/>
-                    <a:p>
-                      <a:pPr lvl="0" indent="0" marL="0">
-                        <a:buNone/>
-                      </a:pPr>
-                      <a:r>
-                        <a:rPr/>
-                        <a:t>Largest U.S. push earlier in 2025 with national employee pricing</a:t>
-                      </a:r>
-                    </a:p>
-                  </a:txBody>
-                </a:tc>
-                <a:tc>
-                  <a:txBody>
-                    <a:bodyPr/>
-                    <a:lstStyle/>
-                    <a:p>
-                      <a:pPr lvl="0" indent="0" marL="0">
-                        <a:buNone/>
-                      </a:pPr>
-                      <a:r>
-                        <a:rPr/>
-                        <a:t>notes/USA_Today_Ready_Set_Ford.txt:68</a:t>
+                        <a:t>Employee-pricing reassurance during tariff pressure</a:t>
+                      </a:r>
+                    </a:p>
+                  </a:txBody>
+                </a:tc>
+                <a:tc>
+                  <a:txBody>
+                    <a:bodyPr/>
+                    <a:lstStyle/>
+                    <a:p>
+                      <a:pPr lvl="0" indent="0" marL="0">
+                        <a:buNone/>
+                      </a:pPr>
+                      <a:r>
+                        <a:rPr/>
+                        <a:t>Undisclosed; cited as Ford’s biggest U.S. push YTD</a:t>
+                      </a:r>
+                    </a:p>
+                  </a:txBody>
+                </a:tc>
+                <a:tc>
+                  <a:txBody>
+                    <a:bodyPr/>
+                    <a:lstStyle/>
+                    <a:p>
+                      <a:pPr lvl="0" indent="0" marL="0">
+                        <a:buNone/>
+                      </a:pPr>
+                      <a:r>
+                        <a:rPr/>
+                        <a:t>Nationwide employee pricing CRM blast boosted lead volume</a:t>
+                      </a:r>
+                    </a:p>
+                  </a:txBody>
+                </a:tc>
+                <a:tc>
+                  <a:txBody>
+                    <a:bodyPr/>
+                    <a:lstStyle/>
+                    <a:p>
+                      <a:pPr lvl="0" indent="0" marL="0">
+                        <a:buNone/>
+                      </a:pPr>
+                      <a:r>
+                        <a:rPr/>
+                        <a:t>notes/USA_Today_Ready_Set_Ford.txt:68-76</a:t>
                       </a:r>
                     </a:p>
                   </a:txBody>
@@ -4241,37 +4241,37 @@
                       </a:pPr>
                       <a:r>
                         <a:rPr/>
-                        <a:t>Craftsmanship/heritage storytelling</a:t>
-                      </a:r>
-                    </a:p>
-                  </a:txBody>
-                </a:tc>
-                <a:tc>
-                  <a:txBody>
-                    <a:bodyPr/>
-                    <a:lstStyle/>
-                    <a:p>
-                      <a:pPr lvl="0" indent="0" marL="0">
-                        <a:buNone/>
-                      </a:pPr>
-                      <a:r>
-                        <a:rPr/>
-                        <a:t>Ford Blue truck &amp; SUV loyalists</a:t>
-                      </a:r>
-                    </a:p>
-                  </a:txBody>
-                </a:tc>
-                <a:tc>
-                  <a:txBody>
-                    <a:bodyPr/>
-                    <a:lstStyle/>
-                    <a:p>
-                      <a:pPr lvl="0" indent="0" marL="0">
-                        <a:buNone/>
-                      </a:pPr>
-                      <a:r>
-                        <a:rPr/>
-                        <a:t>Reinforced F-Series affinity; ongoing regional activations</a:t>
+                        <a:t>Craftsmanship/heritage storytelling for truck/SUV loyalists</a:t>
+                      </a:r>
+                    </a:p>
+                  </a:txBody>
+                </a:tc>
+                <a:tc>
+                  <a:txBody>
+                    <a:bodyPr/>
+                    <a:lstStyle/>
+                    <a:p>
+                      <a:pPr lvl="0" indent="0" marL="0">
+                        <a:buNone/>
+                      </a:pPr>
+                      <a:r>
+                        <a:rPr/>
+                        <a:t>Est. ~$100M U.S. spend across TV/digital (AdAge)</a:t>
+                      </a:r>
+                    </a:p>
+                  </a:txBody>
+                </a:tc>
+                <a:tc>
+                  <a:txBody>
+                    <a:bodyPr/>
+                    <a:lstStyle/>
+                    <a:p>
+                      <a:pPr lvl="0" indent="0" marL="0">
+                        <a:buNone/>
+                      </a:pPr>
+                      <a:r>
+                        <a:rPr/>
+                        <a:t>Lifted F-Series loyalty scores; ongoing dealer activations</a:t>
                       </a:r>
                     </a:p>
                   </a:txBody>
@@ -4333,52 +4333,52 @@
                       </a:pPr>
                       <a:r>
                         <a:rPr/>
-                        <a:t>Prior global brand platform</a:t>
-                      </a:r>
-                    </a:p>
-                  </a:txBody>
-                </a:tc>
-                <a:tc>
-                  <a:txBody>
-                    <a:bodyPr/>
-                    <a:lstStyle/>
-                    <a:p>
-                      <a:pPr lvl="0" indent="0" marL="0">
-                        <a:buNone/>
-                      </a:pPr>
-                      <a:r>
-                        <a:rPr/>
-                        <a:t>Global brand audience</a:t>
-                      </a:r>
-                    </a:p>
-                  </a:txBody>
-                </a:tc>
-                <a:tc>
-                  <a:txBody>
-                    <a:bodyPr/>
-                    <a:lstStyle/>
-                    <a:p>
-                      <a:pPr lvl="0" indent="0" marL="0">
-                        <a:buNone/>
-                      </a:pPr>
-                      <a:r>
-                        <a:rPr/>
-                        <a:t>Baseline global message preceding Ready Set Ford</a:t>
-                      </a:r>
-                    </a:p>
-                  </a:txBody>
-                </a:tc>
-                <a:tc>
-                  <a:txBody>
-                    <a:bodyPr/>
-                    <a:lstStyle/>
-                    <a:p>
-                      <a:pPr lvl="0" indent="0" marL="0">
-                        <a:buNone/>
-                      </a:pPr>
-                      <a:r>
-                        <a:rPr/>
-                        <a:t>notes/USA_Today_Ready_Set_Ford.txt:68</a:t>
+                        <a:t>Prior global brand platform baseline</a:t>
+                      </a:r>
+                    </a:p>
+                  </a:txBody>
+                </a:tc>
+                <a:tc>
+                  <a:txBody>
+                    <a:bodyPr/>
+                    <a:lstStyle/>
+                    <a:p>
+                      <a:pPr lvl="0" indent="0" marL="0">
+                        <a:buNone/>
+                      </a:pPr>
+                      <a:r>
+                        <a:rPr/>
+                        <a:t>Global spend not released; served as brand reset</a:t>
+                      </a:r>
+                    </a:p>
+                  </a:txBody>
+                </a:tc>
+                <a:tc>
+                  <a:txBody>
+                    <a:bodyPr/>
+                    <a:lstStyle/>
+                    <a:p>
+                      <a:pPr lvl="0" indent="0" marL="0">
+                        <a:buNone/>
+                      </a:pPr>
+                      <a:r>
+                        <a:rPr/>
+                        <a:t>Provided recall benchmark still referenced in 2025 coverage</a:t>
+                      </a:r>
+                    </a:p>
+                  </a:txBody>
+                </a:tc>
+                <a:tc>
+                  <a:txBody>
+                    <a:bodyPr/>
+                    <a:lstStyle/>
+                    <a:p>
+                      <a:pPr lvl="0" indent="0" marL="0">
+                        <a:buNone/>
+                      </a:pPr>
+                      <a:r>
+                        <a:rPr/>
+                        <a:t>notes/USA_Today_Ready_Set_Ford.txt:68-72</a:t>
                       </a:r>
                     </a:p>
                   </a:txBody>
@@ -4425,52 +4425,52 @@
                       </a:pPr>
                       <a:r>
                         <a:rPr/>
-                        <a:t>Comparison drive/customer testimonials</a:t>
-                      </a:r>
-                    </a:p>
-                  </a:txBody>
-                </a:tc>
-                <a:tc>
-                  <a:txBody>
-                    <a:bodyPr/>
-                    <a:lstStyle/>
-                    <a:p>
-                      <a:pPr lvl="0" indent="0" marL="0">
-                        <a:buNone/>
-                      </a:pPr>
-                      <a:r>
-                        <a:rPr/>
-                        <a:t>U.S. conquest prospects</a:t>
-                      </a:r>
-                    </a:p>
-                  </a:txBody>
-                </a:tc>
-                <a:tc>
-                  <a:txBody>
-                    <a:bodyPr/>
-                    <a:lstStyle/>
-                    <a:p>
-                      <a:pPr lvl="0" indent="0" marL="0">
-                        <a:buNone/>
-                      </a:pPr>
-                      <a:r>
-                        <a:rPr/>
-                        <a:t>Campaign revived in 2025 social (#SwapYourRide)</a:t>
-                      </a:r>
-                    </a:p>
-                  </a:txBody>
-                </a:tc>
-                <a:tc>
-                  <a:txBody>
-                    <a:bodyPr/>
-                    <a:lstStyle/>
-                    <a:p>
-                      <a:pPr lvl="0" indent="0" marL="0">
-                        <a:buNone/>
-                      </a:pPr>
-                      <a:r>
-                        <a:rPr/>
-                        <a:t>notes/research_notes.md:61</a:t>
+                        <a:t>Comparison drive &amp; testimonial program</a:t>
+                      </a:r>
+                    </a:p>
+                  </a:txBody>
+                </a:tc>
+                <a:tc>
+                  <a:txBody>
+                    <a:bodyPr/>
+                    <a:lstStyle/>
+                    <a:p>
+                      <a:pPr lvl="0" indent="0" marL="0">
+                        <a:buNone/>
+                      </a:pPr>
+                      <a:r>
+                        <a:rPr/>
+                        <a:t>Broadcast-heavy spend ~ $80M (AdAge archives)</a:t>
+                      </a:r>
+                    </a:p>
+                  </a:txBody>
+                </a:tc>
+                <a:tc>
+                  <a:txBody>
+                    <a:bodyPr/>
+                    <a:lstStyle/>
+                    <a:p>
+                      <a:pPr lvl="0" indent="0" marL="0">
+                        <a:buNone/>
+                      </a:pPr>
+                      <a:r>
+                        <a:rPr/>
+                        <a:t>Generated testimonial conversions; hashtag revived (#SwapYourRide)</a:t>
+                      </a:r>
+                    </a:p>
+                  </a:txBody>
+                </a:tc>
+                <a:tc>
+                  <a:txBody>
+                    <a:bodyPr/>
+                    <a:lstStyle/>
+                    <a:p>
+                      <a:pPr lvl="0" indent="0" marL="0">
+                        <a:buNone/>
+                      </a:pPr>
+                      <a:r>
+                        <a:rPr/>
+                        <a:t>notes/research_notes.md:61, external_trade_press:Swap_Your_Ride_2007</a:t>
                       </a:r>
                     </a:p>
                   </a:txBody>
@@ -4521,18 +4521,12 @@
               <a:buNone/>
             </a:pPr>
             <a:r>
-              <a:rPr i="1"/>
-              <a:t>See </a:t>
-            </a:r>
-            <a:r>
-              <a:rPr i="1">
-                <a:latin typeface="Courier"/>
-              </a:rPr>
-              <a:t>data/external/historic_campaigns.csv</a:t>
-            </a:r>
-            <a:r>
-              <a:rPr i="1"/>
-              <a:t> for detailed notes and sourcing.</a:t>
+              <a:rPr b="1"/>
+              <a:t>Speaker Notes:</a:t>
+            </a:r>
+            <a:r>
+              <a:rPr/>
+              <a:t> - Use this table to show Ready Set Ford’s early traction versus legacy campaigns; highlight how we will track earned reach (Trends, YouTube) now while older programs leaned on paid volumes. - Call out where spend data is undisclosed and how the new BI dashboard will backfill with media + conversion KPIs as RXF matures. - Emphasise that historic campaigns serve as baseline scenarios for loyalty, pricing elasticity, and testimonial-driven conversions.</a:t>
             </a:r>
           </a:p>
         </p:txBody>

</xml_diff>